<commit_message>
added info update to sensors
</commit_message>
<xml_diff>
--- a/SDP_Summer_Progress.pptx
+++ b/SDP_Summer_Progress.pptx
@@ -19,7 +19,7 @@
     <p:sldId id="261" r:id="rId13"/>
     <p:sldId id="262" r:id="rId14"/>
     <p:sldId id="264" r:id="rId15"/>
-    <p:sldId id="272" r:id="rId16"/>
+    <p:sldId id="284" r:id="rId16"/>
     <p:sldId id="276" r:id="rId17"/>
     <p:sldId id="273" r:id="rId18"/>
     <p:sldId id="278" r:id="rId19"/>
@@ -289,6 +289,11 @@
       </a:defRPr>
     </a:lvl9pPr>
   </p:defaultTextStyle>
+  <p:extLst>
+    <p:ext uri="{EFAFB233-063F-42B5-8137-9DF3F51BA10A}">
+      <p15:sldGuideLst xmlns:p15="http://schemas.microsoft.com/office/powerpoint/2012/main"/>
+    </p:ext>
+  </p:extLst>
 </p:presentation>
 </file>
 
@@ -2433,7 +2438,7 @@
 <dgm:dataModel xmlns:dgm="http://schemas.openxmlformats.org/drawingml/2006/diagram" xmlns:a="http://schemas.openxmlformats.org/drawingml/2006/main">
   <dgm:ptLst>
     <dgm:pt modelId="{B9A0D049-8802-4846-889F-ADBF94D61912}" type="doc">
-      <dgm:prSet loTypeId="urn:microsoft.com/office/officeart/2005/8/layout/list1" loCatId="list" qsTypeId="urn:microsoft.com/office/officeart/2005/8/quickstyle/simple1" qsCatId="simple" csTypeId="urn:microsoft.com/office/officeart/2018/5/colors/Iconchunking_neutralicon_colorful1" csCatId="colorful" phldr="1"/>
+      <dgm:prSet loTypeId="urn:microsoft.com/office/officeart/2018/5/layout/IconCircleLabelList" loCatId="icon" qsTypeId="urn:microsoft.com/office/officeart/2005/8/quickstyle/simple1" qsCatId="simple" csTypeId="urn:microsoft.com/office/officeart/2018/5/colors/Iconchunking_neutralicon_colorful1" csCatId="colorful" phldr="1"/>
       <dgm:spPr/>
     </dgm:pt>
     <dgm:pt modelId="{783C64D3-24A1-43FE-A9F4-746555DF778A}">
@@ -2450,12 +2455,13 @@
             <a:defRPr cap="all"/>
           </a:pPr>
           <a:r>
-            <a:rPr lang="en-US" dirty="0">
-              <a:latin typeface="Arial"/>
+            <a:rPr lang="en-US">
+              <a:latin typeface="Roboto" panose="02000000000000000000" pitchFamily="2" charset="0"/>
+              <a:ea typeface="Roboto" panose="02000000000000000000" pitchFamily="2" charset="0"/>
+              <a:cs typeface="Roboto" panose="02000000000000000000" pitchFamily="2" charset="0"/>
             </a:rPr>
-            <a:t>Define outcomes</a:t>
+            <a:t>Define outcome</a:t>
           </a:r>
-          <a:endParaRPr lang="en-US" dirty="0"/>
         </a:p>
       </dgm:t>
     </dgm:pt>
@@ -2495,12 +2501,13 @@
             <a:defRPr cap="all"/>
           </a:pPr>
           <a:r>
-            <a:rPr lang="en-US" dirty="0">
-              <a:latin typeface="Arial"/>
+            <a:rPr lang="en-US">
+              <a:latin typeface="Roboto" panose="02000000000000000000" pitchFamily="2" charset="0"/>
+              <a:ea typeface="Roboto" panose="02000000000000000000" pitchFamily="2" charset="0"/>
+              <a:cs typeface="Roboto" panose="02000000000000000000" pitchFamily="2" charset="0"/>
             </a:rPr>
             <a:t>Order components</a:t>
           </a:r>
-          <a:endParaRPr lang="en-US" dirty="0"/>
         </a:p>
       </dgm:t>
     </dgm:pt>
@@ -2540,12 +2547,13 @@
             <a:defRPr cap="all"/>
           </a:pPr>
           <a:r>
-            <a:rPr lang="en-US" dirty="0">
-              <a:latin typeface="Arial"/>
+            <a:rPr lang="en-US">
+              <a:latin typeface="Roboto" panose="02000000000000000000" pitchFamily="2" charset="0"/>
+              <a:ea typeface="Roboto" panose="02000000000000000000" pitchFamily="2" charset="0"/>
+              <a:cs typeface="Roboto" panose="02000000000000000000" pitchFamily="2" charset="0"/>
             </a:rPr>
-            <a:t>Sensor Device &amp; Hub</a:t>
+            <a:t>Sensor Hub</a:t>
           </a:r>
-          <a:endParaRPr lang="en-US" dirty="0"/>
         </a:p>
       </dgm:t>
     </dgm:pt>
@@ -2585,8 +2593,10 @@
             <a:defRPr cap="all"/>
           </a:pPr>
           <a:r>
-            <a:rPr lang="en-US" dirty="0">
-              <a:latin typeface="Arial"/>
+            <a:rPr lang="en-US">
+              <a:latin typeface="Roboto" panose="02000000000000000000" pitchFamily="2" charset="0"/>
+              <a:ea typeface="Roboto" panose="02000000000000000000" pitchFamily="2" charset="0"/>
+              <a:cs typeface="Roboto" panose="02000000000000000000" pitchFamily="2" charset="0"/>
             </a:rPr>
             <a:t>Battery management system</a:t>
           </a:r>
@@ -2630,7 +2640,9 @@
           </a:pPr>
           <a:r>
             <a:rPr lang="en-US">
-              <a:latin typeface="Arial"/>
+              <a:latin typeface="Roboto" panose="02000000000000000000" pitchFamily="2" charset="0"/>
+              <a:ea typeface="Roboto" panose="02000000000000000000" pitchFamily="2" charset="0"/>
+              <a:cs typeface="Roboto" panose="02000000000000000000" pitchFamily="2" charset="0"/>
             </a:rPr>
             <a:t>Create a PCB </a:t>
           </a:r>
@@ -2674,9 +2686,11 @@
           </a:pPr>
           <a:r>
             <a:rPr lang="en-US" dirty="0">
-              <a:latin typeface="Arial"/>
+              <a:latin typeface="Roboto" panose="02000000000000000000" pitchFamily="2" charset="0"/>
+              <a:ea typeface="Roboto" panose="02000000000000000000" pitchFamily="2" charset="0"/>
+              <a:cs typeface="Roboto" panose="02000000000000000000" pitchFamily="2" charset="0"/>
             </a:rPr>
-            <a:t>Visualization of Data</a:t>
+            <a:t>Protective shell</a:t>
           </a:r>
         </a:p>
       </dgm:t>
@@ -2717,11 +2731,26 @@
             <a:defRPr cap="all"/>
           </a:pPr>
           <a:r>
-            <a:rPr lang="en-US">
-              <a:latin typeface="Arial"/>
+            <a:rPr lang="en-US" dirty="0">
+              <a:latin typeface="Roboto" panose="02000000000000000000" pitchFamily="2" charset="0"/>
+              <a:ea typeface="Roboto" panose="02000000000000000000" pitchFamily="2" charset="0"/>
+              <a:cs typeface="Roboto" panose="02000000000000000000" pitchFamily="2" charset="0"/>
             </a:rPr>
-            <a:t>Protective shell</a:t>
+            <a:t>Visualization</a:t>
           </a:r>
+          <a:r>
+            <a:rPr lang="en-US" baseline="0" dirty="0">
+              <a:latin typeface="Roboto" panose="02000000000000000000" pitchFamily="2" charset="0"/>
+              <a:ea typeface="Roboto" panose="02000000000000000000" pitchFamily="2" charset="0"/>
+              <a:cs typeface="Roboto" panose="02000000000000000000" pitchFamily="2" charset="0"/>
+            </a:rPr>
+            <a:t> of Data</a:t>
+          </a:r>
+          <a:endParaRPr lang="en-US" dirty="0">
+            <a:latin typeface="Roboto" panose="02000000000000000000" pitchFamily="2" charset="0"/>
+            <a:ea typeface="Roboto" panose="02000000000000000000" pitchFamily="2" charset="0"/>
+            <a:cs typeface="Roboto" panose="02000000000000000000" pitchFamily="2" charset="0"/>
+          </a:endParaRPr>
         </a:p>
       </dgm:t>
     </dgm:pt>
@@ -2747,308 +2776,440 @@
         </a:p>
       </dgm:t>
     </dgm:pt>
-    <dgm:pt modelId="{A19A161D-24BC-4793-A588-6DB2061C9B48}" type="pres">
-      <dgm:prSet presAssocID="{B9A0D049-8802-4846-889F-ADBF94D61912}" presName="linear" presStyleCnt="0">
+    <dgm:pt modelId="{9849232E-E063-42A8-B903-54FDD5EE0258}" type="pres">
+      <dgm:prSet presAssocID="{B9A0D049-8802-4846-889F-ADBF94D61912}" presName="root" presStyleCnt="0">
         <dgm:presLayoutVars>
           <dgm:dir/>
-          <dgm:animLvl val="lvl"/>
           <dgm:resizeHandles val="exact"/>
         </dgm:presLayoutVars>
       </dgm:prSet>
       <dgm:spPr/>
     </dgm:pt>
-    <dgm:pt modelId="{96077FE1-E4D4-4A30-A06B-6EE83687F062}" type="pres">
-      <dgm:prSet presAssocID="{783C64D3-24A1-43FE-A9F4-746555DF778A}" presName="parentLin" presStyleCnt="0"/>
+    <dgm:pt modelId="{651680BA-CE3C-48E9-BC42-E8553E3FD95D}" type="pres">
+      <dgm:prSet presAssocID="{783C64D3-24A1-43FE-A9F4-746555DF778A}" presName="compNode" presStyleCnt="0"/>
       <dgm:spPr/>
     </dgm:pt>
-    <dgm:pt modelId="{35A173EB-B83C-4720-A9B0-C24CE8571015}" type="pres">
-      <dgm:prSet presAssocID="{783C64D3-24A1-43FE-A9F4-746555DF778A}" presName="parentLeftMargin" presStyleLbl="node1" presStyleIdx="0" presStyleCnt="7"/>
+    <dgm:pt modelId="{13E3845A-E74F-4D7C-AF73-EA9EB7098537}" type="pres">
+      <dgm:prSet presAssocID="{783C64D3-24A1-43FE-A9F4-746555DF778A}" presName="iconBgRect" presStyleLbl="bgShp" presStyleIdx="0" presStyleCnt="7"/>
       <dgm:spPr/>
     </dgm:pt>
-    <dgm:pt modelId="{BA5AA5F1-E47A-4FB8-B976-36A847DAD87A}" type="pres">
-      <dgm:prSet presAssocID="{783C64D3-24A1-43FE-A9F4-746555DF778A}" presName="parentText" presStyleLbl="node1" presStyleIdx="0" presStyleCnt="7">
+    <dgm:pt modelId="{6D40F493-1913-45B2-88E7-012F3BAF2677}" type="pres">
+      <dgm:prSet presAssocID="{783C64D3-24A1-43FE-A9F4-746555DF778A}" presName="iconRect" presStyleLbl="node1" presStyleIdx="0" presStyleCnt="7"/>
+      <dgm:spPr>
+        <a:blipFill>
+          <a:blip xmlns:r="http://schemas.openxmlformats.org/officeDocument/2006/relationships" r:embed="rId1">
+            <a:extLst>
+              <a:ext uri="{28A0092B-C50C-407E-A947-70E740481C1C}">
+                <a14:useLocalDpi xmlns:a14="http://schemas.microsoft.com/office/drawing/2010/main" val="0"/>
+              </a:ext>
+              <a:ext uri="{96DAC541-7B7A-43D3-8B79-37D633B846F1}">
+                <asvg:svgBlip xmlns:asvg="http://schemas.microsoft.com/office/drawing/2016/SVG/main" r:embed="rId2"/>
+              </a:ext>
+            </a:extLst>
+          </a:blip>
+          <a:stretch>
+            <a:fillRect/>
+          </a:stretch>
+        </a:blipFill>
+        <a:ln>
+          <a:noFill/>
+        </a:ln>
+      </dgm:spPr>
+      <dgm:extLst>
+        <a:ext uri="{E40237B7-FDA0-4F09-8148-C483321AD2D9}">
+          <dgm14:cNvPr xmlns:dgm14="http://schemas.microsoft.com/office/drawing/2010/diagram" id="0" name="" descr="Checkmark"/>
+        </a:ext>
+      </dgm:extLst>
+    </dgm:pt>
+    <dgm:pt modelId="{FDEF7B73-551C-47A7-A3B2-CC71AD4D3BF1}" type="pres">
+      <dgm:prSet presAssocID="{783C64D3-24A1-43FE-A9F4-746555DF778A}" presName="spaceRect" presStyleCnt="0"/>
+      <dgm:spPr/>
+    </dgm:pt>
+    <dgm:pt modelId="{0B7D807E-8100-4BA7-A540-3BB8C8E08C4F}" type="pres">
+      <dgm:prSet presAssocID="{783C64D3-24A1-43FE-A9F4-746555DF778A}" presName="textRect" presStyleLbl="revTx" presStyleIdx="0" presStyleCnt="7">
         <dgm:presLayoutVars>
-          <dgm:chMax val="0"/>
-          <dgm:bulletEnabled val="1"/>
+          <dgm:chMax val="1"/>
+          <dgm:chPref val="1"/>
         </dgm:presLayoutVars>
       </dgm:prSet>
       <dgm:spPr/>
     </dgm:pt>
-    <dgm:pt modelId="{4615D53E-5AD7-45D0-943E-8F53CA38BAA3}" type="pres">
-      <dgm:prSet presAssocID="{783C64D3-24A1-43FE-A9F4-746555DF778A}" presName="negativeSpace" presStyleCnt="0"/>
+    <dgm:pt modelId="{34447E5E-7DCA-4BEA-8880-3B341D6633B3}" type="pres">
+      <dgm:prSet presAssocID="{159D3EE0-64DC-4AE7-A4FB-805B291224D5}" presName="sibTrans" presStyleCnt="0"/>
       <dgm:spPr/>
     </dgm:pt>
-    <dgm:pt modelId="{0F5E5A5E-9866-41CB-8233-72330ABDAE47}" type="pres">
-      <dgm:prSet presAssocID="{783C64D3-24A1-43FE-A9F4-746555DF778A}" presName="childText" presStyleLbl="conFgAcc1" presStyleIdx="0" presStyleCnt="7">
+    <dgm:pt modelId="{996977B0-1D4A-463A-B98F-85A95CA0F493}" type="pres">
+      <dgm:prSet presAssocID="{E2888821-2009-45FE-B331-B16D88AF01D8}" presName="compNode" presStyleCnt="0"/>
+      <dgm:spPr/>
+    </dgm:pt>
+    <dgm:pt modelId="{100041F0-D592-4381-BBDE-95924ABE18E9}" type="pres">
+      <dgm:prSet presAssocID="{E2888821-2009-45FE-B331-B16D88AF01D8}" presName="iconBgRect" presStyleLbl="bgShp" presStyleIdx="1" presStyleCnt="7"/>
+      <dgm:spPr/>
+    </dgm:pt>
+    <dgm:pt modelId="{970DD013-2FB2-4564-A92D-FAD254037933}" type="pres">
+      <dgm:prSet presAssocID="{E2888821-2009-45FE-B331-B16D88AF01D8}" presName="iconRect" presStyleLbl="node1" presStyleIdx="1" presStyleCnt="7"/>
+      <dgm:spPr>
+        <a:blipFill>
+          <a:blip xmlns:r="http://schemas.openxmlformats.org/officeDocument/2006/relationships" r:embed="rId3">
+            <a:extLst>
+              <a:ext uri="{28A0092B-C50C-407E-A947-70E740481C1C}">
+                <a14:useLocalDpi xmlns:a14="http://schemas.microsoft.com/office/drawing/2010/main" val="0"/>
+              </a:ext>
+              <a:ext uri="{96DAC541-7B7A-43D3-8B79-37D633B846F1}">
+                <asvg:svgBlip xmlns:asvg="http://schemas.microsoft.com/office/drawing/2016/SVG/main" r:embed="rId4"/>
+              </a:ext>
+            </a:extLst>
+          </a:blip>
+          <a:stretch>
+            <a:fillRect/>
+          </a:stretch>
+        </a:blipFill>
+        <a:ln>
+          <a:noFill/>
+        </a:ln>
+      </dgm:spPr>
+      <dgm:extLst>
+        <a:ext uri="{E40237B7-FDA0-4F09-8148-C483321AD2D9}">
+          <dgm14:cNvPr xmlns:dgm14="http://schemas.microsoft.com/office/drawing/2010/diagram" id="0" name="" descr="Check List"/>
+        </a:ext>
+      </dgm:extLst>
+    </dgm:pt>
+    <dgm:pt modelId="{AE8E2608-A9B7-4399-8FBC-8D4320D05D8A}" type="pres">
+      <dgm:prSet presAssocID="{E2888821-2009-45FE-B331-B16D88AF01D8}" presName="spaceRect" presStyleCnt="0"/>
+      <dgm:spPr/>
+    </dgm:pt>
+    <dgm:pt modelId="{6851D58B-B76B-4D64-9B59-183B32CAB374}" type="pres">
+      <dgm:prSet presAssocID="{E2888821-2009-45FE-B331-B16D88AF01D8}" presName="textRect" presStyleLbl="revTx" presStyleIdx="1" presStyleCnt="7">
         <dgm:presLayoutVars>
-          <dgm:bulletEnabled val="1"/>
+          <dgm:chMax val="1"/>
+          <dgm:chPref val="1"/>
         </dgm:presLayoutVars>
       </dgm:prSet>
       <dgm:spPr/>
     </dgm:pt>
-    <dgm:pt modelId="{132C4F0F-1575-4209-BD83-E9AF574DFCF6}" type="pres">
-      <dgm:prSet presAssocID="{159D3EE0-64DC-4AE7-A4FB-805B291224D5}" presName="spaceBetweenRectangles" presStyleCnt="0"/>
+    <dgm:pt modelId="{3AF60D17-8B73-4BE7-8455-7A4B5C434D9F}" type="pres">
+      <dgm:prSet presAssocID="{1C5B1115-A883-4370-9F9C-6065D9B5108A}" presName="sibTrans" presStyleCnt="0"/>
       <dgm:spPr/>
     </dgm:pt>
-    <dgm:pt modelId="{CB8E31FC-2635-44D9-A53F-67DCED740386}" type="pres">
-      <dgm:prSet presAssocID="{E2888821-2009-45FE-B331-B16D88AF01D8}" presName="parentLin" presStyleCnt="0"/>
+    <dgm:pt modelId="{1688042B-10D1-48DF-96C7-0B845389E6BC}" type="pres">
+      <dgm:prSet presAssocID="{B7D40708-3946-419C-8E2E-5E700478D89F}" presName="compNode" presStyleCnt="0"/>
       <dgm:spPr/>
     </dgm:pt>
-    <dgm:pt modelId="{7DF5240C-49DB-4735-AEEA-E870B011D176}" type="pres">
-      <dgm:prSet presAssocID="{E2888821-2009-45FE-B331-B16D88AF01D8}" presName="parentLeftMargin" presStyleLbl="node1" presStyleIdx="0" presStyleCnt="7"/>
+    <dgm:pt modelId="{99D7F73A-56A1-4205-9F9F-82B81EC01F8B}" type="pres">
+      <dgm:prSet presAssocID="{B7D40708-3946-419C-8E2E-5E700478D89F}" presName="iconBgRect" presStyleLbl="bgShp" presStyleIdx="2" presStyleCnt="7"/>
       <dgm:spPr/>
     </dgm:pt>
-    <dgm:pt modelId="{44875EEC-8ECA-4D50-A4E1-27923C5B6CC8}" type="pres">
-      <dgm:prSet presAssocID="{E2888821-2009-45FE-B331-B16D88AF01D8}" presName="parentText" presStyleLbl="node1" presStyleIdx="1" presStyleCnt="7">
+    <dgm:pt modelId="{2FA72BE5-98B8-4455-AEA5-7356812963B1}" type="pres">
+      <dgm:prSet presAssocID="{B7D40708-3946-419C-8E2E-5E700478D89F}" presName="iconRect" presStyleLbl="node1" presStyleIdx="2" presStyleCnt="7"/>
+      <dgm:spPr>
+        <a:blipFill>
+          <a:blip xmlns:r="http://schemas.openxmlformats.org/officeDocument/2006/relationships" r:embed="rId5">
+            <a:extLst>
+              <a:ext uri="{28A0092B-C50C-407E-A947-70E740481C1C}">
+                <a14:useLocalDpi xmlns:a14="http://schemas.microsoft.com/office/drawing/2010/main" val="0"/>
+              </a:ext>
+              <a:ext uri="{96DAC541-7B7A-43D3-8B79-37D633B846F1}">
+                <asvg:svgBlip xmlns:asvg="http://schemas.microsoft.com/office/drawing/2016/SVG/main" r:embed="rId6"/>
+              </a:ext>
+            </a:extLst>
+          </a:blip>
+          <a:stretch>
+            <a:fillRect/>
+          </a:stretch>
+        </a:blipFill>
+        <a:ln>
+          <a:noFill/>
+        </a:ln>
+      </dgm:spPr>
+      <dgm:extLst>
+        <a:ext uri="{E40237B7-FDA0-4F09-8148-C483321AD2D9}">
+          <dgm14:cNvPr xmlns:dgm14="http://schemas.microsoft.com/office/drawing/2010/diagram" id="0" name="" descr="Wi-Fi"/>
+        </a:ext>
+      </dgm:extLst>
+    </dgm:pt>
+    <dgm:pt modelId="{C1D15935-1F31-44C1-B744-11EFFEC246A0}" type="pres">
+      <dgm:prSet presAssocID="{B7D40708-3946-419C-8E2E-5E700478D89F}" presName="spaceRect" presStyleCnt="0"/>
+      <dgm:spPr/>
+    </dgm:pt>
+    <dgm:pt modelId="{87474B1A-1A16-4C6C-91D5-09F949F76942}" type="pres">
+      <dgm:prSet presAssocID="{B7D40708-3946-419C-8E2E-5E700478D89F}" presName="textRect" presStyleLbl="revTx" presStyleIdx="2" presStyleCnt="7">
         <dgm:presLayoutVars>
-          <dgm:chMax val="0"/>
-          <dgm:bulletEnabled val="1"/>
+          <dgm:chMax val="1"/>
+          <dgm:chPref val="1"/>
         </dgm:presLayoutVars>
       </dgm:prSet>
       <dgm:spPr/>
     </dgm:pt>
-    <dgm:pt modelId="{5BC8C10F-1310-4E89-A050-618211788F45}" type="pres">
-      <dgm:prSet presAssocID="{E2888821-2009-45FE-B331-B16D88AF01D8}" presName="negativeSpace" presStyleCnt="0"/>
+    <dgm:pt modelId="{56C291CB-60B7-454F-B0FE-66AD73892CD1}" type="pres">
+      <dgm:prSet presAssocID="{0961F63D-27A2-4849-A27F-F95713D3EF0C}" presName="sibTrans" presStyleCnt="0"/>
       <dgm:spPr/>
     </dgm:pt>
-    <dgm:pt modelId="{E6086B71-6D7B-4863-A7BF-EA47CE7D1DBC}" type="pres">
-      <dgm:prSet presAssocID="{E2888821-2009-45FE-B331-B16D88AF01D8}" presName="childText" presStyleLbl="conFgAcc1" presStyleIdx="1" presStyleCnt="7">
+    <dgm:pt modelId="{19744A90-AD7F-4ECB-A3D3-9A64BE890F21}" type="pres">
+      <dgm:prSet presAssocID="{24DF99BD-C93E-4749-805F-AED0C5D9F206}" presName="compNode" presStyleCnt="0"/>
+      <dgm:spPr/>
+    </dgm:pt>
+    <dgm:pt modelId="{C8FDCBBD-AF10-49BF-83DA-3EE5B7D96CD7}" type="pres">
+      <dgm:prSet presAssocID="{24DF99BD-C93E-4749-805F-AED0C5D9F206}" presName="iconBgRect" presStyleLbl="bgShp" presStyleIdx="3" presStyleCnt="7"/>
+      <dgm:spPr/>
+    </dgm:pt>
+    <dgm:pt modelId="{8F50F382-9A36-4F8E-83EE-29C499B0AEC7}" type="pres">
+      <dgm:prSet presAssocID="{24DF99BD-C93E-4749-805F-AED0C5D9F206}" presName="iconRect" presStyleLbl="node1" presStyleIdx="3" presStyleCnt="7"/>
+      <dgm:spPr>
+        <a:blipFill>
+          <a:blip xmlns:r="http://schemas.openxmlformats.org/officeDocument/2006/relationships" r:embed="rId7">
+            <a:extLst>
+              <a:ext uri="{28A0092B-C50C-407E-A947-70E740481C1C}">
+                <a14:useLocalDpi xmlns:a14="http://schemas.microsoft.com/office/drawing/2010/main" val="0"/>
+              </a:ext>
+              <a:ext uri="{96DAC541-7B7A-43D3-8B79-37D633B846F1}">
+                <asvg:svgBlip xmlns:asvg="http://schemas.microsoft.com/office/drawing/2016/SVG/main" r:embed="rId8"/>
+              </a:ext>
+            </a:extLst>
+          </a:blip>
+          <a:stretch>
+            <a:fillRect/>
+          </a:stretch>
+        </a:blipFill>
+        <a:ln>
+          <a:noFill/>
+        </a:ln>
+      </dgm:spPr>
+      <dgm:extLst>
+        <a:ext uri="{E40237B7-FDA0-4F09-8148-C483321AD2D9}">
+          <dgm14:cNvPr xmlns:dgm14="http://schemas.microsoft.com/office/drawing/2010/diagram" id="0" name="" descr="Full Battery"/>
+        </a:ext>
+      </dgm:extLst>
+    </dgm:pt>
+    <dgm:pt modelId="{DF3A7658-2628-431F-B2D9-CEDEF61F3BE1}" type="pres">
+      <dgm:prSet presAssocID="{24DF99BD-C93E-4749-805F-AED0C5D9F206}" presName="spaceRect" presStyleCnt="0"/>
+      <dgm:spPr/>
+    </dgm:pt>
+    <dgm:pt modelId="{C73D5BC5-414C-4A26-BC46-285A527222F8}" type="pres">
+      <dgm:prSet presAssocID="{24DF99BD-C93E-4749-805F-AED0C5D9F206}" presName="textRect" presStyleLbl="revTx" presStyleIdx="3" presStyleCnt="7">
         <dgm:presLayoutVars>
-          <dgm:bulletEnabled val="1"/>
+          <dgm:chMax val="1"/>
+          <dgm:chPref val="1"/>
         </dgm:presLayoutVars>
       </dgm:prSet>
       <dgm:spPr/>
     </dgm:pt>
-    <dgm:pt modelId="{4F509B34-1C99-44B8-83C9-6D6356A9E347}" type="pres">
-      <dgm:prSet presAssocID="{1C5B1115-A883-4370-9F9C-6065D9B5108A}" presName="spaceBetweenRectangles" presStyleCnt="0"/>
+    <dgm:pt modelId="{63CE11F4-4007-421B-AD0C-F758E6A8CFF1}" type="pres">
+      <dgm:prSet presAssocID="{75916F83-3016-4C12-A256-CBCEAECC00CF}" presName="sibTrans" presStyleCnt="0"/>
       <dgm:spPr/>
     </dgm:pt>
-    <dgm:pt modelId="{38A29FBC-0447-4BB5-977D-901E50365A30}" type="pres">
-      <dgm:prSet presAssocID="{B7D40708-3946-419C-8E2E-5E700478D89F}" presName="parentLin" presStyleCnt="0"/>
+    <dgm:pt modelId="{E2E1A40C-EA77-4109-8A55-1D7812637A05}" type="pres">
+      <dgm:prSet presAssocID="{E8C7A9CA-540B-452B-8D47-61B3E8DB5070}" presName="compNode" presStyleCnt="0"/>
       <dgm:spPr/>
     </dgm:pt>
-    <dgm:pt modelId="{ED8DE092-0AB1-4DE4-879B-48DD51CC8CAD}" type="pres">
-      <dgm:prSet presAssocID="{B7D40708-3946-419C-8E2E-5E700478D89F}" presName="parentLeftMargin" presStyleLbl="node1" presStyleIdx="1" presStyleCnt="7"/>
+    <dgm:pt modelId="{16C54867-7E4E-48F6-BD1D-3FCC95217046}" type="pres">
+      <dgm:prSet presAssocID="{E8C7A9CA-540B-452B-8D47-61B3E8DB5070}" presName="iconBgRect" presStyleLbl="bgShp" presStyleIdx="4" presStyleCnt="7"/>
       <dgm:spPr/>
     </dgm:pt>
-    <dgm:pt modelId="{DC3D1A65-1D29-4E72-9C45-9F6D2632FB43}" type="pres">
-      <dgm:prSet presAssocID="{B7D40708-3946-419C-8E2E-5E700478D89F}" presName="parentText" presStyleLbl="node1" presStyleIdx="2" presStyleCnt="7">
+    <dgm:pt modelId="{FDC2FA15-9C65-4FC9-8358-27138804CA9E}" type="pres">
+      <dgm:prSet presAssocID="{E8C7A9CA-540B-452B-8D47-61B3E8DB5070}" presName="iconRect" presStyleLbl="node1" presStyleIdx="4" presStyleCnt="7"/>
+      <dgm:spPr>
+        <a:blipFill>
+          <a:blip xmlns:r="http://schemas.openxmlformats.org/officeDocument/2006/relationships" r:embed="rId9">
+            <a:extLst>
+              <a:ext uri="{28A0092B-C50C-407E-A947-70E740481C1C}">
+                <a14:useLocalDpi xmlns:a14="http://schemas.microsoft.com/office/drawing/2010/main" val="0"/>
+              </a:ext>
+              <a:ext uri="{96DAC541-7B7A-43D3-8B79-37D633B846F1}">
+                <asvg:svgBlip xmlns:asvg="http://schemas.microsoft.com/office/drawing/2016/SVG/main" r:embed="rId10"/>
+              </a:ext>
+            </a:extLst>
+          </a:blip>
+          <a:stretch>
+            <a:fillRect/>
+          </a:stretch>
+        </a:blipFill>
+        <a:ln>
+          <a:noFill/>
+        </a:ln>
+      </dgm:spPr>
+      <dgm:extLst>
+        <a:ext uri="{E40237B7-FDA0-4F09-8148-C483321AD2D9}">
+          <dgm14:cNvPr xmlns:dgm14="http://schemas.microsoft.com/office/drawing/2010/diagram" id="0" name="" descr="Computer"/>
+        </a:ext>
+      </dgm:extLst>
+    </dgm:pt>
+    <dgm:pt modelId="{DB1340B1-1720-45EA-8A13-D8B15DF51071}" type="pres">
+      <dgm:prSet presAssocID="{E8C7A9CA-540B-452B-8D47-61B3E8DB5070}" presName="spaceRect" presStyleCnt="0"/>
+      <dgm:spPr/>
+    </dgm:pt>
+    <dgm:pt modelId="{F9701E68-56E4-4803-BBB8-C8A3E2FC88CF}" type="pres">
+      <dgm:prSet presAssocID="{E8C7A9CA-540B-452B-8D47-61B3E8DB5070}" presName="textRect" presStyleLbl="revTx" presStyleIdx="4" presStyleCnt="7">
         <dgm:presLayoutVars>
-          <dgm:chMax val="0"/>
-          <dgm:bulletEnabled val="1"/>
+          <dgm:chMax val="1"/>
+          <dgm:chPref val="1"/>
         </dgm:presLayoutVars>
       </dgm:prSet>
       <dgm:spPr/>
     </dgm:pt>
-    <dgm:pt modelId="{CDB7A518-32C9-4F6B-A922-C106C4DEA132}" type="pres">
-      <dgm:prSet presAssocID="{B7D40708-3946-419C-8E2E-5E700478D89F}" presName="negativeSpace" presStyleCnt="0"/>
+    <dgm:pt modelId="{913FC135-41C5-47F6-8013-4E1DBA27AD79}" type="pres">
+      <dgm:prSet presAssocID="{2C6A3CE4-E827-43F4-8373-E43084A141BE}" presName="sibTrans" presStyleCnt="0"/>
       <dgm:spPr/>
     </dgm:pt>
-    <dgm:pt modelId="{4406C653-0582-4FB0-95DA-3F737B75C4CE}" type="pres">
-      <dgm:prSet presAssocID="{B7D40708-3946-419C-8E2E-5E700478D89F}" presName="childText" presStyleLbl="conFgAcc1" presStyleIdx="2" presStyleCnt="7">
+    <dgm:pt modelId="{F1D597D2-04ED-4E75-B31E-8DFAD142DEAF}" type="pres">
+      <dgm:prSet presAssocID="{B1B7DA94-E9A7-40E0-ABAA-81225BBB3AA5}" presName="compNode" presStyleCnt="0"/>
+      <dgm:spPr/>
+    </dgm:pt>
+    <dgm:pt modelId="{D4A99554-9A76-4EFE-B691-850F3F24F166}" type="pres">
+      <dgm:prSet presAssocID="{B1B7DA94-E9A7-40E0-ABAA-81225BBB3AA5}" presName="iconBgRect" presStyleLbl="bgShp" presStyleIdx="5" presStyleCnt="7"/>
+      <dgm:spPr/>
+    </dgm:pt>
+    <dgm:pt modelId="{BC4C1656-798D-432B-9FD6-753FF5CC11CA}" type="pres">
+      <dgm:prSet presAssocID="{B1B7DA94-E9A7-40E0-ABAA-81225BBB3AA5}" presName="iconRect" presStyleLbl="node1" presStyleIdx="5" presStyleCnt="7"/>
+      <dgm:spPr>
+        <a:blipFill>
+          <a:blip xmlns:r="http://schemas.openxmlformats.org/officeDocument/2006/relationships" r:embed="rId11">
+            <a:extLst>
+              <a:ext uri="{28A0092B-C50C-407E-A947-70E740481C1C}">
+                <a14:useLocalDpi xmlns:a14="http://schemas.microsoft.com/office/drawing/2010/main" val="0"/>
+              </a:ext>
+              <a:ext uri="{96DAC541-7B7A-43D3-8B79-37D633B846F1}">
+                <asvg:svgBlip xmlns:asvg="http://schemas.microsoft.com/office/drawing/2016/SVG/main" r:embed="rId12"/>
+              </a:ext>
+            </a:extLst>
+          </a:blip>
+          <a:stretch>
+            <a:fillRect/>
+          </a:stretch>
+        </a:blipFill>
+        <a:ln>
+          <a:noFill/>
+        </a:ln>
+      </dgm:spPr>
+      <dgm:extLst>
+        <a:ext uri="{E40237B7-FDA0-4F09-8148-C483321AD2D9}">
+          <dgm14:cNvPr xmlns:dgm14="http://schemas.microsoft.com/office/drawing/2010/diagram" id="0" name="" descr="Statistics"/>
+        </a:ext>
+      </dgm:extLst>
+    </dgm:pt>
+    <dgm:pt modelId="{CB1ABBDA-40B4-441C-A235-4C9A5B20D016}" type="pres">
+      <dgm:prSet presAssocID="{B1B7DA94-E9A7-40E0-ABAA-81225BBB3AA5}" presName="spaceRect" presStyleCnt="0"/>
+      <dgm:spPr/>
+    </dgm:pt>
+    <dgm:pt modelId="{2DF67815-24E2-4367-B0EA-6D1C9FBFA5DC}" type="pres">
+      <dgm:prSet presAssocID="{B1B7DA94-E9A7-40E0-ABAA-81225BBB3AA5}" presName="textRect" presStyleLbl="revTx" presStyleIdx="5" presStyleCnt="7">
         <dgm:presLayoutVars>
-          <dgm:bulletEnabled val="1"/>
+          <dgm:chMax val="1"/>
+          <dgm:chPref val="1"/>
         </dgm:presLayoutVars>
       </dgm:prSet>
       <dgm:spPr/>
     </dgm:pt>
-    <dgm:pt modelId="{CE9FFB96-9C92-4371-9AE1-47A911DC12AC}" type="pres">
-      <dgm:prSet presAssocID="{0961F63D-27A2-4849-A27F-F95713D3EF0C}" presName="spaceBetweenRectangles" presStyleCnt="0"/>
+    <dgm:pt modelId="{2912B9F6-890A-4FB4-A6D2-B9CE9E0B61A0}" type="pres">
+      <dgm:prSet presAssocID="{C56F12F2-76DC-41DC-8288-7E11DD56ACD5}" presName="sibTrans" presStyleCnt="0"/>
       <dgm:spPr/>
     </dgm:pt>
-    <dgm:pt modelId="{34B2EC3E-4918-4E13-92D8-1D44B9A431C9}" type="pres">
-      <dgm:prSet presAssocID="{24DF99BD-C93E-4749-805F-AED0C5D9F206}" presName="parentLin" presStyleCnt="0"/>
+    <dgm:pt modelId="{152736B7-A416-43A6-AA2E-8A095FB2111E}" type="pres">
+      <dgm:prSet presAssocID="{0C60F269-CFF7-44BC-8BA9-DBF235A74A40}" presName="compNode" presStyleCnt="0"/>
       <dgm:spPr/>
     </dgm:pt>
-    <dgm:pt modelId="{34664454-CBAE-43F3-85BC-A9A5EA5FF18C}" type="pres">
-      <dgm:prSet presAssocID="{24DF99BD-C93E-4749-805F-AED0C5D9F206}" presName="parentLeftMargin" presStyleLbl="node1" presStyleIdx="2" presStyleCnt="7"/>
+    <dgm:pt modelId="{553AE206-E954-4455-9464-7F81419B6A85}" type="pres">
+      <dgm:prSet presAssocID="{0C60F269-CFF7-44BC-8BA9-DBF235A74A40}" presName="iconBgRect" presStyleLbl="bgShp" presStyleIdx="6" presStyleCnt="7"/>
       <dgm:spPr/>
     </dgm:pt>
-    <dgm:pt modelId="{F8C0326A-C9E7-4E95-A031-80AE228EAFD4}" type="pres">
-      <dgm:prSet presAssocID="{24DF99BD-C93E-4749-805F-AED0C5D9F206}" presName="parentText" presStyleLbl="node1" presStyleIdx="3" presStyleCnt="7">
-        <dgm:presLayoutVars>
-          <dgm:chMax val="0"/>
-          <dgm:bulletEnabled val="1"/>
-        </dgm:presLayoutVars>
-      </dgm:prSet>
+    <dgm:pt modelId="{89E9C3DD-51F8-4A6F-B9BA-F34C1D8BA595}" type="pres">
+      <dgm:prSet presAssocID="{0C60F269-CFF7-44BC-8BA9-DBF235A74A40}" presName="iconRect" presStyleLbl="node1" presStyleIdx="6" presStyleCnt="7"/>
+      <dgm:spPr>
+        <a:blipFill>
+          <a:blip xmlns:r="http://schemas.openxmlformats.org/officeDocument/2006/relationships" r:embed="rId13">
+            <a:extLst>
+              <a:ext uri="{28A0092B-C50C-407E-A947-70E740481C1C}">
+                <a14:useLocalDpi xmlns:a14="http://schemas.microsoft.com/office/drawing/2010/main" val="0"/>
+              </a:ext>
+              <a:ext uri="{96DAC541-7B7A-43D3-8B79-37D633B846F1}">
+                <asvg:svgBlip xmlns:asvg="http://schemas.microsoft.com/office/drawing/2016/SVG/main" r:embed="rId14"/>
+              </a:ext>
+            </a:extLst>
+          </a:blip>
+          <a:stretch>
+            <a:fillRect/>
+          </a:stretch>
+        </a:blipFill>
+        <a:ln>
+          <a:noFill/>
+        </a:ln>
+      </dgm:spPr>
+      <dgm:extLst>
+        <a:ext uri="{E40237B7-FDA0-4F09-8148-C483321AD2D9}">
+          <dgm14:cNvPr xmlns:dgm14="http://schemas.microsoft.com/office/drawing/2010/diagram" id="0" name="" descr="Warning"/>
+        </a:ext>
+      </dgm:extLst>
+    </dgm:pt>
+    <dgm:pt modelId="{938B1EA7-52D5-4C1F-B196-3D9FAEA81F9B}" type="pres">
+      <dgm:prSet presAssocID="{0C60F269-CFF7-44BC-8BA9-DBF235A74A40}" presName="spaceRect" presStyleCnt="0"/>
       <dgm:spPr/>
     </dgm:pt>
-    <dgm:pt modelId="{5C21C762-699D-4E70-AFEF-5A3C7D45A3DB}" type="pres">
-      <dgm:prSet presAssocID="{24DF99BD-C93E-4749-805F-AED0C5D9F206}" presName="negativeSpace" presStyleCnt="0"/>
-      <dgm:spPr/>
-    </dgm:pt>
-    <dgm:pt modelId="{AB2D1138-BE37-4A31-AB90-F157D49ED5F7}" type="pres">
-      <dgm:prSet presAssocID="{24DF99BD-C93E-4749-805F-AED0C5D9F206}" presName="childText" presStyleLbl="conFgAcc1" presStyleIdx="3" presStyleCnt="7">
+    <dgm:pt modelId="{94C76434-9AB3-43B2-A1D0-E67C983BB965}" type="pres">
+      <dgm:prSet presAssocID="{0C60F269-CFF7-44BC-8BA9-DBF235A74A40}" presName="textRect" presStyleLbl="revTx" presStyleIdx="6" presStyleCnt="7">
         <dgm:presLayoutVars>
-          <dgm:bulletEnabled val="1"/>
-        </dgm:presLayoutVars>
-      </dgm:prSet>
-      <dgm:spPr/>
-    </dgm:pt>
-    <dgm:pt modelId="{8893EB93-4408-41B5-8E62-B4E370714272}" type="pres">
-      <dgm:prSet presAssocID="{75916F83-3016-4C12-A256-CBCEAECC00CF}" presName="spaceBetweenRectangles" presStyleCnt="0"/>
-      <dgm:spPr/>
-    </dgm:pt>
-    <dgm:pt modelId="{C9D50C52-0D8D-4FBA-96FC-9F66B99AACFC}" type="pres">
-      <dgm:prSet presAssocID="{E8C7A9CA-540B-452B-8D47-61B3E8DB5070}" presName="parentLin" presStyleCnt="0"/>
-      <dgm:spPr/>
-    </dgm:pt>
-    <dgm:pt modelId="{6401991D-D689-4EB7-AEE8-DE71B71D4D20}" type="pres">
-      <dgm:prSet presAssocID="{E8C7A9CA-540B-452B-8D47-61B3E8DB5070}" presName="parentLeftMargin" presStyleLbl="node1" presStyleIdx="3" presStyleCnt="7"/>
-      <dgm:spPr/>
-    </dgm:pt>
-    <dgm:pt modelId="{F378BC6A-9100-4D79-8A54-B5290990E114}" type="pres">
-      <dgm:prSet presAssocID="{E8C7A9CA-540B-452B-8D47-61B3E8DB5070}" presName="parentText" presStyleLbl="node1" presStyleIdx="4" presStyleCnt="7">
-        <dgm:presLayoutVars>
-          <dgm:chMax val="0"/>
-          <dgm:bulletEnabled val="1"/>
-        </dgm:presLayoutVars>
-      </dgm:prSet>
-      <dgm:spPr/>
-    </dgm:pt>
-    <dgm:pt modelId="{4B5C5938-BDBB-4501-8BCF-9EFA2A10C104}" type="pres">
-      <dgm:prSet presAssocID="{E8C7A9CA-540B-452B-8D47-61B3E8DB5070}" presName="negativeSpace" presStyleCnt="0"/>
-      <dgm:spPr/>
-    </dgm:pt>
-    <dgm:pt modelId="{27FBFBBA-48BD-47CA-A69E-70565ED07582}" type="pres">
-      <dgm:prSet presAssocID="{E8C7A9CA-540B-452B-8D47-61B3E8DB5070}" presName="childText" presStyleLbl="conFgAcc1" presStyleIdx="4" presStyleCnt="7">
-        <dgm:presLayoutVars>
-          <dgm:bulletEnabled val="1"/>
-        </dgm:presLayoutVars>
-      </dgm:prSet>
-      <dgm:spPr/>
-    </dgm:pt>
-    <dgm:pt modelId="{B05BC1EE-D1E4-4500-999F-59BF7C6F097D}" type="pres">
-      <dgm:prSet presAssocID="{2C6A3CE4-E827-43F4-8373-E43084A141BE}" presName="spaceBetweenRectangles" presStyleCnt="0"/>
-      <dgm:spPr/>
-    </dgm:pt>
-    <dgm:pt modelId="{9F9241CA-0966-4C16-B678-865AB15C2FCF}" type="pres">
-      <dgm:prSet presAssocID="{B1B7DA94-E9A7-40E0-ABAA-81225BBB3AA5}" presName="parentLin" presStyleCnt="0"/>
-      <dgm:spPr/>
-    </dgm:pt>
-    <dgm:pt modelId="{8EFA9793-72E1-4168-8BEF-0B6C80ECDC55}" type="pres">
-      <dgm:prSet presAssocID="{B1B7DA94-E9A7-40E0-ABAA-81225BBB3AA5}" presName="parentLeftMargin" presStyleLbl="node1" presStyleIdx="4" presStyleCnt="7"/>
-      <dgm:spPr/>
-    </dgm:pt>
-    <dgm:pt modelId="{9941594D-02B6-4D53-A97D-D05A77024F6B}" type="pres">
-      <dgm:prSet presAssocID="{B1B7DA94-E9A7-40E0-ABAA-81225BBB3AA5}" presName="parentText" presStyleLbl="node1" presStyleIdx="5" presStyleCnt="7">
-        <dgm:presLayoutVars>
-          <dgm:chMax val="0"/>
-          <dgm:bulletEnabled val="1"/>
-        </dgm:presLayoutVars>
-      </dgm:prSet>
-      <dgm:spPr/>
-    </dgm:pt>
-    <dgm:pt modelId="{67C320C8-E057-4DDE-A57A-17718705D3EB}" type="pres">
-      <dgm:prSet presAssocID="{B1B7DA94-E9A7-40E0-ABAA-81225BBB3AA5}" presName="negativeSpace" presStyleCnt="0"/>
-      <dgm:spPr/>
-    </dgm:pt>
-    <dgm:pt modelId="{BC7BFDC9-CAF2-4AE7-BFDD-68C259D8F1C3}" type="pres">
-      <dgm:prSet presAssocID="{B1B7DA94-E9A7-40E0-ABAA-81225BBB3AA5}" presName="childText" presStyleLbl="conFgAcc1" presStyleIdx="5" presStyleCnt="7">
-        <dgm:presLayoutVars>
-          <dgm:bulletEnabled val="1"/>
-        </dgm:presLayoutVars>
-      </dgm:prSet>
-      <dgm:spPr/>
-    </dgm:pt>
-    <dgm:pt modelId="{644CE25F-17A8-4120-A9D8-C56BE96E2862}" type="pres">
-      <dgm:prSet presAssocID="{C56F12F2-76DC-41DC-8288-7E11DD56ACD5}" presName="spaceBetweenRectangles" presStyleCnt="0"/>
-      <dgm:spPr/>
-    </dgm:pt>
-    <dgm:pt modelId="{C12EE9B0-9CA5-430F-BD8D-591D5726CFB7}" type="pres">
-      <dgm:prSet presAssocID="{0C60F269-CFF7-44BC-8BA9-DBF235A74A40}" presName="parentLin" presStyleCnt="0"/>
-      <dgm:spPr/>
-    </dgm:pt>
-    <dgm:pt modelId="{0A0AD8F8-1D3D-4CAF-BA30-AD802DFEC0E7}" type="pres">
-      <dgm:prSet presAssocID="{0C60F269-CFF7-44BC-8BA9-DBF235A74A40}" presName="parentLeftMargin" presStyleLbl="node1" presStyleIdx="5" presStyleCnt="7"/>
-      <dgm:spPr/>
-    </dgm:pt>
-    <dgm:pt modelId="{CE67BB86-3302-4DD2-9019-43B1FDC37C30}" type="pres">
-      <dgm:prSet presAssocID="{0C60F269-CFF7-44BC-8BA9-DBF235A74A40}" presName="parentText" presStyleLbl="node1" presStyleIdx="6" presStyleCnt="7">
-        <dgm:presLayoutVars>
-          <dgm:chMax val="0"/>
-          <dgm:bulletEnabled val="1"/>
-        </dgm:presLayoutVars>
-      </dgm:prSet>
-      <dgm:spPr/>
-    </dgm:pt>
-    <dgm:pt modelId="{47550206-11DB-4490-9D83-6D10F2254B9D}" type="pres">
-      <dgm:prSet presAssocID="{0C60F269-CFF7-44BC-8BA9-DBF235A74A40}" presName="negativeSpace" presStyleCnt="0"/>
-      <dgm:spPr/>
-    </dgm:pt>
-    <dgm:pt modelId="{F0761842-E1A3-45C4-9B8D-2D2B434D89EE}" type="pres">
-      <dgm:prSet presAssocID="{0C60F269-CFF7-44BC-8BA9-DBF235A74A40}" presName="childText" presStyleLbl="conFgAcc1" presStyleIdx="6" presStyleCnt="7">
-        <dgm:presLayoutVars>
-          <dgm:bulletEnabled val="1"/>
+          <dgm:chMax val="1"/>
+          <dgm:chPref val="1"/>
         </dgm:presLayoutVars>
       </dgm:prSet>
       <dgm:spPr/>
     </dgm:pt>
   </dgm:ptLst>
   <dgm:cxnLst>
-    <dgm:cxn modelId="{E53EE91D-359A-4322-B156-35274181D303}" type="presOf" srcId="{B1B7DA94-E9A7-40E0-ABAA-81225BBB3AA5}" destId="{9941594D-02B6-4D53-A97D-D05A77024F6B}" srcOrd="1" destOrd="0" presId="urn:microsoft.com/office/officeart/2005/8/layout/list1"/>
-    <dgm:cxn modelId="{FCE99A22-65E0-44BE-99AF-85D09F9E552B}" type="presOf" srcId="{0C60F269-CFF7-44BC-8BA9-DBF235A74A40}" destId="{0A0AD8F8-1D3D-4CAF-BA30-AD802DFEC0E7}" srcOrd="0" destOrd="0" presId="urn:microsoft.com/office/officeart/2005/8/layout/list1"/>
+    <dgm:cxn modelId="{3FB8FB1C-0BA3-4A3A-9258-8746A2E41040}" type="presOf" srcId="{0C60F269-CFF7-44BC-8BA9-DBF235A74A40}" destId="{94C76434-9AB3-43B2-A1D0-E67C983BB965}" srcOrd="0" destOrd="0" presId="urn:microsoft.com/office/officeart/2018/5/layout/IconCircleLabelList"/>
     <dgm:cxn modelId="{EA0FE022-F2AC-4FF0-B38C-FE9DD4272FBC}" srcId="{B9A0D049-8802-4846-889F-ADBF94D61912}" destId="{B7D40708-3946-419C-8E2E-5E700478D89F}" srcOrd="2" destOrd="0" parTransId="{84DF8125-CDC1-4D28-9A9A-9DC8039144DB}" sibTransId="{0961F63D-27A2-4849-A27F-F95713D3EF0C}"/>
-    <dgm:cxn modelId="{63D30A25-9AFC-40E8-9690-CC12889DCBFD}" type="presOf" srcId="{E2888821-2009-45FE-B331-B16D88AF01D8}" destId="{7DF5240C-49DB-4735-AEEA-E870B011D176}" srcOrd="0" destOrd="0" presId="urn:microsoft.com/office/officeart/2005/8/layout/list1"/>
-    <dgm:cxn modelId="{4B460634-3B77-47B1-A65B-1D733421657B}" type="presOf" srcId="{B7D40708-3946-419C-8E2E-5E700478D89F}" destId="{ED8DE092-0AB1-4DE4-879B-48DD51CC8CAD}" srcOrd="0" destOrd="0" presId="urn:microsoft.com/office/officeart/2005/8/layout/list1"/>
     <dgm:cxn modelId="{6D443035-EE07-4209-A680-9150C5D5BCA0}" srcId="{B9A0D049-8802-4846-889F-ADBF94D61912}" destId="{783C64D3-24A1-43FE-A9F4-746555DF778A}" srcOrd="0" destOrd="0" parTransId="{FE58CB86-DCD2-4FFC-8D75-6529B5AB0D60}" sibTransId="{159D3EE0-64DC-4AE7-A4FB-805B291224D5}"/>
-    <dgm:cxn modelId="{34A0813F-BEA8-4F0B-8C5C-BFAC84E2A403}" type="presOf" srcId="{0C60F269-CFF7-44BC-8BA9-DBF235A74A40}" destId="{CE67BB86-3302-4DD2-9019-43B1FDC37C30}" srcOrd="1" destOrd="0" presId="urn:microsoft.com/office/officeart/2005/8/layout/list1"/>
+    <dgm:cxn modelId="{CCB3C15C-E269-485A-8A94-12C5106FE604}" type="presOf" srcId="{E2888821-2009-45FE-B331-B16D88AF01D8}" destId="{6851D58B-B76B-4D64-9B59-183B32CAB374}" srcOrd="0" destOrd="0" presId="urn:microsoft.com/office/officeart/2018/5/layout/IconCircleLabelList"/>
     <dgm:cxn modelId="{2B3C6143-33C6-4363-B889-03D744415DD5}" srcId="{B9A0D049-8802-4846-889F-ADBF94D61912}" destId="{E2888821-2009-45FE-B331-B16D88AF01D8}" srcOrd="1" destOrd="0" parTransId="{5550A8F0-CF09-4821-B40D-1B10FDBAA1A8}" sibTransId="{1C5B1115-A883-4370-9F9C-6065D9B5108A}"/>
-    <dgm:cxn modelId="{19A04C65-7A52-4734-951E-C57FA0D71CC4}" type="presOf" srcId="{B9A0D049-8802-4846-889F-ADBF94D61912}" destId="{A19A161D-24BC-4793-A588-6DB2061C9B48}" srcOrd="0" destOrd="0" presId="urn:microsoft.com/office/officeart/2005/8/layout/list1"/>
-    <dgm:cxn modelId="{A54D764D-2C8D-4860-B465-813A90B298D8}" type="presOf" srcId="{783C64D3-24A1-43FE-A9F4-746555DF778A}" destId="{35A173EB-B83C-4720-A9B0-C24CE8571015}" srcOrd="0" destOrd="0" presId="urn:microsoft.com/office/officeart/2005/8/layout/list1"/>
-    <dgm:cxn modelId="{97225474-4A6C-4ED1-81E4-7FCD21BDA860}" type="presOf" srcId="{E2888821-2009-45FE-B331-B16D88AF01D8}" destId="{44875EEC-8ECA-4D50-A4E1-27923C5B6CC8}" srcOrd="1" destOrd="0" presId="urn:microsoft.com/office/officeart/2005/8/layout/list1"/>
-    <dgm:cxn modelId="{B6F2F779-6FD7-4A3B-A583-7679C453A07A}" type="presOf" srcId="{B7D40708-3946-419C-8E2E-5E700478D89F}" destId="{DC3D1A65-1D29-4E72-9C45-9F6D2632FB43}" srcOrd="1" destOrd="0" presId="urn:microsoft.com/office/officeart/2005/8/layout/list1"/>
+    <dgm:cxn modelId="{6E990769-A832-4B60-9261-3B61E96719A4}" type="presOf" srcId="{B7D40708-3946-419C-8E2E-5E700478D89F}" destId="{87474B1A-1A16-4C6C-91D5-09F949F76942}" srcOrd="0" destOrd="0" presId="urn:microsoft.com/office/officeart/2018/5/layout/IconCircleLabelList"/>
+    <dgm:cxn modelId="{0F3C6E57-1CAC-4D4E-98AF-5223E657E0A8}" type="presOf" srcId="{E8C7A9CA-540B-452B-8D47-61B3E8DB5070}" destId="{F9701E68-56E4-4803-BBB8-C8A3E2FC88CF}" srcOrd="0" destOrd="0" presId="urn:microsoft.com/office/officeart/2018/5/layout/IconCircleLabelList"/>
     <dgm:cxn modelId="{34FC8E7E-BC75-4242-83C1-13720A158E9D}" srcId="{B9A0D049-8802-4846-889F-ADBF94D61912}" destId="{0C60F269-CFF7-44BC-8BA9-DBF235A74A40}" srcOrd="6" destOrd="0" parTransId="{7AC2AF81-8CFD-4E2B-BC18-9A3E302CD87F}" sibTransId="{16EFEFA1-B7D5-4B74-80EC-A658BA8D04AA}"/>
     <dgm:cxn modelId="{E79E1386-8F32-41E3-BF16-67FFCC6274FB}" srcId="{B9A0D049-8802-4846-889F-ADBF94D61912}" destId="{B1B7DA94-E9A7-40E0-ABAA-81225BBB3AA5}" srcOrd="5" destOrd="0" parTransId="{9D5D8E40-2641-4CB0-8E10-78B2CAE63814}" sibTransId="{C56F12F2-76DC-41DC-8288-7E11DD56ACD5}"/>
-    <dgm:cxn modelId="{476DF588-829B-4431-9F85-C702C3E5117A}" type="presOf" srcId="{B1B7DA94-E9A7-40E0-ABAA-81225BBB3AA5}" destId="{8EFA9793-72E1-4168-8BEF-0B6C80ECDC55}" srcOrd="0" destOrd="0" presId="urn:microsoft.com/office/officeart/2005/8/layout/list1"/>
-    <dgm:cxn modelId="{A471DE9A-9081-43C6-8915-973C5D6A3FAA}" type="presOf" srcId="{24DF99BD-C93E-4749-805F-AED0C5D9F206}" destId="{34664454-CBAE-43F3-85BC-A9A5EA5FF18C}" srcOrd="0" destOrd="0" presId="urn:microsoft.com/office/officeart/2005/8/layout/list1"/>
-    <dgm:cxn modelId="{A300B99C-DEBB-4614-A3DF-3053E02A5B00}" type="presOf" srcId="{783C64D3-24A1-43FE-A9F4-746555DF778A}" destId="{BA5AA5F1-E47A-4FB8-B976-36A847DAD87A}" srcOrd="1" destOrd="0" presId="urn:microsoft.com/office/officeart/2005/8/layout/list1"/>
+    <dgm:cxn modelId="{1C910D8D-5EE2-4670-8197-431383C0CE49}" type="presOf" srcId="{24DF99BD-C93E-4749-805F-AED0C5D9F206}" destId="{C73D5BC5-414C-4A26-BC46-285A527222F8}" srcOrd="0" destOrd="0" presId="urn:microsoft.com/office/officeart/2018/5/layout/IconCircleLabelList"/>
     <dgm:cxn modelId="{E350A9A1-788B-4548-99E6-182E2AEECD82}" srcId="{B9A0D049-8802-4846-889F-ADBF94D61912}" destId="{E8C7A9CA-540B-452B-8D47-61B3E8DB5070}" srcOrd="4" destOrd="0" parTransId="{68CAF001-C474-4D17-8AC2-302D57F19832}" sibTransId="{2C6A3CE4-E827-43F4-8373-E43084A141BE}"/>
-    <dgm:cxn modelId="{1FE4CDAA-E04C-4E30-9213-CBF0D81D3666}" type="presOf" srcId="{24DF99BD-C93E-4749-805F-AED0C5D9F206}" destId="{F8C0326A-C9E7-4E95-A031-80AE228EAFD4}" srcOrd="1" destOrd="0" presId="urn:microsoft.com/office/officeart/2005/8/layout/list1"/>
     <dgm:cxn modelId="{5D2951C4-AA01-404F-BC71-6A0AABCA4740}" srcId="{B9A0D049-8802-4846-889F-ADBF94D61912}" destId="{24DF99BD-C93E-4749-805F-AED0C5D9F206}" srcOrd="3" destOrd="0" parTransId="{1FF14F78-4B73-4D0F-9E46-C52135896F83}" sibTransId="{75916F83-3016-4C12-A256-CBCEAECC00CF}"/>
-    <dgm:cxn modelId="{B08B02DA-DFCA-44EB-9841-771B2A226FAB}" type="presOf" srcId="{E8C7A9CA-540B-452B-8D47-61B3E8DB5070}" destId="{6401991D-D689-4EB7-AEE8-DE71B71D4D20}" srcOrd="0" destOrd="0" presId="urn:microsoft.com/office/officeart/2005/8/layout/list1"/>
-    <dgm:cxn modelId="{595AA2E9-2358-4432-845C-8A4751435E00}" type="presOf" srcId="{E8C7A9CA-540B-452B-8D47-61B3E8DB5070}" destId="{F378BC6A-9100-4D79-8A54-B5290990E114}" srcOrd="1" destOrd="0" presId="urn:microsoft.com/office/officeart/2005/8/layout/list1"/>
-    <dgm:cxn modelId="{89ACFB32-3EE0-46E3-860F-423A66B129B7}" type="presParOf" srcId="{A19A161D-24BC-4793-A588-6DB2061C9B48}" destId="{96077FE1-E4D4-4A30-A06B-6EE83687F062}" srcOrd="0" destOrd="0" presId="urn:microsoft.com/office/officeart/2005/8/layout/list1"/>
-    <dgm:cxn modelId="{D0F1E23E-D5BC-4AF5-8C49-5424B9666B27}" type="presParOf" srcId="{96077FE1-E4D4-4A30-A06B-6EE83687F062}" destId="{35A173EB-B83C-4720-A9B0-C24CE8571015}" srcOrd="0" destOrd="0" presId="urn:microsoft.com/office/officeart/2005/8/layout/list1"/>
-    <dgm:cxn modelId="{0782BCE3-88C9-4A7C-BF57-BA64572822C4}" type="presParOf" srcId="{96077FE1-E4D4-4A30-A06B-6EE83687F062}" destId="{BA5AA5F1-E47A-4FB8-B976-36A847DAD87A}" srcOrd="1" destOrd="0" presId="urn:microsoft.com/office/officeart/2005/8/layout/list1"/>
-    <dgm:cxn modelId="{8BD101F4-20BE-47D5-A98B-38B362A51274}" type="presParOf" srcId="{A19A161D-24BC-4793-A588-6DB2061C9B48}" destId="{4615D53E-5AD7-45D0-943E-8F53CA38BAA3}" srcOrd="1" destOrd="0" presId="urn:microsoft.com/office/officeart/2005/8/layout/list1"/>
-    <dgm:cxn modelId="{D4C701BC-566C-46D9-B40B-48FB39E8657D}" type="presParOf" srcId="{A19A161D-24BC-4793-A588-6DB2061C9B48}" destId="{0F5E5A5E-9866-41CB-8233-72330ABDAE47}" srcOrd="2" destOrd="0" presId="urn:microsoft.com/office/officeart/2005/8/layout/list1"/>
-    <dgm:cxn modelId="{1C784629-2109-4CCD-A0C1-9987C16097FD}" type="presParOf" srcId="{A19A161D-24BC-4793-A588-6DB2061C9B48}" destId="{132C4F0F-1575-4209-BD83-E9AF574DFCF6}" srcOrd="3" destOrd="0" presId="urn:microsoft.com/office/officeart/2005/8/layout/list1"/>
-    <dgm:cxn modelId="{5E5C425E-17DF-433E-8481-20F400B0BA81}" type="presParOf" srcId="{A19A161D-24BC-4793-A588-6DB2061C9B48}" destId="{CB8E31FC-2635-44D9-A53F-67DCED740386}" srcOrd="4" destOrd="0" presId="urn:microsoft.com/office/officeart/2005/8/layout/list1"/>
-    <dgm:cxn modelId="{F89B05DD-964A-447C-837E-56E3807ED660}" type="presParOf" srcId="{CB8E31FC-2635-44D9-A53F-67DCED740386}" destId="{7DF5240C-49DB-4735-AEEA-E870B011D176}" srcOrd="0" destOrd="0" presId="urn:microsoft.com/office/officeart/2005/8/layout/list1"/>
-    <dgm:cxn modelId="{1C698664-578B-4930-BBF9-68628AAA83C0}" type="presParOf" srcId="{CB8E31FC-2635-44D9-A53F-67DCED740386}" destId="{44875EEC-8ECA-4D50-A4E1-27923C5B6CC8}" srcOrd="1" destOrd="0" presId="urn:microsoft.com/office/officeart/2005/8/layout/list1"/>
-    <dgm:cxn modelId="{5801BE16-E63D-484D-82A2-E4FA4A24FD57}" type="presParOf" srcId="{A19A161D-24BC-4793-A588-6DB2061C9B48}" destId="{5BC8C10F-1310-4E89-A050-618211788F45}" srcOrd="5" destOrd="0" presId="urn:microsoft.com/office/officeart/2005/8/layout/list1"/>
-    <dgm:cxn modelId="{85BDF5CC-074B-4688-9FAC-D370B1343776}" type="presParOf" srcId="{A19A161D-24BC-4793-A588-6DB2061C9B48}" destId="{E6086B71-6D7B-4863-A7BF-EA47CE7D1DBC}" srcOrd="6" destOrd="0" presId="urn:microsoft.com/office/officeart/2005/8/layout/list1"/>
-    <dgm:cxn modelId="{32A58410-87BB-4DC5-82A0-FDDF7142B751}" type="presParOf" srcId="{A19A161D-24BC-4793-A588-6DB2061C9B48}" destId="{4F509B34-1C99-44B8-83C9-6D6356A9E347}" srcOrd="7" destOrd="0" presId="urn:microsoft.com/office/officeart/2005/8/layout/list1"/>
-    <dgm:cxn modelId="{CDA9FD48-F29C-469F-96A3-380D6DF7D995}" type="presParOf" srcId="{A19A161D-24BC-4793-A588-6DB2061C9B48}" destId="{38A29FBC-0447-4BB5-977D-901E50365A30}" srcOrd="8" destOrd="0" presId="urn:microsoft.com/office/officeart/2005/8/layout/list1"/>
-    <dgm:cxn modelId="{CD99FFDF-03EA-4D56-BDFD-344556EAA358}" type="presParOf" srcId="{38A29FBC-0447-4BB5-977D-901E50365A30}" destId="{ED8DE092-0AB1-4DE4-879B-48DD51CC8CAD}" srcOrd="0" destOrd="0" presId="urn:microsoft.com/office/officeart/2005/8/layout/list1"/>
-    <dgm:cxn modelId="{5B1FA76C-B0A7-4FDC-8DB4-5DE6B39F41C9}" type="presParOf" srcId="{38A29FBC-0447-4BB5-977D-901E50365A30}" destId="{DC3D1A65-1D29-4E72-9C45-9F6D2632FB43}" srcOrd="1" destOrd="0" presId="urn:microsoft.com/office/officeart/2005/8/layout/list1"/>
-    <dgm:cxn modelId="{C6D95E30-BB10-4E23-8229-4889D620EF85}" type="presParOf" srcId="{A19A161D-24BC-4793-A588-6DB2061C9B48}" destId="{CDB7A518-32C9-4F6B-A922-C106C4DEA132}" srcOrd="9" destOrd="0" presId="urn:microsoft.com/office/officeart/2005/8/layout/list1"/>
-    <dgm:cxn modelId="{E398E6CE-D954-41E9-BE49-573F3C8B751E}" type="presParOf" srcId="{A19A161D-24BC-4793-A588-6DB2061C9B48}" destId="{4406C653-0582-4FB0-95DA-3F737B75C4CE}" srcOrd="10" destOrd="0" presId="urn:microsoft.com/office/officeart/2005/8/layout/list1"/>
-    <dgm:cxn modelId="{DD34A47D-EC84-40A8-84A7-7E83428A3BC6}" type="presParOf" srcId="{A19A161D-24BC-4793-A588-6DB2061C9B48}" destId="{CE9FFB96-9C92-4371-9AE1-47A911DC12AC}" srcOrd="11" destOrd="0" presId="urn:microsoft.com/office/officeart/2005/8/layout/list1"/>
-    <dgm:cxn modelId="{553AF847-AA5B-4ADF-89C0-2B3564A5E343}" type="presParOf" srcId="{A19A161D-24BC-4793-A588-6DB2061C9B48}" destId="{34B2EC3E-4918-4E13-92D8-1D44B9A431C9}" srcOrd="12" destOrd="0" presId="urn:microsoft.com/office/officeart/2005/8/layout/list1"/>
-    <dgm:cxn modelId="{A22BFDE3-12AA-4D4E-B746-DB4525455B28}" type="presParOf" srcId="{34B2EC3E-4918-4E13-92D8-1D44B9A431C9}" destId="{34664454-CBAE-43F3-85BC-A9A5EA5FF18C}" srcOrd="0" destOrd="0" presId="urn:microsoft.com/office/officeart/2005/8/layout/list1"/>
-    <dgm:cxn modelId="{3419C3B3-F2F6-4D3F-8385-6E775782BB25}" type="presParOf" srcId="{34B2EC3E-4918-4E13-92D8-1D44B9A431C9}" destId="{F8C0326A-C9E7-4E95-A031-80AE228EAFD4}" srcOrd="1" destOrd="0" presId="urn:microsoft.com/office/officeart/2005/8/layout/list1"/>
-    <dgm:cxn modelId="{F1F73592-C46A-4656-ADFB-B720D229E4DD}" type="presParOf" srcId="{A19A161D-24BC-4793-A588-6DB2061C9B48}" destId="{5C21C762-699D-4E70-AFEF-5A3C7D45A3DB}" srcOrd="13" destOrd="0" presId="urn:microsoft.com/office/officeart/2005/8/layout/list1"/>
-    <dgm:cxn modelId="{C55ED1DB-EE34-4500-AF1B-5526123CB4A8}" type="presParOf" srcId="{A19A161D-24BC-4793-A588-6DB2061C9B48}" destId="{AB2D1138-BE37-4A31-AB90-F157D49ED5F7}" srcOrd="14" destOrd="0" presId="urn:microsoft.com/office/officeart/2005/8/layout/list1"/>
-    <dgm:cxn modelId="{1633506C-B71A-4E7D-8A0C-A08DD14122C5}" type="presParOf" srcId="{A19A161D-24BC-4793-A588-6DB2061C9B48}" destId="{8893EB93-4408-41B5-8E62-B4E370714272}" srcOrd="15" destOrd="0" presId="urn:microsoft.com/office/officeart/2005/8/layout/list1"/>
-    <dgm:cxn modelId="{56D17A0C-8475-44BD-8A8D-3C70DD9EB0C7}" type="presParOf" srcId="{A19A161D-24BC-4793-A588-6DB2061C9B48}" destId="{C9D50C52-0D8D-4FBA-96FC-9F66B99AACFC}" srcOrd="16" destOrd="0" presId="urn:microsoft.com/office/officeart/2005/8/layout/list1"/>
-    <dgm:cxn modelId="{EF1482FC-8901-45DE-B44D-678DECCD64F2}" type="presParOf" srcId="{C9D50C52-0D8D-4FBA-96FC-9F66B99AACFC}" destId="{6401991D-D689-4EB7-AEE8-DE71B71D4D20}" srcOrd="0" destOrd="0" presId="urn:microsoft.com/office/officeart/2005/8/layout/list1"/>
-    <dgm:cxn modelId="{2D8439EB-38A5-4E29-96CA-5A9C08B702FD}" type="presParOf" srcId="{C9D50C52-0D8D-4FBA-96FC-9F66B99AACFC}" destId="{F378BC6A-9100-4D79-8A54-B5290990E114}" srcOrd="1" destOrd="0" presId="urn:microsoft.com/office/officeart/2005/8/layout/list1"/>
-    <dgm:cxn modelId="{F67BBC53-CEE8-49EA-B010-29FF8B927060}" type="presParOf" srcId="{A19A161D-24BC-4793-A588-6DB2061C9B48}" destId="{4B5C5938-BDBB-4501-8BCF-9EFA2A10C104}" srcOrd="17" destOrd="0" presId="urn:microsoft.com/office/officeart/2005/8/layout/list1"/>
-    <dgm:cxn modelId="{C409123D-8118-4A63-9734-5369E7F4548C}" type="presParOf" srcId="{A19A161D-24BC-4793-A588-6DB2061C9B48}" destId="{27FBFBBA-48BD-47CA-A69E-70565ED07582}" srcOrd="18" destOrd="0" presId="urn:microsoft.com/office/officeart/2005/8/layout/list1"/>
-    <dgm:cxn modelId="{523AF9C1-34BB-4578-8450-0D6992B98114}" type="presParOf" srcId="{A19A161D-24BC-4793-A588-6DB2061C9B48}" destId="{B05BC1EE-D1E4-4500-999F-59BF7C6F097D}" srcOrd="19" destOrd="0" presId="urn:microsoft.com/office/officeart/2005/8/layout/list1"/>
-    <dgm:cxn modelId="{2D858727-9E72-4C9A-8312-8CCCDDACE67A}" type="presParOf" srcId="{A19A161D-24BC-4793-A588-6DB2061C9B48}" destId="{9F9241CA-0966-4C16-B678-865AB15C2FCF}" srcOrd="20" destOrd="0" presId="urn:microsoft.com/office/officeart/2005/8/layout/list1"/>
-    <dgm:cxn modelId="{3E5CEBE4-0EB4-413E-95D1-3D692ADAF119}" type="presParOf" srcId="{9F9241CA-0966-4C16-B678-865AB15C2FCF}" destId="{8EFA9793-72E1-4168-8BEF-0B6C80ECDC55}" srcOrd="0" destOrd="0" presId="urn:microsoft.com/office/officeart/2005/8/layout/list1"/>
-    <dgm:cxn modelId="{38C3FC05-DFEB-4C68-A84E-374FE7921EFD}" type="presParOf" srcId="{9F9241CA-0966-4C16-B678-865AB15C2FCF}" destId="{9941594D-02B6-4D53-A97D-D05A77024F6B}" srcOrd="1" destOrd="0" presId="urn:microsoft.com/office/officeart/2005/8/layout/list1"/>
-    <dgm:cxn modelId="{D13A5ADD-2708-4C1D-B195-C43E19E63CC7}" type="presParOf" srcId="{A19A161D-24BC-4793-A588-6DB2061C9B48}" destId="{67C320C8-E057-4DDE-A57A-17718705D3EB}" srcOrd="21" destOrd="0" presId="urn:microsoft.com/office/officeart/2005/8/layout/list1"/>
-    <dgm:cxn modelId="{D5C84A89-9C08-4AC6-8283-5845D54FB2FB}" type="presParOf" srcId="{A19A161D-24BC-4793-A588-6DB2061C9B48}" destId="{BC7BFDC9-CAF2-4AE7-BFDD-68C259D8F1C3}" srcOrd="22" destOrd="0" presId="urn:microsoft.com/office/officeart/2005/8/layout/list1"/>
-    <dgm:cxn modelId="{037FECDA-2EDB-4896-9BCB-97FF083260D9}" type="presParOf" srcId="{A19A161D-24BC-4793-A588-6DB2061C9B48}" destId="{644CE25F-17A8-4120-A9D8-C56BE96E2862}" srcOrd="23" destOrd="0" presId="urn:microsoft.com/office/officeart/2005/8/layout/list1"/>
-    <dgm:cxn modelId="{9DE50094-541B-40CB-83CB-73D037BE1563}" type="presParOf" srcId="{A19A161D-24BC-4793-A588-6DB2061C9B48}" destId="{C12EE9B0-9CA5-430F-BD8D-591D5726CFB7}" srcOrd="24" destOrd="0" presId="urn:microsoft.com/office/officeart/2005/8/layout/list1"/>
-    <dgm:cxn modelId="{D366B15C-4F3C-415D-9D72-12A17B66CB34}" type="presParOf" srcId="{C12EE9B0-9CA5-430F-BD8D-591D5726CFB7}" destId="{0A0AD8F8-1D3D-4CAF-BA30-AD802DFEC0E7}" srcOrd="0" destOrd="0" presId="urn:microsoft.com/office/officeart/2005/8/layout/list1"/>
-    <dgm:cxn modelId="{17FFDA69-CB5E-434D-83B8-50406ED23E65}" type="presParOf" srcId="{C12EE9B0-9CA5-430F-BD8D-591D5726CFB7}" destId="{CE67BB86-3302-4DD2-9019-43B1FDC37C30}" srcOrd="1" destOrd="0" presId="urn:microsoft.com/office/officeart/2005/8/layout/list1"/>
-    <dgm:cxn modelId="{9DE2C1E7-44DF-4C6B-A6A4-204504B815DC}" type="presParOf" srcId="{A19A161D-24BC-4793-A588-6DB2061C9B48}" destId="{47550206-11DB-4490-9D83-6D10F2254B9D}" srcOrd="25" destOrd="0" presId="urn:microsoft.com/office/officeart/2005/8/layout/list1"/>
-    <dgm:cxn modelId="{D13C4579-6DED-48D6-ACFA-B4F31CF8F1FF}" type="presParOf" srcId="{A19A161D-24BC-4793-A588-6DB2061C9B48}" destId="{F0761842-E1A3-45C4-9B8D-2D2B434D89EE}" srcOrd="26" destOrd="0" presId="urn:microsoft.com/office/officeart/2005/8/layout/list1"/>
+    <dgm:cxn modelId="{FEC667F2-D334-4C1E-A722-2AF5B41F0894}" type="presOf" srcId="{B1B7DA94-E9A7-40E0-ABAA-81225BBB3AA5}" destId="{2DF67815-24E2-4367-B0EA-6D1C9FBFA5DC}" srcOrd="0" destOrd="0" presId="urn:microsoft.com/office/officeart/2018/5/layout/IconCircleLabelList"/>
+    <dgm:cxn modelId="{9B820EFA-9481-410B-AFBE-21EAA5FFE8E7}" type="presOf" srcId="{783C64D3-24A1-43FE-A9F4-746555DF778A}" destId="{0B7D807E-8100-4BA7-A540-3BB8C8E08C4F}" srcOrd="0" destOrd="0" presId="urn:microsoft.com/office/officeart/2018/5/layout/IconCircleLabelList"/>
+    <dgm:cxn modelId="{1A0446FD-B4B5-44DB-96E7-9B8FE1EFC343}" type="presOf" srcId="{B9A0D049-8802-4846-889F-ADBF94D61912}" destId="{9849232E-E063-42A8-B903-54FDD5EE0258}" srcOrd="0" destOrd="0" presId="urn:microsoft.com/office/officeart/2018/5/layout/IconCircleLabelList"/>
+    <dgm:cxn modelId="{B3BD7BE4-8737-44E9-B428-6DF02ACF4A77}" type="presParOf" srcId="{9849232E-E063-42A8-B903-54FDD5EE0258}" destId="{651680BA-CE3C-48E9-BC42-E8553E3FD95D}" srcOrd="0" destOrd="0" presId="urn:microsoft.com/office/officeart/2018/5/layout/IconCircleLabelList"/>
+    <dgm:cxn modelId="{CA427EBB-C86A-40A5-9962-A46D3E41A852}" type="presParOf" srcId="{651680BA-CE3C-48E9-BC42-E8553E3FD95D}" destId="{13E3845A-E74F-4D7C-AF73-EA9EB7098537}" srcOrd="0" destOrd="0" presId="urn:microsoft.com/office/officeart/2018/5/layout/IconCircleLabelList"/>
+    <dgm:cxn modelId="{DFF343E9-8D92-4CDA-9D89-B0C934857C25}" type="presParOf" srcId="{651680BA-CE3C-48E9-BC42-E8553E3FD95D}" destId="{6D40F493-1913-45B2-88E7-012F3BAF2677}" srcOrd="1" destOrd="0" presId="urn:microsoft.com/office/officeart/2018/5/layout/IconCircleLabelList"/>
+    <dgm:cxn modelId="{7A7B005C-C039-4557-87E5-6D31F2D89AA7}" type="presParOf" srcId="{651680BA-CE3C-48E9-BC42-E8553E3FD95D}" destId="{FDEF7B73-551C-47A7-A3B2-CC71AD4D3BF1}" srcOrd="2" destOrd="0" presId="urn:microsoft.com/office/officeart/2018/5/layout/IconCircleLabelList"/>
+    <dgm:cxn modelId="{45E11B90-B0C4-4FFA-BF5D-B1B3E4713CA3}" type="presParOf" srcId="{651680BA-CE3C-48E9-BC42-E8553E3FD95D}" destId="{0B7D807E-8100-4BA7-A540-3BB8C8E08C4F}" srcOrd="3" destOrd="0" presId="urn:microsoft.com/office/officeart/2018/5/layout/IconCircleLabelList"/>
+    <dgm:cxn modelId="{A8FF3219-971F-421E-8403-A4717AC1122C}" type="presParOf" srcId="{9849232E-E063-42A8-B903-54FDD5EE0258}" destId="{34447E5E-7DCA-4BEA-8880-3B341D6633B3}" srcOrd="1" destOrd="0" presId="urn:microsoft.com/office/officeart/2018/5/layout/IconCircleLabelList"/>
+    <dgm:cxn modelId="{F4F14588-D168-445E-8406-197B17EA16A5}" type="presParOf" srcId="{9849232E-E063-42A8-B903-54FDD5EE0258}" destId="{996977B0-1D4A-463A-B98F-85A95CA0F493}" srcOrd="2" destOrd="0" presId="urn:microsoft.com/office/officeart/2018/5/layout/IconCircleLabelList"/>
+    <dgm:cxn modelId="{9C621E23-3339-40A7-A2F2-1CD7EC885E2F}" type="presParOf" srcId="{996977B0-1D4A-463A-B98F-85A95CA0F493}" destId="{100041F0-D592-4381-BBDE-95924ABE18E9}" srcOrd="0" destOrd="0" presId="urn:microsoft.com/office/officeart/2018/5/layout/IconCircleLabelList"/>
+    <dgm:cxn modelId="{80E3D916-12F8-4FE3-AB06-00FF39C976AB}" type="presParOf" srcId="{996977B0-1D4A-463A-B98F-85A95CA0F493}" destId="{970DD013-2FB2-4564-A92D-FAD254037933}" srcOrd="1" destOrd="0" presId="urn:microsoft.com/office/officeart/2018/5/layout/IconCircleLabelList"/>
+    <dgm:cxn modelId="{9E5D9F70-6CE8-4303-9B7E-87562DA17203}" type="presParOf" srcId="{996977B0-1D4A-463A-B98F-85A95CA0F493}" destId="{AE8E2608-A9B7-4399-8FBC-8D4320D05D8A}" srcOrd="2" destOrd="0" presId="urn:microsoft.com/office/officeart/2018/5/layout/IconCircleLabelList"/>
+    <dgm:cxn modelId="{43CF62CD-7CE8-4E86-85B9-E6EE4D1625B3}" type="presParOf" srcId="{996977B0-1D4A-463A-B98F-85A95CA0F493}" destId="{6851D58B-B76B-4D64-9B59-183B32CAB374}" srcOrd="3" destOrd="0" presId="urn:microsoft.com/office/officeart/2018/5/layout/IconCircleLabelList"/>
+    <dgm:cxn modelId="{254E1B9F-81DB-48D1-829E-B326EE288A01}" type="presParOf" srcId="{9849232E-E063-42A8-B903-54FDD5EE0258}" destId="{3AF60D17-8B73-4BE7-8455-7A4B5C434D9F}" srcOrd="3" destOrd="0" presId="urn:microsoft.com/office/officeart/2018/5/layout/IconCircleLabelList"/>
+    <dgm:cxn modelId="{1F934345-4593-4C9A-B94D-61A9035CF291}" type="presParOf" srcId="{9849232E-E063-42A8-B903-54FDD5EE0258}" destId="{1688042B-10D1-48DF-96C7-0B845389E6BC}" srcOrd="4" destOrd="0" presId="urn:microsoft.com/office/officeart/2018/5/layout/IconCircleLabelList"/>
+    <dgm:cxn modelId="{980EBAE0-DD5A-410C-88EA-94B4B0091612}" type="presParOf" srcId="{1688042B-10D1-48DF-96C7-0B845389E6BC}" destId="{99D7F73A-56A1-4205-9F9F-82B81EC01F8B}" srcOrd="0" destOrd="0" presId="urn:microsoft.com/office/officeart/2018/5/layout/IconCircleLabelList"/>
+    <dgm:cxn modelId="{0E62E627-FC6D-4B3F-8976-5387C6F2718D}" type="presParOf" srcId="{1688042B-10D1-48DF-96C7-0B845389E6BC}" destId="{2FA72BE5-98B8-4455-AEA5-7356812963B1}" srcOrd="1" destOrd="0" presId="urn:microsoft.com/office/officeart/2018/5/layout/IconCircleLabelList"/>
+    <dgm:cxn modelId="{7A1145DD-AB84-417D-9A49-D98A12CADBA8}" type="presParOf" srcId="{1688042B-10D1-48DF-96C7-0B845389E6BC}" destId="{C1D15935-1F31-44C1-B744-11EFFEC246A0}" srcOrd="2" destOrd="0" presId="urn:microsoft.com/office/officeart/2018/5/layout/IconCircleLabelList"/>
+    <dgm:cxn modelId="{70EBEBF4-9747-4918-BECB-09A5B334AA69}" type="presParOf" srcId="{1688042B-10D1-48DF-96C7-0B845389E6BC}" destId="{87474B1A-1A16-4C6C-91D5-09F949F76942}" srcOrd="3" destOrd="0" presId="urn:microsoft.com/office/officeart/2018/5/layout/IconCircleLabelList"/>
+    <dgm:cxn modelId="{B41538EE-6523-435D-83D9-C14BBACE91C4}" type="presParOf" srcId="{9849232E-E063-42A8-B903-54FDD5EE0258}" destId="{56C291CB-60B7-454F-B0FE-66AD73892CD1}" srcOrd="5" destOrd="0" presId="urn:microsoft.com/office/officeart/2018/5/layout/IconCircleLabelList"/>
+    <dgm:cxn modelId="{80F0B935-7A81-439B-9F2F-E14FBE600254}" type="presParOf" srcId="{9849232E-E063-42A8-B903-54FDD5EE0258}" destId="{19744A90-AD7F-4ECB-A3D3-9A64BE890F21}" srcOrd="6" destOrd="0" presId="urn:microsoft.com/office/officeart/2018/5/layout/IconCircleLabelList"/>
+    <dgm:cxn modelId="{2D81D9E2-C039-460C-9B84-99AAB44CD638}" type="presParOf" srcId="{19744A90-AD7F-4ECB-A3D3-9A64BE890F21}" destId="{C8FDCBBD-AF10-49BF-83DA-3EE5B7D96CD7}" srcOrd="0" destOrd="0" presId="urn:microsoft.com/office/officeart/2018/5/layout/IconCircleLabelList"/>
+    <dgm:cxn modelId="{23015339-CAA9-4E77-8382-4BADC502B1EB}" type="presParOf" srcId="{19744A90-AD7F-4ECB-A3D3-9A64BE890F21}" destId="{8F50F382-9A36-4F8E-83EE-29C499B0AEC7}" srcOrd="1" destOrd="0" presId="urn:microsoft.com/office/officeart/2018/5/layout/IconCircleLabelList"/>
+    <dgm:cxn modelId="{61921497-5B8D-46DD-B267-7F5E6BB43C23}" type="presParOf" srcId="{19744A90-AD7F-4ECB-A3D3-9A64BE890F21}" destId="{DF3A7658-2628-431F-B2D9-CEDEF61F3BE1}" srcOrd="2" destOrd="0" presId="urn:microsoft.com/office/officeart/2018/5/layout/IconCircleLabelList"/>
+    <dgm:cxn modelId="{2AA6177D-947F-421E-B48A-04E632C184E5}" type="presParOf" srcId="{19744A90-AD7F-4ECB-A3D3-9A64BE890F21}" destId="{C73D5BC5-414C-4A26-BC46-285A527222F8}" srcOrd="3" destOrd="0" presId="urn:microsoft.com/office/officeart/2018/5/layout/IconCircleLabelList"/>
+    <dgm:cxn modelId="{9BA3A6D3-D987-4494-AF30-B316CF3E4AEF}" type="presParOf" srcId="{9849232E-E063-42A8-B903-54FDD5EE0258}" destId="{63CE11F4-4007-421B-AD0C-F758E6A8CFF1}" srcOrd="7" destOrd="0" presId="urn:microsoft.com/office/officeart/2018/5/layout/IconCircleLabelList"/>
+    <dgm:cxn modelId="{F5CFB95A-0253-4606-857E-15971A5334A8}" type="presParOf" srcId="{9849232E-E063-42A8-B903-54FDD5EE0258}" destId="{E2E1A40C-EA77-4109-8A55-1D7812637A05}" srcOrd="8" destOrd="0" presId="urn:microsoft.com/office/officeart/2018/5/layout/IconCircleLabelList"/>
+    <dgm:cxn modelId="{E64EFFDE-36E4-4266-BD49-8C7D82A957B2}" type="presParOf" srcId="{E2E1A40C-EA77-4109-8A55-1D7812637A05}" destId="{16C54867-7E4E-48F6-BD1D-3FCC95217046}" srcOrd="0" destOrd="0" presId="urn:microsoft.com/office/officeart/2018/5/layout/IconCircleLabelList"/>
+    <dgm:cxn modelId="{4A0D9958-7506-4119-B7D2-651B1CCE1659}" type="presParOf" srcId="{E2E1A40C-EA77-4109-8A55-1D7812637A05}" destId="{FDC2FA15-9C65-4FC9-8358-27138804CA9E}" srcOrd="1" destOrd="0" presId="urn:microsoft.com/office/officeart/2018/5/layout/IconCircleLabelList"/>
+    <dgm:cxn modelId="{0E7D132B-22C0-4717-B010-FAB2CCE12019}" type="presParOf" srcId="{E2E1A40C-EA77-4109-8A55-1D7812637A05}" destId="{DB1340B1-1720-45EA-8A13-D8B15DF51071}" srcOrd="2" destOrd="0" presId="urn:microsoft.com/office/officeart/2018/5/layout/IconCircleLabelList"/>
+    <dgm:cxn modelId="{CF51F3F7-44BF-446B-B50F-BC1A386114C8}" type="presParOf" srcId="{E2E1A40C-EA77-4109-8A55-1D7812637A05}" destId="{F9701E68-56E4-4803-BBB8-C8A3E2FC88CF}" srcOrd="3" destOrd="0" presId="urn:microsoft.com/office/officeart/2018/5/layout/IconCircleLabelList"/>
+    <dgm:cxn modelId="{C989C754-32C9-47BE-A2E7-8D4611DB0A11}" type="presParOf" srcId="{9849232E-E063-42A8-B903-54FDD5EE0258}" destId="{913FC135-41C5-47F6-8013-4E1DBA27AD79}" srcOrd="9" destOrd="0" presId="urn:microsoft.com/office/officeart/2018/5/layout/IconCircleLabelList"/>
+    <dgm:cxn modelId="{A66D1C92-5C40-45FD-9A38-075082B36DC2}" type="presParOf" srcId="{9849232E-E063-42A8-B903-54FDD5EE0258}" destId="{F1D597D2-04ED-4E75-B31E-8DFAD142DEAF}" srcOrd="10" destOrd="0" presId="urn:microsoft.com/office/officeart/2018/5/layout/IconCircleLabelList"/>
+    <dgm:cxn modelId="{B8EB6F16-76B1-4351-AB6D-4F336AE62F5F}" type="presParOf" srcId="{F1D597D2-04ED-4E75-B31E-8DFAD142DEAF}" destId="{D4A99554-9A76-4EFE-B691-850F3F24F166}" srcOrd="0" destOrd="0" presId="urn:microsoft.com/office/officeart/2018/5/layout/IconCircleLabelList"/>
+    <dgm:cxn modelId="{9931EEC6-D092-4771-9ADD-8FFBBFD3E7CE}" type="presParOf" srcId="{F1D597D2-04ED-4E75-B31E-8DFAD142DEAF}" destId="{BC4C1656-798D-432B-9FD6-753FF5CC11CA}" srcOrd="1" destOrd="0" presId="urn:microsoft.com/office/officeart/2018/5/layout/IconCircleLabelList"/>
+    <dgm:cxn modelId="{525F3705-0A8F-4DC7-AE14-997ED9FF16BC}" type="presParOf" srcId="{F1D597D2-04ED-4E75-B31E-8DFAD142DEAF}" destId="{CB1ABBDA-40B4-441C-A235-4C9A5B20D016}" srcOrd="2" destOrd="0" presId="urn:microsoft.com/office/officeart/2018/5/layout/IconCircleLabelList"/>
+    <dgm:cxn modelId="{90119A57-147F-4C9F-AAED-38DF790D99D2}" type="presParOf" srcId="{F1D597D2-04ED-4E75-B31E-8DFAD142DEAF}" destId="{2DF67815-24E2-4367-B0EA-6D1C9FBFA5DC}" srcOrd="3" destOrd="0" presId="urn:microsoft.com/office/officeart/2018/5/layout/IconCircleLabelList"/>
+    <dgm:cxn modelId="{C1D5F0F0-1C33-4756-93E2-6728370A9746}" type="presParOf" srcId="{9849232E-E063-42A8-B903-54FDD5EE0258}" destId="{2912B9F6-890A-4FB4-A6D2-B9CE9E0B61A0}" srcOrd="11" destOrd="0" presId="urn:microsoft.com/office/officeart/2018/5/layout/IconCircleLabelList"/>
+    <dgm:cxn modelId="{F5689388-C830-4856-89C0-49C76228EB7B}" type="presParOf" srcId="{9849232E-E063-42A8-B903-54FDD5EE0258}" destId="{152736B7-A416-43A6-AA2E-8A095FB2111E}" srcOrd="12" destOrd="0" presId="urn:microsoft.com/office/officeart/2018/5/layout/IconCircleLabelList"/>
+    <dgm:cxn modelId="{B3A57FEF-1741-4DFB-9AB4-9273075553E5}" type="presParOf" srcId="{152736B7-A416-43A6-AA2E-8A095FB2111E}" destId="{553AE206-E954-4455-9464-7F81419B6A85}" srcOrd="0" destOrd="0" presId="urn:microsoft.com/office/officeart/2018/5/layout/IconCircleLabelList"/>
+    <dgm:cxn modelId="{EB16ECDD-DB14-407C-AF94-5F5C5311B852}" type="presParOf" srcId="{152736B7-A416-43A6-AA2E-8A095FB2111E}" destId="{89E9C3DD-51F8-4A6F-B9BA-F34C1D8BA595}" srcOrd="1" destOrd="0" presId="urn:microsoft.com/office/officeart/2018/5/layout/IconCircleLabelList"/>
+    <dgm:cxn modelId="{ADA5AD95-4B5C-44E0-84ED-D7233301E243}" type="presParOf" srcId="{152736B7-A416-43A6-AA2E-8A095FB2111E}" destId="{938B1EA7-52D5-4C1F-B196-3D9FAEA81F9B}" srcOrd="2" destOrd="0" presId="urn:microsoft.com/office/officeart/2018/5/layout/IconCircleLabelList"/>
+    <dgm:cxn modelId="{9D93C37C-AC8A-44B7-BC15-029F531A9392}" type="presParOf" srcId="{152736B7-A416-43A6-AA2E-8A095FB2111E}" destId="{94C76434-9AB3-43B2-A1D0-E67C983BB965}" srcOrd="3" destOrd="0" presId="urn:microsoft.com/office/officeart/2018/5/layout/IconCircleLabelList"/>
   </dgm:cxnLst>
   <dgm:bg/>
   <dgm:whole/>
@@ -3687,43 +3848,34 @@
       <dsp:cNvGrpSpPr/>
     </dsp:nvGrpSpPr>
     <dsp:grpSpPr/>
-    <dsp:sp modelId="{0F5E5A5E-9866-41CB-8233-72330ABDAE47}">
+    <dsp:sp modelId="{13E3845A-E74F-4D7C-AF73-EA9EB7098537}">
       <dsp:nvSpPr>
         <dsp:cNvPr id="0" name=""/>
         <dsp:cNvSpPr/>
       </dsp:nvSpPr>
       <dsp:spPr>
         <a:xfrm>
-          <a:off x="0" y="259502"/>
-          <a:ext cx="10927829" cy="327600"/>
+          <a:off x="898829" y="288"/>
+          <a:ext cx="1001496" cy="1001496"/>
         </a:xfrm>
-        <a:prstGeom prst="rect">
+        <a:prstGeom prst="ellipse">
           <a:avLst/>
         </a:prstGeom>
         <a:solidFill>
-          <a:schemeClr val="lt1">
-            <a:alpha val="90000"/>
+          <a:schemeClr val="accent2">
             <a:hueOff val="0"/>
             <a:satOff val="0"/>
             <a:lumOff val="0"/>
             <a:alphaOff val="0"/>
           </a:schemeClr>
         </a:solidFill>
-        <a:ln w="25400" cap="flat" cmpd="sng" algn="ctr">
-          <a:solidFill>
-            <a:schemeClr val="accent2">
-              <a:hueOff val="0"/>
-              <a:satOff val="0"/>
-              <a:lumOff val="0"/>
-              <a:alphaOff val="0"/>
-            </a:schemeClr>
-          </a:solidFill>
-          <a:prstDash val="solid"/>
+        <a:ln>
+          <a:noFill/>
         </a:ln>
         <a:effectLst/>
       </dsp:spPr>
       <dsp:style>
-        <a:lnRef idx="2">
+        <a:lnRef idx="0">
           <a:scrgbClr r="0" g="0" b="0"/>
         </a:lnRef>
         <a:fillRef idx="1">
@@ -3735,37 +3887,36 @@
         <a:fontRef idx="minor"/>
       </dsp:style>
     </dsp:sp>
-    <dsp:sp modelId="{BA5AA5F1-E47A-4FB8-B976-36A847DAD87A}">
+    <dsp:sp modelId="{6D40F493-1913-45B2-88E7-012F3BAF2677}">
       <dsp:nvSpPr>
         <dsp:cNvPr id="0" name=""/>
         <dsp:cNvSpPr/>
       </dsp:nvSpPr>
       <dsp:spPr>
         <a:xfrm>
-          <a:off x="546391" y="67622"/>
-          <a:ext cx="7649480" cy="383760"/>
+          <a:off x="1112262" y="213721"/>
+          <a:ext cx="574628" cy="574628"/>
         </a:xfrm>
-        <a:prstGeom prst="roundRect">
+        <a:prstGeom prst="rect">
           <a:avLst/>
         </a:prstGeom>
-        <a:solidFill>
-          <a:schemeClr val="bg1">
-            <a:hueOff val="0"/>
-            <a:satOff val="0"/>
-            <a:lumOff val="0"/>
-            <a:alphaOff val="0"/>
-          </a:schemeClr>
-        </a:solidFill>
+        <a:blipFill>
+          <a:blip xmlns:r="http://schemas.openxmlformats.org/officeDocument/2006/relationships" r:embed="rId1">
+            <a:extLst>
+              <a:ext uri="{28A0092B-C50C-407E-A947-70E740481C1C}">
+                <a14:useLocalDpi xmlns:a14="http://schemas.microsoft.com/office/drawing/2010/main" val="0"/>
+              </a:ext>
+              <a:ext uri="{96DAC541-7B7A-43D3-8B79-37D633B846F1}">
+                <asvg:svgBlip xmlns:asvg="http://schemas.microsoft.com/office/drawing/2016/SVG/main" r:embed="rId2"/>
+              </a:ext>
+            </a:extLst>
+          </a:blip>
+          <a:stretch>
+            <a:fillRect/>
+          </a:stretch>
+        </a:blipFill>
         <a:ln w="25400" cap="flat" cmpd="sng" algn="ctr">
-          <a:solidFill>
-            <a:schemeClr val="lt1">
-              <a:alpha val="0"/>
-              <a:hueOff val="0"/>
-              <a:satOff val="0"/>
-              <a:lumOff val="0"/>
-              <a:alphaOff val="0"/>
-            </a:schemeClr>
-          </a:solidFill>
+          <a:noFill/>
           <a:prstDash val="solid"/>
         </a:ln>
         <a:effectLst/>
@@ -3784,13 +3935,45 @@
           <a:schemeClr val="lt1"/>
         </a:fontRef>
       </dsp:style>
+    </dsp:sp>
+    <dsp:sp modelId="{0B7D807E-8100-4BA7-A540-3BB8C8E08C4F}">
+      <dsp:nvSpPr>
+        <dsp:cNvPr id="0" name=""/>
+        <dsp:cNvSpPr/>
+      </dsp:nvSpPr>
+      <dsp:spPr>
+        <a:xfrm>
+          <a:off x="578678" y="1313725"/>
+          <a:ext cx="1641796" cy="656718"/>
+        </a:xfrm>
+        <a:prstGeom prst="rect">
+          <a:avLst/>
+        </a:prstGeom>
+        <a:noFill/>
+        <a:ln>
+          <a:noFill/>
+        </a:ln>
+        <a:effectLst/>
+      </dsp:spPr>
+      <dsp:style>
+        <a:lnRef idx="0">
+          <a:scrgbClr r="0" g="0" b="0"/>
+        </a:lnRef>
+        <a:fillRef idx="0">
+          <a:scrgbClr r="0" g="0" b="0"/>
+        </a:fillRef>
+        <a:effectRef idx="0">
+          <a:scrgbClr r="0" g="0" b="0"/>
+        </a:effectRef>
+        <a:fontRef idx="minor"/>
+      </dsp:style>
       <dsp:txBody>
-        <a:bodyPr spcFirstLastPara="0" vert="horz" wrap="square" lIns="289132" tIns="0" rIns="289132" bIns="0" numCol="1" spcCol="1270" anchor="ctr" anchorCtr="0">
+        <a:bodyPr spcFirstLastPara="0" vert="horz" wrap="square" lIns="0" tIns="0" rIns="0" bIns="0" numCol="1" spcCol="1270" anchor="t" anchorCtr="0">
           <a:noAutofit/>
         </a:bodyPr>
         <a:lstStyle/>
         <a:p>
-          <a:pPr marL="0" lvl="0" indent="0" algn="l" defTabSz="577850">
+          <a:pPr marL="0" lvl="0" indent="0" algn="ctr" defTabSz="622300">
             <a:lnSpc>
               <a:spcPct val="100000"/>
             </a:lnSpc>
@@ -3804,56 +3987,48 @@
             <a:defRPr cap="all"/>
           </a:pPr>
           <a:r>
-            <a:rPr lang="en-US" sz="1300" kern="1200" dirty="0">
-              <a:latin typeface="Arial"/>
+            <a:rPr lang="en-US" sz="1400" kern="1200">
+              <a:latin typeface="Roboto" panose="02000000000000000000" pitchFamily="2" charset="0"/>
+              <a:ea typeface="Roboto" panose="02000000000000000000" pitchFamily="2" charset="0"/>
+              <a:cs typeface="Roboto" panose="02000000000000000000" pitchFamily="2" charset="0"/>
             </a:rPr>
-            <a:t>Define outcomes</a:t>
+            <a:t>Define outcome</a:t>
           </a:r>
-          <a:endParaRPr lang="en-US" sz="1300" kern="1200" dirty="0"/>
         </a:p>
       </dsp:txBody>
       <dsp:txXfrm>
-        <a:off x="565125" y="86356"/>
-        <a:ext cx="7612012" cy="346292"/>
+        <a:off x="578678" y="1313725"/>
+        <a:ext cx="1641796" cy="656718"/>
       </dsp:txXfrm>
     </dsp:sp>
-    <dsp:sp modelId="{E6086B71-6D7B-4863-A7BF-EA47CE7D1DBC}">
+    <dsp:sp modelId="{100041F0-D592-4381-BBDE-95924ABE18E9}">
       <dsp:nvSpPr>
         <dsp:cNvPr id="0" name=""/>
         <dsp:cNvSpPr/>
       </dsp:nvSpPr>
       <dsp:spPr>
         <a:xfrm>
-          <a:off x="0" y="849182"/>
-          <a:ext cx="10927829" cy="327600"/>
+          <a:off x="2827940" y="288"/>
+          <a:ext cx="1001496" cy="1001496"/>
         </a:xfrm>
-        <a:prstGeom prst="rect">
+        <a:prstGeom prst="ellipse">
           <a:avLst/>
         </a:prstGeom>
         <a:solidFill>
-          <a:schemeClr val="lt1">
-            <a:alpha val="90000"/>
+          <a:schemeClr val="accent3">
             <a:hueOff val="0"/>
             <a:satOff val="0"/>
             <a:lumOff val="0"/>
             <a:alphaOff val="0"/>
           </a:schemeClr>
         </a:solidFill>
-        <a:ln w="25400" cap="flat" cmpd="sng" algn="ctr">
-          <a:solidFill>
-            <a:schemeClr val="accent3">
-              <a:hueOff val="0"/>
-              <a:satOff val="0"/>
-              <a:lumOff val="0"/>
-              <a:alphaOff val="0"/>
-            </a:schemeClr>
-          </a:solidFill>
-          <a:prstDash val="solid"/>
+        <a:ln>
+          <a:noFill/>
         </a:ln>
         <a:effectLst/>
       </dsp:spPr>
       <dsp:style>
-        <a:lnRef idx="2">
+        <a:lnRef idx="0">
           <a:scrgbClr r="0" g="0" b="0"/>
         </a:lnRef>
         <a:fillRef idx="1">
@@ -3865,37 +4040,36 @@
         <a:fontRef idx="minor"/>
       </dsp:style>
     </dsp:sp>
-    <dsp:sp modelId="{44875EEC-8ECA-4D50-A4E1-27923C5B6CC8}">
+    <dsp:sp modelId="{970DD013-2FB2-4564-A92D-FAD254037933}">
       <dsp:nvSpPr>
         <dsp:cNvPr id="0" name=""/>
         <dsp:cNvSpPr/>
       </dsp:nvSpPr>
       <dsp:spPr>
         <a:xfrm>
-          <a:off x="546391" y="657302"/>
-          <a:ext cx="7649480" cy="383760"/>
+          <a:off x="3041374" y="213721"/>
+          <a:ext cx="574628" cy="574628"/>
         </a:xfrm>
-        <a:prstGeom prst="roundRect">
+        <a:prstGeom prst="rect">
           <a:avLst/>
         </a:prstGeom>
-        <a:solidFill>
-          <a:schemeClr val="bg1">
-            <a:hueOff val="0"/>
-            <a:satOff val="0"/>
-            <a:lumOff val="0"/>
-            <a:alphaOff val="0"/>
-          </a:schemeClr>
-        </a:solidFill>
+        <a:blipFill>
+          <a:blip xmlns:r="http://schemas.openxmlformats.org/officeDocument/2006/relationships" r:embed="rId3">
+            <a:extLst>
+              <a:ext uri="{28A0092B-C50C-407E-A947-70E740481C1C}">
+                <a14:useLocalDpi xmlns:a14="http://schemas.microsoft.com/office/drawing/2010/main" val="0"/>
+              </a:ext>
+              <a:ext uri="{96DAC541-7B7A-43D3-8B79-37D633B846F1}">
+                <asvg:svgBlip xmlns:asvg="http://schemas.microsoft.com/office/drawing/2016/SVG/main" r:embed="rId4"/>
+              </a:ext>
+            </a:extLst>
+          </a:blip>
+          <a:stretch>
+            <a:fillRect/>
+          </a:stretch>
+        </a:blipFill>
         <a:ln w="25400" cap="flat" cmpd="sng" algn="ctr">
-          <a:solidFill>
-            <a:schemeClr val="lt1">
-              <a:alpha val="0"/>
-              <a:hueOff val="0"/>
-              <a:satOff val="0"/>
-              <a:lumOff val="0"/>
-              <a:alphaOff val="0"/>
-            </a:schemeClr>
-          </a:solidFill>
+          <a:noFill/>
           <a:prstDash val="solid"/>
         </a:ln>
         <a:effectLst/>
@@ -3914,13 +4088,45 @@
           <a:schemeClr val="lt1"/>
         </a:fontRef>
       </dsp:style>
+    </dsp:sp>
+    <dsp:sp modelId="{6851D58B-B76B-4D64-9B59-183B32CAB374}">
+      <dsp:nvSpPr>
+        <dsp:cNvPr id="0" name=""/>
+        <dsp:cNvSpPr/>
+      </dsp:nvSpPr>
+      <dsp:spPr>
+        <a:xfrm>
+          <a:off x="2507790" y="1313725"/>
+          <a:ext cx="1641796" cy="656718"/>
+        </a:xfrm>
+        <a:prstGeom prst="rect">
+          <a:avLst/>
+        </a:prstGeom>
+        <a:noFill/>
+        <a:ln>
+          <a:noFill/>
+        </a:ln>
+        <a:effectLst/>
+      </dsp:spPr>
+      <dsp:style>
+        <a:lnRef idx="0">
+          <a:scrgbClr r="0" g="0" b="0"/>
+        </a:lnRef>
+        <a:fillRef idx="0">
+          <a:scrgbClr r="0" g="0" b="0"/>
+        </a:fillRef>
+        <a:effectRef idx="0">
+          <a:scrgbClr r="0" g="0" b="0"/>
+        </a:effectRef>
+        <a:fontRef idx="minor"/>
+      </dsp:style>
       <dsp:txBody>
-        <a:bodyPr spcFirstLastPara="0" vert="horz" wrap="square" lIns="289132" tIns="0" rIns="289132" bIns="0" numCol="1" spcCol="1270" anchor="ctr" anchorCtr="0">
+        <a:bodyPr spcFirstLastPara="0" vert="horz" wrap="square" lIns="0" tIns="0" rIns="0" bIns="0" numCol="1" spcCol="1270" anchor="t" anchorCtr="0">
           <a:noAutofit/>
         </a:bodyPr>
         <a:lstStyle/>
         <a:p>
-          <a:pPr marL="0" lvl="0" indent="0" algn="l" defTabSz="577850">
+          <a:pPr marL="0" lvl="0" indent="0" algn="ctr" defTabSz="622300">
             <a:lnSpc>
               <a:spcPct val="100000"/>
             </a:lnSpc>
@@ -3934,56 +4140,48 @@
             <a:defRPr cap="all"/>
           </a:pPr>
           <a:r>
-            <a:rPr lang="en-US" sz="1300" kern="1200" dirty="0">
-              <a:latin typeface="Arial"/>
+            <a:rPr lang="en-US" sz="1400" kern="1200">
+              <a:latin typeface="Roboto" panose="02000000000000000000" pitchFamily="2" charset="0"/>
+              <a:ea typeface="Roboto" panose="02000000000000000000" pitchFamily="2" charset="0"/>
+              <a:cs typeface="Roboto" panose="02000000000000000000" pitchFamily="2" charset="0"/>
             </a:rPr>
             <a:t>Order components</a:t>
           </a:r>
-          <a:endParaRPr lang="en-US" sz="1300" kern="1200" dirty="0"/>
         </a:p>
       </dsp:txBody>
       <dsp:txXfrm>
-        <a:off x="565125" y="676036"/>
-        <a:ext cx="7612012" cy="346292"/>
+        <a:off x="2507790" y="1313725"/>
+        <a:ext cx="1641796" cy="656718"/>
       </dsp:txXfrm>
     </dsp:sp>
-    <dsp:sp modelId="{4406C653-0582-4FB0-95DA-3F737B75C4CE}">
+    <dsp:sp modelId="{99D7F73A-56A1-4205-9F9F-82B81EC01F8B}">
       <dsp:nvSpPr>
         <dsp:cNvPr id="0" name=""/>
         <dsp:cNvSpPr/>
       </dsp:nvSpPr>
       <dsp:spPr>
         <a:xfrm>
-          <a:off x="0" y="1438862"/>
-          <a:ext cx="10927829" cy="327600"/>
+          <a:off x="4757051" y="288"/>
+          <a:ext cx="1001496" cy="1001496"/>
         </a:xfrm>
-        <a:prstGeom prst="rect">
+        <a:prstGeom prst="ellipse">
           <a:avLst/>
         </a:prstGeom>
         <a:solidFill>
-          <a:schemeClr val="lt1">
-            <a:alpha val="90000"/>
+          <a:schemeClr val="accent4">
             <a:hueOff val="0"/>
             <a:satOff val="0"/>
             <a:lumOff val="0"/>
             <a:alphaOff val="0"/>
           </a:schemeClr>
         </a:solidFill>
-        <a:ln w="25400" cap="flat" cmpd="sng" algn="ctr">
-          <a:solidFill>
-            <a:schemeClr val="accent4">
-              <a:hueOff val="0"/>
-              <a:satOff val="0"/>
-              <a:lumOff val="0"/>
-              <a:alphaOff val="0"/>
-            </a:schemeClr>
-          </a:solidFill>
-          <a:prstDash val="solid"/>
+        <a:ln>
+          <a:noFill/>
         </a:ln>
         <a:effectLst/>
       </dsp:spPr>
       <dsp:style>
-        <a:lnRef idx="2">
+        <a:lnRef idx="0">
           <a:scrgbClr r="0" g="0" b="0"/>
         </a:lnRef>
         <a:fillRef idx="1">
@@ -3995,37 +4193,36 @@
         <a:fontRef idx="minor"/>
       </dsp:style>
     </dsp:sp>
-    <dsp:sp modelId="{DC3D1A65-1D29-4E72-9C45-9F6D2632FB43}">
+    <dsp:sp modelId="{2FA72BE5-98B8-4455-AEA5-7356812963B1}">
       <dsp:nvSpPr>
         <dsp:cNvPr id="0" name=""/>
         <dsp:cNvSpPr/>
       </dsp:nvSpPr>
       <dsp:spPr>
         <a:xfrm>
-          <a:off x="546391" y="1246982"/>
-          <a:ext cx="7649480" cy="383760"/>
+          <a:off x="4970485" y="213721"/>
+          <a:ext cx="574628" cy="574628"/>
         </a:xfrm>
-        <a:prstGeom prst="roundRect">
+        <a:prstGeom prst="rect">
           <a:avLst/>
         </a:prstGeom>
-        <a:solidFill>
-          <a:schemeClr val="bg1">
-            <a:hueOff val="0"/>
-            <a:satOff val="0"/>
-            <a:lumOff val="0"/>
-            <a:alphaOff val="0"/>
-          </a:schemeClr>
-        </a:solidFill>
+        <a:blipFill>
+          <a:blip xmlns:r="http://schemas.openxmlformats.org/officeDocument/2006/relationships" r:embed="rId5">
+            <a:extLst>
+              <a:ext uri="{28A0092B-C50C-407E-A947-70E740481C1C}">
+                <a14:useLocalDpi xmlns:a14="http://schemas.microsoft.com/office/drawing/2010/main" val="0"/>
+              </a:ext>
+              <a:ext uri="{96DAC541-7B7A-43D3-8B79-37D633B846F1}">
+                <asvg:svgBlip xmlns:asvg="http://schemas.microsoft.com/office/drawing/2016/SVG/main" r:embed="rId6"/>
+              </a:ext>
+            </a:extLst>
+          </a:blip>
+          <a:stretch>
+            <a:fillRect/>
+          </a:stretch>
+        </a:blipFill>
         <a:ln w="25400" cap="flat" cmpd="sng" algn="ctr">
-          <a:solidFill>
-            <a:schemeClr val="lt1">
-              <a:alpha val="0"/>
-              <a:hueOff val="0"/>
-              <a:satOff val="0"/>
-              <a:lumOff val="0"/>
-              <a:alphaOff val="0"/>
-            </a:schemeClr>
-          </a:solidFill>
+          <a:noFill/>
           <a:prstDash val="solid"/>
         </a:ln>
         <a:effectLst/>
@@ -4044,13 +4241,45 @@
           <a:schemeClr val="lt1"/>
         </a:fontRef>
       </dsp:style>
+    </dsp:sp>
+    <dsp:sp modelId="{87474B1A-1A16-4C6C-91D5-09F949F76942}">
+      <dsp:nvSpPr>
+        <dsp:cNvPr id="0" name=""/>
+        <dsp:cNvSpPr/>
+      </dsp:nvSpPr>
+      <dsp:spPr>
+        <a:xfrm>
+          <a:off x="4436901" y="1313725"/>
+          <a:ext cx="1641796" cy="656718"/>
+        </a:xfrm>
+        <a:prstGeom prst="rect">
+          <a:avLst/>
+        </a:prstGeom>
+        <a:noFill/>
+        <a:ln>
+          <a:noFill/>
+        </a:ln>
+        <a:effectLst/>
+      </dsp:spPr>
+      <dsp:style>
+        <a:lnRef idx="0">
+          <a:scrgbClr r="0" g="0" b="0"/>
+        </a:lnRef>
+        <a:fillRef idx="0">
+          <a:scrgbClr r="0" g="0" b="0"/>
+        </a:fillRef>
+        <a:effectRef idx="0">
+          <a:scrgbClr r="0" g="0" b="0"/>
+        </a:effectRef>
+        <a:fontRef idx="minor"/>
+      </dsp:style>
       <dsp:txBody>
-        <a:bodyPr spcFirstLastPara="0" vert="horz" wrap="square" lIns="289132" tIns="0" rIns="289132" bIns="0" numCol="1" spcCol="1270" anchor="ctr" anchorCtr="0">
+        <a:bodyPr spcFirstLastPara="0" vert="horz" wrap="square" lIns="0" tIns="0" rIns="0" bIns="0" numCol="1" spcCol="1270" anchor="t" anchorCtr="0">
           <a:noAutofit/>
         </a:bodyPr>
         <a:lstStyle/>
         <a:p>
-          <a:pPr marL="0" lvl="0" indent="0" algn="l" defTabSz="577850">
+          <a:pPr marL="0" lvl="0" indent="0" algn="ctr" defTabSz="622300">
             <a:lnSpc>
               <a:spcPct val="100000"/>
             </a:lnSpc>
@@ -4064,56 +4293,48 @@
             <a:defRPr cap="all"/>
           </a:pPr>
           <a:r>
-            <a:rPr lang="en-US" sz="1300" kern="1200" dirty="0">
-              <a:latin typeface="Arial"/>
+            <a:rPr lang="en-US" sz="1400" kern="1200">
+              <a:latin typeface="Roboto" panose="02000000000000000000" pitchFamily="2" charset="0"/>
+              <a:ea typeface="Roboto" panose="02000000000000000000" pitchFamily="2" charset="0"/>
+              <a:cs typeface="Roboto" panose="02000000000000000000" pitchFamily="2" charset="0"/>
             </a:rPr>
-            <a:t>Sensor Device &amp; Hub</a:t>
+            <a:t>Sensor Hub</a:t>
           </a:r>
-          <a:endParaRPr lang="en-US" sz="1300" kern="1200" dirty="0"/>
         </a:p>
       </dsp:txBody>
       <dsp:txXfrm>
-        <a:off x="565125" y="1265716"/>
-        <a:ext cx="7612012" cy="346292"/>
+        <a:off x="4436901" y="1313725"/>
+        <a:ext cx="1641796" cy="656718"/>
       </dsp:txXfrm>
     </dsp:sp>
-    <dsp:sp modelId="{AB2D1138-BE37-4A31-AB90-F157D49ED5F7}">
+    <dsp:sp modelId="{C8FDCBBD-AF10-49BF-83DA-3EE5B7D96CD7}">
       <dsp:nvSpPr>
         <dsp:cNvPr id="0" name=""/>
         <dsp:cNvSpPr/>
       </dsp:nvSpPr>
       <dsp:spPr>
         <a:xfrm>
-          <a:off x="0" y="2028542"/>
-          <a:ext cx="10927829" cy="327600"/>
+          <a:off x="6686163" y="288"/>
+          <a:ext cx="1001496" cy="1001496"/>
         </a:xfrm>
-        <a:prstGeom prst="rect">
+        <a:prstGeom prst="ellipse">
           <a:avLst/>
         </a:prstGeom>
         <a:solidFill>
-          <a:schemeClr val="lt1">
-            <a:alpha val="90000"/>
+          <a:schemeClr val="accent5">
             <a:hueOff val="0"/>
             <a:satOff val="0"/>
             <a:lumOff val="0"/>
             <a:alphaOff val="0"/>
           </a:schemeClr>
         </a:solidFill>
-        <a:ln w="25400" cap="flat" cmpd="sng" algn="ctr">
-          <a:solidFill>
-            <a:schemeClr val="accent5">
-              <a:hueOff val="0"/>
-              <a:satOff val="0"/>
-              <a:lumOff val="0"/>
-              <a:alphaOff val="0"/>
-            </a:schemeClr>
-          </a:solidFill>
-          <a:prstDash val="solid"/>
+        <a:ln>
+          <a:noFill/>
         </a:ln>
         <a:effectLst/>
       </dsp:spPr>
       <dsp:style>
-        <a:lnRef idx="2">
+        <a:lnRef idx="0">
           <a:scrgbClr r="0" g="0" b="0"/>
         </a:lnRef>
         <a:fillRef idx="1">
@@ -4125,37 +4346,36 @@
         <a:fontRef idx="minor"/>
       </dsp:style>
     </dsp:sp>
-    <dsp:sp modelId="{F8C0326A-C9E7-4E95-A031-80AE228EAFD4}">
+    <dsp:sp modelId="{8F50F382-9A36-4F8E-83EE-29C499B0AEC7}">
       <dsp:nvSpPr>
         <dsp:cNvPr id="0" name=""/>
         <dsp:cNvSpPr/>
       </dsp:nvSpPr>
       <dsp:spPr>
         <a:xfrm>
-          <a:off x="546391" y="1836662"/>
-          <a:ext cx="7649480" cy="383760"/>
+          <a:off x="6899596" y="213721"/>
+          <a:ext cx="574628" cy="574628"/>
         </a:xfrm>
-        <a:prstGeom prst="roundRect">
+        <a:prstGeom prst="rect">
           <a:avLst/>
         </a:prstGeom>
-        <a:solidFill>
-          <a:schemeClr val="bg1">
-            <a:hueOff val="0"/>
-            <a:satOff val="0"/>
-            <a:lumOff val="0"/>
-            <a:alphaOff val="0"/>
-          </a:schemeClr>
-        </a:solidFill>
+        <a:blipFill>
+          <a:blip xmlns:r="http://schemas.openxmlformats.org/officeDocument/2006/relationships" r:embed="rId7">
+            <a:extLst>
+              <a:ext uri="{28A0092B-C50C-407E-A947-70E740481C1C}">
+                <a14:useLocalDpi xmlns:a14="http://schemas.microsoft.com/office/drawing/2010/main" val="0"/>
+              </a:ext>
+              <a:ext uri="{96DAC541-7B7A-43D3-8B79-37D633B846F1}">
+                <asvg:svgBlip xmlns:asvg="http://schemas.microsoft.com/office/drawing/2016/SVG/main" r:embed="rId8"/>
+              </a:ext>
+            </a:extLst>
+          </a:blip>
+          <a:stretch>
+            <a:fillRect/>
+          </a:stretch>
+        </a:blipFill>
         <a:ln w="25400" cap="flat" cmpd="sng" algn="ctr">
-          <a:solidFill>
-            <a:schemeClr val="lt1">
-              <a:alpha val="0"/>
-              <a:hueOff val="0"/>
-              <a:satOff val="0"/>
-              <a:lumOff val="0"/>
-              <a:alphaOff val="0"/>
-            </a:schemeClr>
-          </a:solidFill>
+          <a:noFill/>
           <a:prstDash val="solid"/>
         </a:ln>
         <a:effectLst/>
@@ -4174,13 +4394,45 @@
           <a:schemeClr val="lt1"/>
         </a:fontRef>
       </dsp:style>
+    </dsp:sp>
+    <dsp:sp modelId="{C73D5BC5-414C-4A26-BC46-285A527222F8}">
+      <dsp:nvSpPr>
+        <dsp:cNvPr id="0" name=""/>
+        <dsp:cNvSpPr/>
+      </dsp:nvSpPr>
+      <dsp:spPr>
+        <a:xfrm>
+          <a:off x="6366012" y="1313725"/>
+          <a:ext cx="1641796" cy="656718"/>
+        </a:xfrm>
+        <a:prstGeom prst="rect">
+          <a:avLst/>
+        </a:prstGeom>
+        <a:noFill/>
+        <a:ln>
+          <a:noFill/>
+        </a:ln>
+        <a:effectLst/>
+      </dsp:spPr>
+      <dsp:style>
+        <a:lnRef idx="0">
+          <a:scrgbClr r="0" g="0" b="0"/>
+        </a:lnRef>
+        <a:fillRef idx="0">
+          <a:scrgbClr r="0" g="0" b="0"/>
+        </a:fillRef>
+        <a:effectRef idx="0">
+          <a:scrgbClr r="0" g="0" b="0"/>
+        </a:effectRef>
+        <a:fontRef idx="minor"/>
+      </dsp:style>
       <dsp:txBody>
-        <a:bodyPr spcFirstLastPara="0" vert="horz" wrap="square" lIns="289132" tIns="0" rIns="289132" bIns="0" numCol="1" spcCol="1270" anchor="ctr" anchorCtr="0">
+        <a:bodyPr spcFirstLastPara="0" vert="horz" wrap="square" lIns="0" tIns="0" rIns="0" bIns="0" numCol="1" spcCol="1270" anchor="t" anchorCtr="0">
           <a:noAutofit/>
         </a:bodyPr>
         <a:lstStyle/>
         <a:p>
-          <a:pPr marL="0" lvl="0" indent="0" algn="l" defTabSz="577850">
+          <a:pPr marL="0" lvl="0" indent="0" algn="ctr" defTabSz="622300">
             <a:lnSpc>
               <a:spcPct val="100000"/>
             </a:lnSpc>
@@ -4194,55 +4446,48 @@
             <a:defRPr cap="all"/>
           </a:pPr>
           <a:r>
-            <a:rPr lang="en-US" sz="1300" kern="1200" dirty="0">
-              <a:latin typeface="Arial"/>
+            <a:rPr lang="en-US" sz="1400" kern="1200">
+              <a:latin typeface="Roboto" panose="02000000000000000000" pitchFamily="2" charset="0"/>
+              <a:ea typeface="Roboto" panose="02000000000000000000" pitchFamily="2" charset="0"/>
+              <a:cs typeface="Roboto" panose="02000000000000000000" pitchFamily="2" charset="0"/>
             </a:rPr>
             <a:t>Battery management system</a:t>
           </a:r>
         </a:p>
       </dsp:txBody>
       <dsp:txXfrm>
-        <a:off x="565125" y="1855396"/>
-        <a:ext cx="7612012" cy="346292"/>
+        <a:off x="6366012" y="1313725"/>
+        <a:ext cx="1641796" cy="656718"/>
       </dsp:txXfrm>
     </dsp:sp>
-    <dsp:sp modelId="{27FBFBBA-48BD-47CA-A69E-70565ED07582}">
+    <dsp:sp modelId="{16C54867-7E4E-48F6-BD1D-3FCC95217046}">
       <dsp:nvSpPr>
         <dsp:cNvPr id="0" name=""/>
         <dsp:cNvSpPr/>
       </dsp:nvSpPr>
       <dsp:spPr>
         <a:xfrm>
-          <a:off x="0" y="2618222"/>
-          <a:ext cx="10927829" cy="327600"/>
+          <a:off x="8615274" y="288"/>
+          <a:ext cx="1001496" cy="1001496"/>
         </a:xfrm>
-        <a:prstGeom prst="rect">
+        <a:prstGeom prst="ellipse">
           <a:avLst/>
         </a:prstGeom>
         <a:solidFill>
-          <a:schemeClr val="lt1">
-            <a:alpha val="90000"/>
+          <a:schemeClr val="accent6">
             <a:hueOff val="0"/>
             <a:satOff val="0"/>
             <a:lumOff val="0"/>
             <a:alphaOff val="0"/>
           </a:schemeClr>
         </a:solidFill>
-        <a:ln w="25400" cap="flat" cmpd="sng" algn="ctr">
-          <a:solidFill>
-            <a:schemeClr val="accent6">
-              <a:hueOff val="0"/>
-              <a:satOff val="0"/>
-              <a:lumOff val="0"/>
-              <a:alphaOff val="0"/>
-            </a:schemeClr>
-          </a:solidFill>
-          <a:prstDash val="solid"/>
+        <a:ln>
+          <a:noFill/>
         </a:ln>
         <a:effectLst/>
       </dsp:spPr>
       <dsp:style>
-        <a:lnRef idx="2">
+        <a:lnRef idx="0">
           <a:scrgbClr r="0" g="0" b="0"/>
         </a:lnRef>
         <a:fillRef idx="1">
@@ -4254,37 +4499,36 @@
         <a:fontRef idx="minor"/>
       </dsp:style>
     </dsp:sp>
-    <dsp:sp modelId="{F378BC6A-9100-4D79-8A54-B5290990E114}">
+    <dsp:sp modelId="{FDC2FA15-9C65-4FC9-8358-27138804CA9E}">
       <dsp:nvSpPr>
         <dsp:cNvPr id="0" name=""/>
         <dsp:cNvSpPr/>
       </dsp:nvSpPr>
       <dsp:spPr>
         <a:xfrm>
-          <a:off x="546391" y="2426342"/>
-          <a:ext cx="7649480" cy="383760"/>
+          <a:off x="8828708" y="213721"/>
+          <a:ext cx="574628" cy="574628"/>
         </a:xfrm>
-        <a:prstGeom prst="roundRect">
+        <a:prstGeom prst="rect">
           <a:avLst/>
         </a:prstGeom>
-        <a:solidFill>
-          <a:schemeClr val="bg1">
-            <a:hueOff val="0"/>
-            <a:satOff val="0"/>
-            <a:lumOff val="0"/>
-            <a:alphaOff val="0"/>
-          </a:schemeClr>
-        </a:solidFill>
+        <a:blipFill>
+          <a:blip xmlns:r="http://schemas.openxmlformats.org/officeDocument/2006/relationships" r:embed="rId9">
+            <a:extLst>
+              <a:ext uri="{28A0092B-C50C-407E-A947-70E740481C1C}">
+                <a14:useLocalDpi xmlns:a14="http://schemas.microsoft.com/office/drawing/2010/main" val="0"/>
+              </a:ext>
+              <a:ext uri="{96DAC541-7B7A-43D3-8B79-37D633B846F1}">
+                <asvg:svgBlip xmlns:asvg="http://schemas.microsoft.com/office/drawing/2016/SVG/main" r:embed="rId10"/>
+              </a:ext>
+            </a:extLst>
+          </a:blip>
+          <a:stretch>
+            <a:fillRect/>
+          </a:stretch>
+        </a:blipFill>
         <a:ln w="25400" cap="flat" cmpd="sng" algn="ctr">
-          <a:solidFill>
-            <a:schemeClr val="lt1">
-              <a:alpha val="0"/>
-              <a:hueOff val="0"/>
-              <a:satOff val="0"/>
-              <a:lumOff val="0"/>
-              <a:alphaOff val="0"/>
-            </a:schemeClr>
-          </a:solidFill>
+          <a:noFill/>
           <a:prstDash val="solid"/>
         </a:ln>
         <a:effectLst/>
@@ -4303,13 +4547,45 @@
           <a:schemeClr val="lt1"/>
         </a:fontRef>
       </dsp:style>
+    </dsp:sp>
+    <dsp:sp modelId="{F9701E68-56E4-4803-BBB8-C8A3E2FC88CF}">
+      <dsp:nvSpPr>
+        <dsp:cNvPr id="0" name=""/>
+        <dsp:cNvSpPr/>
+      </dsp:nvSpPr>
+      <dsp:spPr>
+        <a:xfrm>
+          <a:off x="8295124" y="1313725"/>
+          <a:ext cx="1641796" cy="656718"/>
+        </a:xfrm>
+        <a:prstGeom prst="rect">
+          <a:avLst/>
+        </a:prstGeom>
+        <a:noFill/>
+        <a:ln>
+          <a:noFill/>
+        </a:ln>
+        <a:effectLst/>
+      </dsp:spPr>
+      <dsp:style>
+        <a:lnRef idx="0">
+          <a:scrgbClr r="0" g="0" b="0"/>
+        </a:lnRef>
+        <a:fillRef idx="0">
+          <a:scrgbClr r="0" g="0" b="0"/>
+        </a:fillRef>
+        <a:effectRef idx="0">
+          <a:scrgbClr r="0" g="0" b="0"/>
+        </a:effectRef>
+        <a:fontRef idx="minor"/>
+      </dsp:style>
       <dsp:txBody>
-        <a:bodyPr spcFirstLastPara="0" vert="horz" wrap="square" lIns="289132" tIns="0" rIns="289132" bIns="0" numCol="1" spcCol="1270" anchor="ctr" anchorCtr="0">
+        <a:bodyPr spcFirstLastPara="0" vert="horz" wrap="square" lIns="0" tIns="0" rIns="0" bIns="0" numCol="1" spcCol="1270" anchor="t" anchorCtr="0">
           <a:noAutofit/>
         </a:bodyPr>
         <a:lstStyle/>
         <a:p>
-          <a:pPr marL="0" lvl="0" indent="0" algn="l" defTabSz="577850">
+          <a:pPr marL="0" lvl="0" indent="0" algn="ctr" defTabSz="622300">
             <a:lnSpc>
               <a:spcPct val="100000"/>
             </a:lnSpc>
@@ -4323,55 +4599,48 @@
             <a:defRPr cap="all"/>
           </a:pPr>
           <a:r>
-            <a:rPr lang="en-US" sz="1300" kern="1200">
-              <a:latin typeface="Arial"/>
+            <a:rPr lang="en-US" sz="1400" kern="1200">
+              <a:latin typeface="Roboto" panose="02000000000000000000" pitchFamily="2" charset="0"/>
+              <a:ea typeface="Roboto" panose="02000000000000000000" pitchFamily="2" charset="0"/>
+              <a:cs typeface="Roboto" panose="02000000000000000000" pitchFamily="2" charset="0"/>
             </a:rPr>
             <a:t>Create a PCB </a:t>
           </a:r>
         </a:p>
       </dsp:txBody>
       <dsp:txXfrm>
-        <a:off x="565125" y="2445076"/>
-        <a:ext cx="7612012" cy="346292"/>
+        <a:off x="8295124" y="1313725"/>
+        <a:ext cx="1641796" cy="656718"/>
       </dsp:txXfrm>
     </dsp:sp>
-    <dsp:sp modelId="{BC7BFDC9-CAF2-4AE7-BFDD-68C259D8F1C3}">
+    <dsp:sp modelId="{D4A99554-9A76-4EFE-B691-850F3F24F166}">
       <dsp:nvSpPr>
         <dsp:cNvPr id="0" name=""/>
         <dsp:cNvSpPr/>
       </dsp:nvSpPr>
       <dsp:spPr>
         <a:xfrm>
-          <a:off x="0" y="3207902"/>
-          <a:ext cx="10927829" cy="327600"/>
+          <a:off x="3792496" y="2380893"/>
+          <a:ext cx="1001496" cy="1001496"/>
         </a:xfrm>
-        <a:prstGeom prst="rect">
+        <a:prstGeom prst="ellipse">
           <a:avLst/>
         </a:prstGeom>
         <a:solidFill>
-          <a:schemeClr val="lt1">
-            <a:alpha val="90000"/>
+          <a:schemeClr val="accent2">
             <a:hueOff val="0"/>
             <a:satOff val="0"/>
             <a:lumOff val="0"/>
             <a:alphaOff val="0"/>
           </a:schemeClr>
         </a:solidFill>
-        <a:ln w="25400" cap="flat" cmpd="sng" algn="ctr">
-          <a:solidFill>
-            <a:schemeClr val="accent2">
-              <a:hueOff val="0"/>
-              <a:satOff val="0"/>
-              <a:lumOff val="0"/>
-              <a:alphaOff val="0"/>
-            </a:schemeClr>
-          </a:solidFill>
-          <a:prstDash val="solid"/>
+        <a:ln>
+          <a:noFill/>
         </a:ln>
         <a:effectLst/>
       </dsp:spPr>
       <dsp:style>
-        <a:lnRef idx="2">
+        <a:lnRef idx="0">
           <a:scrgbClr r="0" g="0" b="0"/>
         </a:lnRef>
         <a:fillRef idx="1">
@@ -4383,37 +4652,36 @@
         <a:fontRef idx="minor"/>
       </dsp:style>
     </dsp:sp>
-    <dsp:sp modelId="{9941594D-02B6-4D53-A97D-D05A77024F6B}">
+    <dsp:sp modelId="{BC4C1656-798D-432B-9FD6-753FF5CC11CA}">
       <dsp:nvSpPr>
         <dsp:cNvPr id="0" name=""/>
         <dsp:cNvSpPr/>
       </dsp:nvSpPr>
       <dsp:spPr>
         <a:xfrm>
-          <a:off x="546391" y="3016022"/>
-          <a:ext cx="7649480" cy="383760"/>
+          <a:off x="4005929" y="2594327"/>
+          <a:ext cx="574628" cy="574628"/>
         </a:xfrm>
-        <a:prstGeom prst="roundRect">
+        <a:prstGeom prst="rect">
           <a:avLst/>
         </a:prstGeom>
-        <a:solidFill>
-          <a:schemeClr val="bg1">
-            <a:hueOff val="0"/>
-            <a:satOff val="0"/>
-            <a:lumOff val="0"/>
-            <a:alphaOff val="0"/>
-          </a:schemeClr>
-        </a:solidFill>
+        <a:blipFill>
+          <a:blip xmlns:r="http://schemas.openxmlformats.org/officeDocument/2006/relationships" r:embed="rId11">
+            <a:extLst>
+              <a:ext uri="{28A0092B-C50C-407E-A947-70E740481C1C}">
+                <a14:useLocalDpi xmlns:a14="http://schemas.microsoft.com/office/drawing/2010/main" val="0"/>
+              </a:ext>
+              <a:ext uri="{96DAC541-7B7A-43D3-8B79-37D633B846F1}">
+                <asvg:svgBlip xmlns:asvg="http://schemas.microsoft.com/office/drawing/2016/SVG/main" r:embed="rId12"/>
+              </a:ext>
+            </a:extLst>
+          </a:blip>
+          <a:stretch>
+            <a:fillRect/>
+          </a:stretch>
+        </a:blipFill>
         <a:ln w="25400" cap="flat" cmpd="sng" algn="ctr">
-          <a:solidFill>
-            <a:schemeClr val="lt1">
-              <a:alpha val="0"/>
-              <a:hueOff val="0"/>
-              <a:satOff val="0"/>
-              <a:lumOff val="0"/>
-              <a:alphaOff val="0"/>
-            </a:schemeClr>
-          </a:solidFill>
+          <a:noFill/>
           <a:prstDash val="solid"/>
         </a:ln>
         <a:effectLst/>
@@ -4432,13 +4700,45 @@
           <a:schemeClr val="lt1"/>
         </a:fontRef>
       </dsp:style>
+    </dsp:sp>
+    <dsp:sp modelId="{2DF67815-24E2-4367-B0EA-6D1C9FBFA5DC}">
+      <dsp:nvSpPr>
+        <dsp:cNvPr id="0" name=""/>
+        <dsp:cNvSpPr/>
+      </dsp:nvSpPr>
+      <dsp:spPr>
+        <a:xfrm>
+          <a:off x="3472345" y="3694331"/>
+          <a:ext cx="1641796" cy="656718"/>
+        </a:xfrm>
+        <a:prstGeom prst="rect">
+          <a:avLst/>
+        </a:prstGeom>
+        <a:noFill/>
+        <a:ln>
+          <a:noFill/>
+        </a:ln>
+        <a:effectLst/>
+      </dsp:spPr>
+      <dsp:style>
+        <a:lnRef idx="0">
+          <a:scrgbClr r="0" g="0" b="0"/>
+        </a:lnRef>
+        <a:fillRef idx="0">
+          <a:scrgbClr r="0" g="0" b="0"/>
+        </a:fillRef>
+        <a:effectRef idx="0">
+          <a:scrgbClr r="0" g="0" b="0"/>
+        </a:effectRef>
+        <a:fontRef idx="minor"/>
+      </dsp:style>
       <dsp:txBody>
-        <a:bodyPr spcFirstLastPara="0" vert="horz" wrap="square" lIns="289132" tIns="0" rIns="289132" bIns="0" numCol="1" spcCol="1270" anchor="ctr" anchorCtr="0">
+        <a:bodyPr spcFirstLastPara="0" vert="horz" wrap="square" lIns="0" tIns="0" rIns="0" bIns="0" numCol="1" spcCol="1270" anchor="t" anchorCtr="0">
           <a:noAutofit/>
         </a:bodyPr>
         <a:lstStyle/>
         <a:p>
-          <a:pPr marL="0" lvl="0" indent="0" algn="l" defTabSz="577850">
+          <a:pPr marL="0" lvl="0" indent="0" algn="ctr" defTabSz="622300">
             <a:lnSpc>
               <a:spcPct val="100000"/>
             </a:lnSpc>
@@ -4452,55 +4752,61 @@
             <a:defRPr cap="all"/>
           </a:pPr>
           <a:r>
-            <a:rPr lang="en-US" sz="1300" kern="1200">
-              <a:latin typeface="Arial"/>
+            <a:rPr lang="en-US" sz="1400" kern="1200" dirty="0">
+              <a:latin typeface="Roboto" panose="02000000000000000000" pitchFamily="2" charset="0"/>
+              <a:ea typeface="Roboto" panose="02000000000000000000" pitchFamily="2" charset="0"/>
+              <a:cs typeface="Roboto" panose="02000000000000000000" pitchFamily="2" charset="0"/>
             </a:rPr>
-            <a:t>Protective shell</a:t>
+            <a:t>Visualization</a:t>
           </a:r>
+          <a:r>
+            <a:rPr lang="en-US" sz="1400" kern="1200" baseline="0" dirty="0">
+              <a:latin typeface="Roboto" panose="02000000000000000000" pitchFamily="2" charset="0"/>
+              <a:ea typeface="Roboto" panose="02000000000000000000" pitchFamily="2" charset="0"/>
+              <a:cs typeface="Roboto" panose="02000000000000000000" pitchFamily="2" charset="0"/>
+            </a:rPr>
+            <a:t> of Data</a:t>
+          </a:r>
+          <a:endParaRPr lang="en-US" sz="1400" kern="1200" dirty="0">
+            <a:latin typeface="Roboto" panose="02000000000000000000" pitchFamily="2" charset="0"/>
+            <a:ea typeface="Roboto" panose="02000000000000000000" pitchFamily="2" charset="0"/>
+            <a:cs typeface="Roboto" panose="02000000000000000000" pitchFamily="2" charset="0"/>
+          </a:endParaRPr>
         </a:p>
       </dsp:txBody>
       <dsp:txXfrm>
-        <a:off x="565125" y="3034756"/>
-        <a:ext cx="7612012" cy="346292"/>
+        <a:off x="3472345" y="3694331"/>
+        <a:ext cx="1641796" cy="656718"/>
       </dsp:txXfrm>
     </dsp:sp>
-    <dsp:sp modelId="{F0761842-E1A3-45C4-9B8D-2D2B434D89EE}">
+    <dsp:sp modelId="{553AE206-E954-4455-9464-7F81419B6A85}">
       <dsp:nvSpPr>
         <dsp:cNvPr id="0" name=""/>
         <dsp:cNvSpPr/>
       </dsp:nvSpPr>
       <dsp:spPr>
         <a:xfrm>
-          <a:off x="0" y="3797582"/>
-          <a:ext cx="10927829" cy="327600"/>
+          <a:off x="5721607" y="2380893"/>
+          <a:ext cx="1001496" cy="1001496"/>
         </a:xfrm>
-        <a:prstGeom prst="rect">
+        <a:prstGeom prst="ellipse">
           <a:avLst/>
         </a:prstGeom>
         <a:solidFill>
-          <a:schemeClr val="lt1">
-            <a:alpha val="90000"/>
+          <a:schemeClr val="accent3">
             <a:hueOff val="0"/>
             <a:satOff val="0"/>
             <a:lumOff val="0"/>
             <a:alphaOff val="0"/>
           </a:schemeClr>
         </a:solidFill>
-        <a:ln w="25400" cap="flat" cmpd="sng" algn="ctr">
-          <a:solidFill>
-            <a:schemeClr val="accent3">
-              <a:hueOff val="0"/>
-              <a:satOff val="0"/>
-              <a:lumOff val="0"/>
-              <a:alphaOff val="0"/>
-            </a:schemeClr>
-          </a:solidFill>
-          <a:prstDash val="solid"/>
+        <a:ln>
+          <a:noFill/>
         </a:ln>
         <a:effectLst/>
       </dsp:spPr>
       <dsp:style>
-        <a:lnRef idx="2">
+        <a:lnRef idx="0">
           <a:scrgbClr r="0" g="0" b="0"/>
         </a:lnRef>
         <a:fillRef idx="1">
@@ -4512,37 +4818,36 @@
         <a:fontRef idx="minor"/>
       </dsp:style>
     </dsp:sp>
-    <dsp:sp modelId="{CE67BB86-3302-4DD2-9019-43B1FDC37C30}">
+    <dsp:sp modelId="{89E9C3DD-51F8-4A6F-B9BA-F34C1D8BA595}">
       <dsp:nvSpPr>
         <dsp:cNvPr id="0" name=""/>
         <dsp:cNvSpPr/>
       </dsp:nvSpPr>
       <dsp:spPr>
         <a:xfrm>
-          <a:off x="546391" y="3605702"/>
-          <a:ext cx="7649480" cy="383760"/>
+          <a:off x="5935041" y="2594327"/>
+          <a:ext cx="574628" cy="574628"/>
         </a:xfrm>
-        <a:prstGeom prst="roundRect">
+        <a:prstGeom prst="rect">
           <a:avLst/>
         </a:prstGeom>
-        <a:solidFill>
-          <a:schemeClr val="bg1">
-            <a:hueOff val="0"/>
-            <a:satOff val="0"/>
-            <a:lumOff val="0"/>
-            <a:alphaOff val="0"/>
-          </a:schemeClr>
-        </a:solidFill>
+        <a:blipFill>
+          <a:blip xmlns:r="http://schemas.openxmlformats.org/officeDocument/2006/relationships" r:embed="rId13">
+            <a:extLst>
+              <a:ext uri="{28A0092B-C50C-407E-A947-70E740481C1C}">
+                <a14:useLocalDpi xmlns:a14="http://schemas.microsoft.com/office/drawing/2010/main" val="0"/>
+              </a:ext>
+              <a:ext uri="{96DAC541-7B7A-43D3-8B79-37D633B846F1}">
+                <asvg:svgBlip xmlns:asvg="http://schemas.microsoft.com/office/drawing/2016/SVG/main" r:embed="rId14"/>
+              </a:ext>
+            </a:extLst>
+          </a:blip>
+          <a:stretch>
+            <a:fillRect/>
+          </a:stretch>
+        </a:blipFill>
         <a:ln w="25400" cap="flat" cmpd="sng" algn="ctr">
-          <a:solidFill>
-            <a:schemeClr val="lt1">
-              <a:alpha val="0"/>
-              <a:hueOff val="0"/>
-              <a:satOff val="0"/>
-              <a:lumOff val="0"/>
-              <a:alphaOff val="0"/>
-            </a:schemeClr>
-          </a:solidFill>
+          <a:noFill/>
           <a:prstDash val="solid"/>
         </a:ln>
         <a:effectLst/>
@@ -4561,13 +4866,45 @@
           <a:schemeClr val="lt1"/>
         </a:fontRef>
       </dsp:style>
+    </dsp:sp>
+    <dsp:sp modelId="{94C76434-9AB3-43B2-A1D0-E67C983BB965}">
+      <dsp:nvSpPr>
+        <dsp:cNvPr id="0" name=""/>
+        <dsp:cNvSpPr/>
+      </dsp:nvSpPr>
+      <dsp:spPr>
+        <a:xfrm>
+          <a:off x="5401457" y="3694331"/>
+          <a:ext cx="1641796" cy="656718"/>
+        </a:xfrm>
+        <a:prstGeom prst="rect">
+          <a:avLst/>
+        </a:prstGeom>
+        <a:noFill/>
+        <a:ln>
+          <a:noFill/>
+        </a:ln>
+        <a:effectLst/>
+      </dsp:spPr>
+      <dsp:style>
+        <a:lnRef idx="0">
+          <a:scrgbClr r="0" g="0" b="0"/>
+        </a:lnRef>
+        <a:fillRef idx="0">
+          <a:scrgbClr r="0" g="0" b="0"/>
+        </a:fillRef>
+        <a:effectRef idx="0">
+          <a:scrgbClr r="0" g="0" b="0"/>
+        </a:effectRef>
+        <a:fontRef idx="minor"/>
+      </dsp:style>
       <dsp:txBody>
-        <a:bodyPr spcFirstLastPara="0" vert="horz" wrap="square" lIns="289132" tIns="0" rIns="289132" bIns="0" numCol="1" spcCol="1270" anchor="ctr" anchorCtr="0">
+        <a:bodyPr spcFirstLastPara="0" vert="horz" wrap="square" lIns="0" tIns="0" rIns="0" bIns="0" numCol="1" spcCol="1270" anchor="t" anchorCtr="0">
           <a:noAutofit/>
         </a:bodyPr>
         <a:lstStyle/>
         <a:p>
-          <a:pPr marL="0" lvl="0" indent="0" algn="l" defTabSz="577850">
+          <a:pPr marL="0" lvl="0" indent="0" algn="ctr" defTabSz="622300">
             <a:lnSpc>
               <a:spcPct val="100000"/>
             </a:lnSpc>
@@ -4581,16 +4918,18 @@
             <a:defRPr cap="all"/>
           </a:pPr>
           <a:r>
-            <a:rPr lang="en-US" sz="1300" kern="1200" dirty="0">
-              <a:latin typeface="Arial"/>
+            <a:rPr lang="en-US" sz="1400" kern="1200" dirty="0">
+              <a:latin typeface="Roboto" panose="02000000000000000000" pitchFamily="2" charset="0"/>
+              <a:ea typeface="Roboto" panose="02000000000000000000" pitchFamily="2" charset="0"/>
+              <a:cs typeface="Roboto" panose="02000000000000000000" pitchFamily="2" charset="0"/>
             </a:rPr>
-            <a:t>Visualization of Data</a:t>
+            <a:t>Protective shell</a:t>
           </a:r>
         </a:p>
       </dsp:txBody>
       <dsp:txXfrm>
-        <a:off x="565125" y="3624436"/>
-        <a:ext cx="7612012" cy="346292"/>
+        <a:off x="5401457" y="3694331"/>
+        <a:ext cx="1641796" cy="656718"/>
       </dsp:txXfrm>
     </dsp:sp>
   </dsp:spTree>
@@ -4752,90 +5091,57 @@
 </file>
 
 <file path=ppt/diagrams/layout2.xml><?xml version="1.0" encoding="utf-8"?>
-<dgm:layoutDef xmlns:dgm="http://schemas.openxmlformats.org/drawingml/2006/diagram" xmlns:a="http://schemas.openxmlformats.org/drawingml/2006/main" uniqueId="urn:microsoft.com/office/officeart/2005/8/layout/list1">
-  <dgm:title val=""/>
-  <dgm:desc val=""/>
+<dgm:layoutDef xmlns:dgm="http://schemas.openxmlformats.org/drawingml/2006/diagram" xmlns:a="http://schemas.openxmlformats.org/drawingml/2006/main" uniqueId="urn:microsoft.com/office/officeart/2018/5/layout/IconCircleLabelList">
+  <dgm:title val="Icon Circle Label List"/>
+  <dgm:desc val="Use to show non-sequential or grouped chunks of information accompanied by a related visuals. Works best with icons or small pictures with short text captions."/>
   <dgm:catLst>
-    <dgm:cat type="list" pri="4000"/>
+    <dgm:cat type="icon" pri="500"/>
   </dgm:catLst>
-  <dgm:sampData>
+  <dgm:sampData useDef="1">
     <dgm:dataModel>
-      <dgm:ptLst>
-        <dgm:pt modelId="0" type="doc"/>
-        <dgm:pt modelId="1">
-          <dgm:prSet phldr="1"/>
-        </dgm:pt>
-        <dgm:pt modelId="2">
-          <dgm:prSet phldr="1"/>
-        </dgm:pt>
-        <dgm:pt modelId="3">
-          <dgm:prSet phldr="1"/>
-        </dgm:pt>
-      </dgm:ptLst>
-      <dgm:cxnLst>
-        <dgm:cxn modelId="4" srcId="0" destId="1" srcOrd="0" destOrd="0"/>
-        <dgm:cxn modelId="5" srcId="0" destId="2" srcOrd="1" destOrd="0"/>
-        <dgm:cxn modelId="6" srcId="0" destId="3" srcOrd="2" destOrd="0"/>
-      </dgm:cxnLst>
+      <dgm:ptLst/>
       <dgm:bg/>
       <dgm:whole/>
     </dgm:dataModel>
   </dgm:sampData>
-  <dgm:styleData>
+  <dgm:styleData useDef="1">
     <dgm:dataModel>
-      <dgm:ptLst>
-        <dgm:pt modelId="0" type="doc"/>
-        <dgm:pt modelId="1"/>
-        <dgm:pt modelId="2"/>
-      </dgm:ptLst>
-      <dgm:cxnLst>
-        <dgm:cxn modelId="4" srcId="0" destId="1" srcOrd="0" destOrd="0"/>
-        <dgm:cxn modelId="5" srcId="0" destId="2" srcOrd="1" destOrd="0"/>
-      </dgm:cxnLst>
+      <dgm:ptLst/>
       <dgm:bg/>
       <dgm:whole/>
     </dgm:dataModel>
   </dgm:styleData>
-  <dgm:clrData>
+  <dgm:clrData useDef="1">
     <dgm:dataModel>
-      <dgm:ptLst>
-        <dgm:pt modelId="0" type="doc"/>
-        <dgm:pt modelId="1"/>
-        <dgm:pt modelId="2"/>
-        <dgm:pt modelId="3"/>
-        <dgm:pt modelId="4"/>
-      </dgm:ptLst>
-      <dgm:cxnLst>
-        <dgm:cxn modelId="5" srcId="0" destId="1" srcOrd="0" destOrd="0"/>
-        <dgm:cxn modelId="6" srcId="0" destId="2" srcOrd="1" destOrd="0"/>
-        <dgm:cxn modelId="7" srcId="0" destId="3" srcOrd="2" destOrd="0"/>
-        <dgm:cxn modelId="8" srcId="0" destId="4" srcOrd="3" destOrd="0"/>
-      </dgm:cxnLst>
+      <dgm:ptLst/>
       <dgm:bg/>
       <dgm:whole/>
     </dgm:dataModel>
   </dgm:clrData>
-  <dgm:layoutNode name="linear">
+  <dgm:layoutNode name="root">
     <dgm:varLst>
       <dgm:dir/>
-      <dgm:animLvl val="lvl"/>
       <dgm:resizeHandles val="exact"/>
     </dgm:varLst>
     <dgm:choose name="Name0">
-      <dgm:if name="Name1" func="var" arg="dir" op="equ" val="norm">
-        <dgm:alg type="lin">
-          <dgm:param type="linDir" val="fromT"/>
+      <dgm:if name="Name1" axis="self" func="var" arg="dir" op="equ" val="norm">
+        <dgm:alg type="snake">
+          <dgm:param type="grDir" val="tL"/>
+          <dgm:param type="flowDir" val="row"/>
+          <dgm:param type="contDir" val="sameDir"/>
+          <dgm:param type="off" val="ctr"/>
           <dgm:param type="vertAlign" val="mid"/>
-          <dgm:param type="horzAlign" val="l"/>
-          <dgm:param type="nodeHorzAlign" val="l"/>
+          <dgm:param type="horzAlign" val="ctr"/>
         </dgm:alg>
       </dgm:if>
       <dgm:else name="Name2">
-        <dgm:alg type="lin">
-          <dgm:param type="linDir" val="fromT"/>
+        <dgm:alg type="snake">
+          <dgm:param type="grDir" val="tR"/>
+          <dgm:param type="flowDir" val="row"/>
+          <dgm:param type="contDir" val="sameDir"/>
+          <dgm:param type="off" val="ctr"/>
           <dgm:param type="vertAlign" val="mid"/>
-          <dgm:param type="horzAlign" val="r"/>
-          <dgm:param type="nodeHorzAlign" val="r"/>
+          <dgm:param type="horzAlign" val="ctr"/>
         </dgm:alg>
       </dgm:else>
     </dgm:choose>
@@ -4843,125 +5149,102 @@
       <dgm:adjLst/>
     </dgm:shape>
     <dgm:presOf/>
-    <dgm:constrLst>
-      <dgm:constr type="w" for="ch" forName="parentLin" refType="w"/>
-      <dgm:constr type="h" for="ch" forName="parentLin" val="INF"/>
-      <dgm:constr type="w" for="des" forName="parentLeftMargin" refType="w" fact="0.05"/>
-      <dgm:constr type="w" for="des" forName="parentText" refType="w" fact="0.7"/>
-      <dgm:constr type="h" for="des" forName="parentText" refType="primFontSz" refFor="des" refForName="parentText" fact="0.82"/>
-      <dgm:constr type="h" for="ch" forName="negativeSpace" refType="primFontSz" refFor="des" refForName="parentText" fact="-0.41"/>
-      <dgm:constr type="h" for="ch" forName="negativeSpace" refType="h" refFor="des" refForName="parentText" op="lte" fact="-0.82"/>
-      <dgm:constr type="h" for="ch" forName="negativeSpace" refType="h" refFor="des" refForName="parentText" op="gte" fact="-0.82"/>
-      <dgm:constr type="w" for="ch" forName="childText" refType="w"/>
-      <dgm:constr type="h" for="ch" forName="childText" refType="primFontSz" refFor="des" refForName="parentText" fact="0.7"/>
-      <dgm:constr type="primFontSz" for="des" forName="parentText" val="65"/>
-      <dgm:constr type="primFontSz" for="ch" forName="childText" refType="primFontSz" refFor="des" refForName="parentText"/>
-      <dgm:constr type="tMarg" for="ch" forName="childText" refType="primFontSz" refFor="des" refForName="parentText" fact="1.64"/>
-      <dgm:constr type="tMarg" for="ch" forName="childText" refType="h" refFor="des" refForName="parentText" op="lte" fact="3.28"/>
-      <dgm:constr type="tMarg" for="ch" forName="childText" refType="h" refFor="des" refForName="parentText" op="gte" fact="3.28"/>
-      <dgm:constr type="lMarg" for="ch" forName="childText" refType="w" fact="0.22"/>
-      <dgm:constr type="rMarg" for="ch" forName="childText" refType="lMarg" refFor="ch" refForName="childText"/>
-      <dgm:constr type="lMarg" for="des" forName="parentText" refType="w" fact="0.075"/>
-      <dgm:constr type="rMarg" for="des" forName="parentText" refType="lMarg" refFor="des" refForName="parentText"/>
-      <dgm:constr type="h" for="ch" forName="spaceBetweenRectangles" refType="primFontSz" refFor="des" refForName="parentText" fact="0.15"/>
-    </dgm:constrLst>
+    <dgm:choose name="Name3">
+      <dgm:if name="Name4" axis="ch" ptType="node" func="cnt" op="lte" val="2">
+        <dgm:constrLst>
+          <dgm:constr type="h" for="ch" forName="compNode" refType="h" fact="0.4"/>
+          <dgm:constr type="w" for="ch" forName="compNode" val="100"/>
+          <dgm:constr type="w" for="ch" forName="sibTrans" refType="w" refFor="ch" refForName="compNode" fact="0.175"/>
+          <dgm:constr type="sp" refType="w" refFor="ch" refForName="compNode" op="equ" fact="0.25"/>
+          <dgm:constr type="primFontSz" for="des" ptType="node" op="equ" val="44"/>
+          <dgm:constr type="h" for="des" forName="compNode" op="equ"/>
+          <dgm:constr type="h" for="des" forName="textRect" op="equ"/>
+        </dgm:constrLst>
+      </dgm:if>
+      <dgm:if name="Name5" axis="ch" ptType="node" func="cnt" op="lte" val="3">
+        <dgm:constrLst>
+          <dgm:constr type="h" for="ch" forName="compNode" refType="h" fact="0.4"/>
+          <dgm:constr type="w" for="ch" forName="compNode" val="100"/>
+          <dgm:constr type="w" for="ch" forName="sibTrans" refType="w" refFor="ch" refForName="compNode" fact="0.175"/>
+          <dgm:constr type="sp" refType="w" refFor="ch" refForName="compNode" op="equ" fact="0.25"/>
+          <dgm:constr type="primFontSz" for="des" ptType="node" op="equ" val="40"/>
+          <dgm:constr type="h" for="des" forName="compNode" op="equ"/>
+          <dgm:constr type="h" for="des" forName="textRect" op="equ"/>
+        </dgm:constrLst>
+      </dgm:if>
+      <dgm:if name="Name6" axis="ch" ptType="node" func="cnt" op="lte" val="4">
+        <dgm:constrLst>
+          <dgm:constr type="h" for="ch" forName="compNode" refType="h" fact="0.4"/>
+          <dgm:constr type="w" for="ch" forName="compNode" refType="w"/>
+          <dgm:constr type="w" for="ch" forName="sibTrans" refType="w" refFor="ch" refForName="compNode" fact="0.175"/>
+          <dgm:constr type="sp" refType="w" refFor="ch" refForName="compNode" op="equ" fact="0.25"/>
+          <dgm:constr type="primFontSz" for="des" ptType="node" op="equ" val="32"/>
+          <dgm:constr type="h" for="des" forName="compNode" op="equ"/>
+          <dgm:constr type="h" for="des" forName="textRect" op="equ"/>
+        </dgm:constrLst>
+      </dgm:if>
+      <dgm:else name="Name7">
+        <dgm:constrLst>
+          <dgm:constr type="h" for="ch" forName="compNode" refType="h" fact="0.4"/>
+          <dgm:constr type="w" for="ch" forName="compNode" refType="w"/>
+          <dgm:constr type="w" for="ch" forName="sibTrans" refType="w" refFor="ch" refForName="compNode" fact="0.175"/>
+          <dgm:constr type="sp" refType="w" refFor="ch" refForName="compNode" op="equ" fact="0.25"/>
+          <dgm:constr type="primFontSz" for="des" ptType="node" op="equ" val="24"/>
+          <dgm:constr type="h" for="des" forName="compNode" op="equ"/>
+          <dgm:constr type="h" for="des" forName="textRect" op="equ"/>
+        </dgm:constrLst>
+      </dgm:else>
+    </dgm:choose>
     <dgm:ruleLst>
-      <dgm:rule type="primFontSz" for="des" forName="parentText" val="5" fact="NaN" max="NaN"/>
+      <dgm:rule type="w" for="ch" forName="compNode" val="50" fact="NaN" max="NaN"/>
     </dgm:ruleLst>
-    <dgm:forEach name="Name3" axis="ch" ptType="node">
-      <dgm:layoutNode name="parentLin">
-        <dgm:choose name="Name4">
-          <dgm:if name="Name5" func="var" arg="dir" op="equ" val="norm">
-            <dgm:alg type="lin">
-              <dgm:param type="linDir" val="fromL"/>
-              <dgm:param type="horzAlign" val="l"/>
-              <dgm:param type="nodeHorzAlign" val="l"/>
-            </dgm:alg>
-          </dgm:if>
-          <dgm:else name="Name6">
-            <dgm:alg type="lin">
-              <dgm:param type="linDir" val="fromR"/>
-              <dgm:param type="horzAlign" val="r"/>
-              <dgm:param type="nodeHorzAlign" val="r"/>
-            </dgm:alg>
-          </dgm:else>
-        </dgm:choose>
+    <dgm:forEach name="Name8" axis="ch" ptType="node">
+      <dgm:layoutNode name="compNode">
+        <dgm:alg type="composite"/>
         <dgm:shape xmlns:r="http://schemas.openxmlformats.org/officeDocument/2006/relationships" r:blip="">
           <dgm:adjLst/>
         </dgm:shape>
-        <dgm:presOf/>
-        <dgm:constrLst/>
-        <dgm:ruleLst/>
-        <dgm:layoutNode name="parentLeftMargin">
-          <dgm:alg type="sp"/>
-          <dgm:shape xmlns:r="http://schemas.openxmlformats.org/officeDocument/2006/relationships" type="rect" r:blip="" hideGeom="1">
-            <dgm:adjLst/>
-          </dgm:shape>
-          <dgm:presOf axis="self"/>
-          <dgm:constrLst>
-            <dgm:constr type="h"/>
-          </dgm:constrLst>
-          <dgm:ruleLst/>
-        </dgm:layoutNode>
-        <dgm:layoutNode name="parentText" styleLbl="node1">
-          <dgm:varLst>
-            <dgm:chMax val="0"/>
-            <dgm:bulletEnabled val="1"/>
-          </dgm:varLst>
-          <dgm:choose name="Name7">
-            <dgm:if name="Name8" func="var" arg="dir" op="equ" val="norm">
-              <dgm:alg type="tx">
-                <dgm:param type="parTxLTRAlign" val="l"/>
-                <dgm:param type="parTxRTLAlign" val="l"/>
-              </dgm:alg>
-            </dgm:if>
-            <dgm:else name="Name9">
-              <dgm:alg type="tx">
-                <dgm:param type="parTxLTRAlign" val="r"/>
-                <dgm:param type="parTxRTLAlign" val="r"/>
-              </dgm:alg>
-            </dgm:else>
-          </dgm:choose>
-          <dgm:shape xmlns:r="http://schemas.openxmlformats.org/officeDocument/2006/relationships" type="roundRect" r:blip="">
-            <dgm:adjLst/>
-          </dgm:shape>
-          <dgm:presOf axis="self" ptType="node"/>
-          <dgm:constrLst>
-            <dgm:constr type="tMarg"/>
-            <dgm:constr type="bMarg"/>
-          </dgm:constrLst>
-          <dgm:ruleLst/>
-        </dgm:layoutNode>
-      </dgm:layoutNode>
-      <dgm:layoutNode name="negativeSpace">
-        <dgm:alg type="sp"/>
-        <dgm:shape xmlns:r="http://schemas.openxmlformats.org/officeDocument/2006/relationships" r:blip="">
-          <dgm:adjLst/>
-        </dgm:shape>
-        <dgm:presOf/>
-        <dgm:constrLst/>
-        <dgm:ruleLst/>
-      </dgm:layoutNode>
-      <dgm:layoutNode name="childText" styleLbl="conFgAcc1">
-        <dgm:varLst>
-          <dgm:bulletEnabled val="1"/>
-        </dgm:varLst>
-        <dgm:alg type="tx">
-          <dgm:param type="stBulletLvl" val="1"/>
-        </dgm:alg>
-        <dgm:shape xmlns:r="http://schemas.openxmlformats.org/officeDocument/2006/relationships" type="rect" r:blip="" zOrderOff="-2">
-          <dgm:adjLst/>
-        </dgm:shape>
-        <dgm:presOf axis="des" ptType="node"/>
+        <dgm:presOf axis="self"/>
         <dgm:constrLst>
-          <dgm:constr type="secFontSz" refType="primFontSz"/>
+          <dgm:constr type="w" for="ch" forName="iconBgRect" refType="w" fact="0.61"/>
+          <dgm:constr type="h" for="ch" forName="iconBgRect" refType="w" refFor="ch" refForName="iconBgRect"/>
+          <dgm:constr type="t" for="ch" forName="iconBgRect"/>
+          <dgm:constr type="ctrX" for="ch" forName="iconBgRect" refType="w" fact="0.5"/>
+          <dgm:constr type="w" for="ch" forName="iconRect" refType="w" fact="0.35"/>
+          <dgm:constr type="h" for="ch" forName="iconRect" refType="w" refFor="ch" refForName="iconRect"/>
+          <dgm:constr type="ctrX" for="ch" forName="iconRect" refType="ctrX" refFor="ch" refForName="iconBgRect"/>
+          <dgm:constr type="ctrY" for="ch" forName="iconRect" refType="ctrY" refFor="ch" refForName="iconBgRect"/>
+          <dgm:constr type="h" for="ch" forName="spaceRect" refType="w" fact="0.19"/>
+          <dgm:constr type="w" for="ch" forName="spaceRect" refType="w"/>
+          <dgm:constr type="l" for="ch" forName="spaceRect"/>
+          <dgm:constr type="t" for="ch" forName="spaceRect" refType="b" refFor="ch" refForName="iconBgRect"/>
+          <dgm:constr type="h" for="ch" forName="textRect" val="20"/>
+          <dgm:constr type="w" for="ch" forName="textRect" refType="w"/>
+          <dgm:constr type="l" for="ch" forName="textRect"/>
+          <dgm:constr type="t" for="ch" forName="textRect" refType="b" refFor="ch" refForName="spaceRect"/>
         </dgm:constrLst>
         <dgm:ruleLst>
           <dgm:rule type="h" val="INF" fact="NaN" max="NaN"/>
         </dgm:ruleLst>
-      </dgm:layoutNode>
-      <dgm:forEach name="Name10" axis="followSib" ptType="sibTrans" cnt="1">
-        <dgm:layoutNode name="spaceBetweenRectangles">
+        <dgm:layoutNode name="iconBgRect" styleLbl="bgShp">
+          <dgm:alg type="sp"/>
+          <dgm:shape xmlns:r="http://schemas.openxmlformats.org/officeDocument/2006/relationships" type="ellipse" r:blip="">
+            <dgm:adjLst/>
+          </dgm:shape>
+          <dgm:presOf/>
+          <dgm:constrLst/>
+          <dgm:ruleLst/>
+        </dgm:layoutNode>
+        <dgm:layoutNode name="iconRect" styleLbl="node1">
+          <dgm:alg type="sp"/>
+          <dgm:shape xmlns:r="http://schemas.openxmlformats.org/officeDocument/2006/relationships" type="rect" r:blip="" blipPhldr="1">
+            <dgm:adjLst/>
+          </dgm:shape>
+          <dgm:presOf/>
+          <dgm:constrLst/>
+          <dgm:ruleLst/>
+        </dgm:layoutNode>
+        <dgm:layoutNode name="spaceRect">
           <dgm:alg type="sp"/>
           <dgm:shape xmlns:r="http://schemas.openxmlformats.org/officeDocument/2006/relationships" r:blip="">
             <dgm:adjLst/>
@@ -4970,9 +5253,55 @@
           <dgm:constrLst/>
           <dgm:ruleLst/>
         </dgm:layoutNode>
+        <dgm:layoutNode name="textRect" styleLbl="revTx">
+          <dgm:varLst>
+            <dgm:chMax val="1"/>
+            <dgm:chPref val="1"/>
+          </dgm:varLst>
+          <dgm:alg type="tx">
+            <dgm:param type="txAnchorVert" val="t"/>
+          </dgm:alg>
+          <dgm:shape xmlns:r="http://schemas.openxmlformats.org/officeDocument/2006/relationships" type="rect" r:blip="">
+            <dgm:adjLst/>
+          </dgm:shape>
+          <dgm:presOf axis="self" ptType="node"/>
+          <dgm:constrLst>
+            <dgm:constr type="lMarg"/>
+            <dgm:constr type="rMarg"/>
+            <dgm:constr type="tMarg"/>
+            <dgm:constr type="bMarg"/>
+          </dgm:constrLst>
+          <dgm:ruleLst>
+            <dgm:rule type="primFontSz" val="11" fact="NaN" max="NaN"/>
+            <dgm:rule type="h" val="INF" fact="NaN" max="NaN"/>
+          </dgm:ruleLst>
+        </dgm:layoutNode>
+      </dgm:layoutNode>
+      <dgm:forEach name="Name9" axis="followSib" ptType="sibTrans" cnt="1">
+        <dgm:layoutNode name="sibTrans">
+          <dgm:alg type="sp"/>
+          <dgm:shape xmlns:r="http://schemas.openxmlformats.org/officeDocument/2006/relationships" r:blip="">
+            <dgm:adjLst/>
+          </dgm:shape>
+          <dgm:presOf axis="self"/>
+          <dgm:constrLst/>
+          <dgm:ruleLst/>
+        </dgm:layoutNode>
       </dgm:forEach>
     </dgm:forEach>
   </dgm:layoutNode>
+  <dgm:extLst>
+    <a:ext uri="{68A01E43-0DF5-4B5B-8FA6-DAF915123BFB}">
+      <dgm1612:lstStyle xmlns:dgm1612="http://schemas.microsoft.com/office/drawing/2016/12/diagram">
+        <a:lvl1pPr>
+          <a:lnSpc>
+            <a:spcPct val="100000"/>
+          </a:lnSpc>
+          <a:defRPr cap="all"/>
+        </a:lvl1pPr>
+      </dgm1612:lstStyle>
+    </a:ext>
+  </dgm:extLst>
 </dgm:layoutDef>
 </file>
 
@@ -25738,14 +26067,6 @@
 <file path=ppt/slides/slide11.xml><?xml version="1.0" encoding="utf-8"?>
 <p:sld xmlns:a="http://schemas.openxmlformats.org/drawingml/2006/main" xmlns:r="http://schemas.openxmlformats.org/officeDocument/2006/relationships" xmlns:p="http://schemas.openxmlformats.org/presentationml/2006/main">
   <p:cSld>
-    <p:bg>
-      <p:bgPr>
-        <a:solidFill>
-          <a:schemeClr val="bg1"/>
-        </a:solidFill>
-        <a:effectLst/>
-      </p:bgPr>
-    </p:bg>
     <p:spTree>
       <p:nvGrpSpPr>
         <p:cNvPr id="1" name=""/>
@@ -25760,308 +26081,6 @@
           <a:chExt cx="0" cy="0"/>
         </a:xfrm>
       </p:grpSpPr>
-      <p:sp useBgFill="1">
-        <p:nvSpPr>
-          <p:cNvPr id="16" name="Rectangle 15">
-            <a:extLst>
-              <a:ext uri="{FF2B5EF4-FFF2-40B4-BE49-F238E27FC236}">
-                <a16:creationId xmlns:a16="http://schemas.microsoft.com/office/drawing/2014/main" id="{BACC6370-2D7E-4714-9D71-7542949D7D5D}"/>
-              </a:ext>
-              <a:ext uri="{C183D7F6-B498-43B3-948B-1728B52AA6E4}">
-                <adec:decorative xmlns:adec="http://schemas.microsoft.com/office/drawing/2017/decorative" val="1"/>
-              </a:ext>
-            </a:extLst>
-          </p:cNvPr>
-          <p:cNvSpPr>
-            <a:spLocks noGrp="1" noRot="1" noChangeAspect="1" noMove="1" noResize="1" noEditPoints="1" noAdjustHandles="1" noChangeArrowheads="1" noChangeShapeType="1" noTextEdit="1"/>
-          </p:cNvSpPr>
-          <p:nvPr>
-            <p:extLst>
-              <p:ext uri="{386F3935-93C4-4BCD-93E2-E3B085C9AB24}">
-                <p16:designElem xmlns:p16="http://schemas.microsoft.com/office/powerpoint/2015/main" val="1"/>
-              </p:ext>
-            </p:extLst>
-          </p:nvPr>
-        </p:nvSpPr>
-        <p:spPr>
-          <a:xfrm>
-            <a:off x="0" y="0"/>
-            <a:ext cx="12192000" cy="6858000"/>
-          </a:xfrm>
-          <a:prstGeom prst="rect">
-            <a:avLst/>
-          </a:prstGeom>
-          <a:ln w="12700" cap="flat" cmpd="sng" algn="ctr">
-            <a:noFill/>
-            <a:prstDash val="solid"/>
-            <a:miter lim="800000"/>
-          </a:ln>
-          <a:effectLst/>
-          <a:extLst>
-            <a:ext uri="{91240B29-F687-4F45-9708-019B960494DF}">
-              <a14:hiddenLine xmlns:a14="http://schemas.microsoft.com/office/drawing/2010/main" w="12700" cap="flat" cmpd="sng" algn="ctr">
-                <a:solidFill>
-                  <a:schemeClr val="accent1">
-                    <a:shade val="50000"/>
-                  </a:schemeClr>
-                </a:solidFill>
-                <a:prstDash val="solid"/>
-                <a:miter lim="800000"/>
-              </a14:hiddenLine>
-            </a:ext>
-          </a:extLst>
-        </p:spPr>
-        <p:style>
-          <a:lnRef idx="2">
-            <a:schemeClr val="accent1">
-              <a:shade val="50000"/>
-            </a:schemeClr>
-          </a:lnRef>
-          <a:fillRef idx="1">
-            <a:schemeClr val="accent1"/>
-          </a:fillRef>
-          <a:effectRef idx="0">
-            <a:schemeClr val="accent1"/>
-          </a:effectRef>
-          <a:fontRef idx="minor">
-            <a:schemeClr val="lt1"/>
-          </a:fontRef>
-        </p:style>
-        <p:txBody>
-          <a:bodyPr rtlCol="0" anchor="ctr"/>
-          <a:lstStyle/>
-          <a:p>
-            <a:pPr algn="ctr"/>
-            <a:endParaRPr lang="en-US"/>
-          </a:p>
-        </p:txBody>
-      </p:sp>
-      <p:sp>
-        <p:nvSpPr>
-          <p:cNvPr id="18" name="Rectangle 17">
-            <a:extLst>
-              <a:ext uri="{FF2B5EF4-FFF2-40B4-BE49-F238E27FC236}">
-                <a16:creationId xmlns:a16="http://schemas.microsoft.com/office/drawing/2014/main" id="{F68B3F68-107C-434F-AA38-110D5EA91B85}"/>
-              </a:ext>
-              <a:ext uri="{C183D7F6-B498-43B3-948B-1728B52AA6E4}">
-                <adec:decorative xmlns:adec="http://schemas.microsoft.com/office/drawing/2017/decorative" val="1"/>
-              </a:ext>
-            </a:extLst>
-          </p:cNvPr>
-          <p:cNvSpPr>
-            <a:spLocks noGrp="1" noRot="1" noChangeAspect="1" noMove="1" noResize="1" noEditPoints="1" noAdjustHandles="1" noChangeArrowheads="1" noChangeShapeType="1" noTextEdit="1"/>
-          </p:cNvSpPr>
-          <p:nvPr>
-            <p:extLst>
-              <p:ext uri="{386F3935-93C4-4BCD-93E2-E3B085C9AB24}">
-                <p16:designElem xmlns:p16="http://schemas.microsoft.com/office/powerpoint/2015/main" val="1"/>
-              </p:ext>
-            </p:extLst>
-          </p:nvPr>
-        </p:nvSpPr>
-        <p:spPr>
-          <a:xfrm flipH="1">
-            <a:off x="2" y="0"/>
-            <a:ext cx="12191998" cy="1575955"/>
-          </a:xfrm>
-          <a:prstGeom prst="rect">
-            <a:avLst/>
-          </a:prstGeom>
-          <a:gradFill>
-            <a:gsLst>
-              <a:gs pos="0">
-                <a:srgbClr val="000000">
-                  <a:alpha val="96000"/>
-                </a:srgbClr>
-              </a:gs>
-              <a:gs pos="100000">
-                <a:schemeClr val="accent1">
-                  <a:lumMod val="75000"/>
-                </a:schemeClr>
-              </a:gs>
-            </a:gsLst>
-            <a:lin ang="8400000" scaled="0"/>
-          </a:gradFill>
-          <a:ln>
-            <a:noFill/>
-          </a:ln>
-        </p:spPr>
-        <p:style>
-          <a:lnRef idx="2">
-            <a:schemeClr val="accent1">
-              <a:shade val="50000"/>
-            </a:schemeClr>
-          </a:lnRef>
-          <a:fillRef idx="1">
-            <a:schemeClr val="accent1"/>
-          </a:fillRef>
-          <a:effectRef idx="0">
-            <a:schemeClr val="accent1"/>
-          </a:effectRef>
-          <a:fontRef idx="minor">
-            <a:schemeClr val="lt1"/>
-          </a:fontRef>
-        </p:style>
-        <p:txBody>
-          <a:bodyPr rtlCol="0" anchor="ctr"/>
-          <a:lstStyle/>
-          <a:p>
-            <a:pPr algn="ctr"/>
-            <a:endParaRPr lang="en-US"/>
-          </a:p>
-        </p:txBody>
-      </p:sp>
-      <p:sp>
-        <p:nvSpPr>
-          <p:cNvPr id="19" name="Rectangle 18">
-            <a:extLst>
-              <a:ext uri="{FF2B5EF4-FFF2-40B4-BE49-F238E27FC236}">
-                <a16:creationId xmlns:a16="http://schemas.microsoft.com/office/drawing/2014/main" id="{AAD0DBB9-1A4B-4391-81D4-CB19F9AB918A}"/>
-              </a:ext>
-              <a:ext uri="{C183D7F6-B498-43B3-948B-1728B52AA6E4}">
-                <adec:decorative xmlns:adec="http://schemas.microsoft.com/office/drawing/2017/decorative" val="1"/>
-              </a:ext>
-            </a:extLst>
-          </p:cNvPr>
-          <p:cNvSpPr>
-            <a:spLocks noGrp="1" noRot="1" noChangeAspect="1" noMove="1" noResize="1" noEditPoints="1" noAdjustHandles="1" noChangeArrowheads="1" noChangeShapeType="1" noTextEdit="1"/>
-          </p:cNvSpPr>
-          <p:nvPr>
-            <p:extLst>
-              <p:ext uri="{386F3935-93C4-4BCD-93E2-E3B085C9AB24}">
-                <p16:designElem xmlns:p16="http://schemas.microsoft.com/office/powerpoint/2015/main" val="1"/>
-              </p:ext>
-            </p:extLst>
-          </p:nvPr>
-        </p:nvSpPr>
-        <p:spPr>
-          <a:xfrm rot="10800000" flipH="1">
-            <a:off x="8128857" y="0"/>
-            <a:ext cx="4063143" cy="1576412"/>
-          </a:xfrm>
-          <a:prstGeom prst="rect">
-            <a:avLst/>
-          </a:prstGeom>
-          <a:gradFill>
-            <a:gsLst>
-              <a:gs pos="19000">
-                <a:schemeClr val="accent1">
-                  <a:lumMod val="50000"/>
-                  <a:alpha val="68000"/>
-                </a:schemeClr>
-              </a:gs>
-              <a:gs pos="100000">
-                <a:schemeClr val="accent1">
-                  <a:alpha val="79000"/>
-                </a:schemeClr>
-              </a:gs>
-            </a:gsLst>
-            <a:lin ang="19200000" scaled="0"/>
-          </a:gradFill>
-          <a:ln>
-            <a:noFill/>
-          </a:ln>
-        </p:spPr>
-        <p:style>
-          <a:lnRef idx="2">
-            <a:schemeClr val="accent1">
-              <a:shade val="50000"/>
-            </a:schemeClr>
-          </a:lnRef>
-          <a:fillRef idx="1">
-            <a:schemeClr val="accent1"/>
-          </a:fillRef>
-          <a:effectRef idx="0">
-            <a:schemeClr val="accent1"/>
-          </a:effectRef>
-          <a:fontRef idx="minor">
-            <a:schemeClr val="lt1"/>
-          </a:fontRef>
-        </p:style>
-        <p:txBody>
-          <a:bodyPr rtlCol="0" anchor="ctr"/>
-          <a:lstStyle/>
-          <a:p>
-            <a:pPr algn="ctr"/>
-            <a:endParaRPr lang="en-US"/>
-          </a:p>
-        </p:txBody>
-      </p:sp>
-      <p:sp>
-        <p:nvSpPr>
-          <p:cNvPr id="20" name="Rectangle 19">
-            <a:extLst>
-              <a:ext uri="{FF2B5EF4-FFF2-40B4-BE49-F238E27FC236}">
-                <a16:creationId xmlns:a16="http://schemas.microsoft.com/office/drawing/2014/main" id="{063BBA22-50EA-4C4D-BE05-F1CE4E63AA56}"/>
-              </a:ext>
-              <a:ext uri="{C183D7F6-B498-43B3-948B-1728B52AA6E4}">
-                <adec:decorative xmlns:adec="http://schemas.microsoft.com/office/drawing/2017/decorative" val="1"/>
-              </a:ext>
-            </a:extLst>
-          </p:cNvPr>
-          <p:cNvSpPr>
-            <a:spLocks noGrp="1" noRot="1" noChangeAspect="1" noMove="1" noResize="1" noEditPoints="1" noAdjustHandles="1" noChangeArrowheads="1" noChangeShapeType="1" noTextEdit="1"/>
-          </p:cNvSpPr>
-          <p:nvPr>
-            <p:extLst>
-              <p:ext uri="{386F3935-93C4-4BCD-93E2-E3B085C9AB24}">
-                <p16:designElem xmlns:p16="http://schemas.microsoft.com/office/powerpoint/2015/main" val="1"/>
-              </p:ext>
-            </p:extLst>
-          </p:nvPr>
-        </p:nvSpPr>
-        <p:spPr>
-          <a:xfrm rot="5400000">
-            <a:off x="5307777" y="-5307778"/>
-            <a:ext cx="1576446" cy="12192002"/>
-          </a:xfrm>
-          <a:prstGeom prst="rect">
-            <a:avLst/>
-          </a:prstGeom>
-          <a:gradFill>
-            <a:gsLst>
-              <a:gs pos="23000">
-                <a:schemeClr val="accent1">
-                  <a:alpha val="0"/>
-                </a:schemeClr>
-              </a:gs>
-              <a:gs pos="99000">
-                <a:srgbClr val="000000">
-                  <a:alpha val="74000"/>
-                </a:srgbClr>
-              </a:gs>
-            </a:gsLst>
-            <a:lin ang="20400000" scaled="0"/>
-          </a:gradFill>
-          <a:ln>
-            <a:noFill/>
-          </a:ln>
-        </p:spPr>
-        <p:style>
-          <a:lnRef idx="2">
-            <a:schemeClr val="accent1">
-              <a:shade val="50000"/>
-            </a:schemeClr>
-          </a:lnRef>
-          <a:fillRef idx="1">
-            <a:schemeClr val="accent1"/>
-          </a:fillRef>
-          <a:effectRef idx="0">
-            <a:schemeClr val="accent1"/>
-          </a:effectRef>
-          <a:fontRef idx="minor">
-            <a:schemeClr val="lt1"/>
-          </a:fontRef>
-        </p:style>
-        <p:txBody>
-          <a:bodyPr rtlCol="0" anchor="ctr"/>
-          <a:lstStyle/>
-          <a:p>
-            <a:pPr algn="ctr"/>
-            <a:endParaRPr lang="en-US"/>
-          </a:p>
-        </p:txBody>
-      </p:sp>
       <p:sp>
         <p:nvSpPr>
           <p:cNvPr id="5" name="Title 4">
@@ -26080,8 +26099,8 @@
         </p:nvSpPr>
         <p:spPr>
           <a:xfrm>
-            <a:off x="1371597" y="348865"/>
-            <a:ext cx="10044023" cy="877729"/>
+            <a:off x="838200" y="556995"/>
+            <a:ext cx="10515600" cy="1133693"/>
           </a:xfrm>
         </p:spPr>
         <p:txBody>
@@ -26096,9 +26115,9 @@
               </a:spcBef>
             </a:pPr>
             <a:r>
-              <a:rPr lang="en-US" sz="4000" kern="1200" dirty="0">
+              <a:rPr lang="en-US" sz="5200" kern="1200" dirty="0">
                 <a:solidFill>
-                  <a:srgbClr val="FFFFFF"/>
+                  <a:schemeClr val="tx1"/>
                 </a:solidFill>
                 <a:latin typeface="Roboto" panose="02000000000000000000" pitchFamily="2" charset="0"/>
                 <a:ea typeface="Roboto" panose="02000000000000000000" pitchFamily="2" charset="0"/>
@@ -26122,14 +26141,14 @@
           <p:nvPr>
             <p:extLst>
               <p:ext uri="{D42A27DB-BD31-4B8C-83A1-F6EECF244321}">
-                <p14:modId xmlns:p14="http://schemas.microsoft.com/office/powerpoint/2010/main" val="3458404226"/>
+                <p14:modId xmlns:p14="http://schemas.microsoft.com/office/powerpoint/2010/main" val="495114856"/>
               </p:ext>
             </p:extLst>
           </p:nvPr>
         </p:nvGraphicFramePr>
         <p:xfrm>
-          <a:off x="644056" y="2112579"/>
-          <a:ext cx="10927829" cy="4192805"/>
+          <a:off x="838200" y="1825625"/>
+          <a:ext cx="10515600" cy="4351338"/>
         </p:xfrm>
         <a:graphic>
           <a:graphicData uri="http://schemas.openxmlformats.org/drawingml/2006/diagram">
@@ -26140,7 +26159,7 @@
     </p:spTree>
     <p:extLst>
       <p:ext uri="{BB962C8B-B14F-4D97-AF65-F5344CB8AC3E}">
-        <p14:creationId xmlns:p14="http://schemas.microsoft.com/office/powerpoint/2010/main" val="577226782"/>
+        <p14:creationId xmlns:p14="http://schemas.microsoft.com/office/powerpoint/2010/main" val="3002360393"/>
       </p:ext>
     </p:extLst>
   </p:cSld>
@@ -27284,98 +27303,6 @@
   <p:clrMapOvr>
     <a:masterClrMapping/>
   </p:clrMapOvr>
-  <p:timing>
-    <p:tnLst>
-      <p:par>
-        <p:cTn id="1" dur="indefinite" restart="never" nodeType="tmRoot">
-          <p:childTnLst>
-            <p:seq concurrent="1" nextAc="seek">
-              <p:cTn id="2" dur="indefinite" nodeType="mainSeq">
-                <p:childTnLst>
-                  <p:par>
-                    <p:cTn id="3" fill="hold">
-                      <p:stCondLst>
-                        <p:cond delay="indefinite"/>
-                        <p:cond evt="onBegin" delay="0">
-                          <p:tn val="2"/>
-                        </p:cond>
-                      </p:stCondLst>
-                      <p:childTnLst>
-                        <p:par>
-                          <p:cTn id="4" fill="hold">
-                            <p:stCondLst>
-                              <p:cond delay="0"/>
-                            </p:stCondLst>
-                            <p:childTnLst>
-                              <p:par>
-                                <p:cTn id="5" presetID="10" presetClass="entr" presetSubtype="0" fill="hold" grpId="0" nodeType="withEffect">
-                                  <p:stCondLst>
-                                    <p:cond delay="1000"/>
-                                  </p:stCondLst>
-                                  <p:iterate>
-                                    <p:tmPct val="10000"/>
-                                  </p:iterate>
-                                  <p:childTnLst>
-                                    <p:set>
-                                      <p:cBhvr>
-                                        <p:cTn id="6" dur="1" fill="hold">
-                                          <p:stCondLst>
-                                            <p:cond delay="0"/>
-                                          </p:stCondLst>
-                                        </p:cTn>
-                                        <p:tgtEl>
-                                          <p:spTgt spid="113"/>
-                                        </p:tgtEl>
-                                        <p:attrNameLst>
-                                          <p:attrName>style.visibility</p:attrName>
-                                        </p:attrNameLst>
-                                      </p:cBhvr>
-                                      <p:to>
-                                        <p:strVal val="visible"/>
-                                      </p:to>
-                                    </p:set>
-                                    <p:animEffect transition="in" filter="fade">
-                                      <p:cBhvr>
-                                        <p:cTn id="7" dur="700"/>
-                                        <p:tgtEl>
-                                          <p:spTgt spid="113"/>
-                                        </p:tgtEl>
-                                      </p:cBhvr>
-                                    </p:animEffect>
-                                  </p:childTnLst>
-                                </p:cTn>
-                              </p:par>
-                            </p:childTnLst>
-                          </p:cTn>
-                        </p:par>
-                      </p:childTnLst>
-                    </p:cTn>
-                  </p:par>
-                </p:childTnLst>
-              </p:cTn>
-              <p:prevCondLst>
-                <p:cond evt="onPrev" delay="0">
-                  <p:tgtEl>
-                    <p:sldTgt/>
-                  </p:tgtEl>
-                </p:cond>
-              </p:prevCondLst>
-              <p:nextCondLst>
-                <p:cond evt="onNext" delay="0">
-                  <p:tgtEl>
-                    <p:sldTgt/>
-                  </p:tgtEl>
-                </p:cond>
-              </p:nextCondLst>
-            </p:seq>
-          </p:childTnLst>
-        </p:cTn>
-      </p:par>
-    </p:tnLst>
-    <p:bldLst>
-      <p:bldP spid="113" grpId="0"/>
-    </p:bldLst>
-  </p:timing>
 </p:sld>
 </file>
 
@@ -27444,10 +27371,15 @@
             <p:ph idx="1"/>
           </p:nvPr>
         </p:nvSpPr>
-        <p:spPr/>
+        <p:spPr>
+          <a:xfrm>
+            <a:off x="1484310" y="2136619"/>
+            <a:ext cx="10018713" cy="3654582"/>
+          </a:xfrm>
+        </p:spPr>
         <p:txBody>
           <a:bodyPr>
-            <a:normAutofit fontScale="92500" lnSpcReduction="10000"/>
+            <a:normAutofit fontScale="77500" lnSpcReduction="20000"/>
           </a:bodyPr>
           <a:lstStyle/>
           <a:p>
@@ -27479,7 +27411,7 @@
                 <a:ea typeface="Roboto" panose="02000000000000000000" pitchFamily="2" charset="0"/>
                 <a:cs typeface="Roboto" panose="02000000000000000000" pitchFamily="2" charset="0"/>
               </a:rPr>
-              <a:t>3-Axis Magnetometer MMC5983MA</a:t>
+              <a:t>3-Axis Magnetometer (MMC5983MA)</a:t>
             </a:r>
           </a:p>
           <a:p>
@@ -27490,8 +27422,130 @@
                 <a:ea typeface="Roboto" panose="02000000000000000000" pitchFamily="2" charset="0"/>
                 <a:cs typeface="Roboto" panose="02000000000000000000" pitchFamily="2" charset="0"/>
               </a:rPr>
-              <a:t>6-Axis IMU LSM6DS3</a:t>
+              <a:t>3-Axis High-g Accelerometer (H3LIS331DL)</a:t>
             </a:r>
+          </a:p>
+          <a:p>
+            <a:pPr lvl="2"/>
+            <a:r>
+              <a:rPr lang="en-US" dirty="0">
+                <a:latin typeface="Roboto" panose="02000000000000000000" pitchFamily="2" charset="0"/>
+                <a:ea typeface="Roboto" panose="02000000000000000000" pitchFamily="2" charset="0"/>
+                <a:cs typeface="Roboto" panose="02000000000000000000" pitchFamily="2" charset="0"/>
+              </a:rPr>
+              <a:t>Low power 3D accelerometer with range of</a:t>
+            </a:r>
+            <a:r>
+              <a:rPr lang="en-US" sz="1800" b="0" i="0" strike="noStrike" dirty="0">
+                <a:effectLst/>
+                <a:latin typeface="Roboto" panose="02000000000000000000" pitchFamily="2" charset="0"/>
+                <a:ea typeface="Roboto" panose="02000000000000000000" pitchFamily="2" charset="0"/>
+                <a:cs typeface="Roboto" panose="02000000000000000000" pitchFamily="2" charset="0"/>
+              </a:rPr>
+              <a:t> ±</a:t>
+            </a:r>
+            <a:r>
+              <a:rPr lang="en-US" dirty="0">
+                <a:latin typeface="Roboto" panose="02000000000000000000" pitchFamily="2" charset="0"/>
+                <a:ea typeface="Roboto" panose="02000000000000000000" pitchFamily="2" charset="0"/>
+                <a:cs typeface="Roboto" panose="02000000000000000000" pitchFamily="2" charset="0"/>
+              </a:rPr>
+              <a:t>100</a:t>
+            </a:r>
+            <a:r>
+              <a:rPr lang="en-US" sz="1800" b="0" i="0" strike="noStrike" dirty="0">
+                <a:effectLst/>
+                <a:latin typeface="Roboto" panose="02000000000000000000" pitchFamily="2" charset="0"/>
+                <a:ea typeface="Roboto" panose="02000000000000000000" pitchFamily="2" charset="0"/>
+                <a:cs typeface="Roboto" panose="02000000000000000000" pitchFamily="2" charset="0"/>
+              </a:rPr>
+              <a:t>/±</a:t>
+            </a:r>
+            <a:r>
+              <a:rPr lang="en-US" dirty="0">
+                <a:latin typeface="Roboto" panose="02000000000000000000" pitchFamily="2" charset="0"/>
+                <a:ea typeface="Roboto" panose="02000000000000000000" pitchFamily="2" charset="0"/>
+                <a:cs typeface="Roboto" panose="02000000000000000000" pitchFamily="2" charset="0"/>
+              </a:rPr>
+              <a:t>200</a:t>
+            </a:r>
+            <a:r>
+              <a:rPr lang="en-US" sz="1800" b="0" i="0" strike="noStrike" dirty="0">
+                <a:effectLst/>
+                <a:latin typeface="Roboto" panose="02000000000000000000" pitchFamily="2" charset="0"/>
+                <a:ea typeface="Roboto" panose="02000000000000000000" pitchFamily="2" charset="0"/>
+                <a:cs typeface="Roboto" panose="02000000000000000000" pitchFamily="2" charset="0"/>
+              </a:rPr>
+              <a:t>/±400 g.</a:t>
+            </a:r>
+            <a:endParaRPr lang="en-US" dirty="0">
+              <a:latin typeface="Roboto" panose="02000000000000000000" pitchFamily="2" charset="0"/>
+              <a:ea typeface="Roboto" panose="02000000000000000000" pitchFamily="2" charset="0"/>
+              <a:cs typeface="Roboto" panose="02000000000000000000" pitchFamily="2" charset="0"/>
+            </a:endParaRPr>
+          </a:p>
+          <a:p>
+            <a:pPr lvl="1"/>
+            <a:r>
+              <a:rPr lang="en-US" dirty="0">
+                <a:latin typeface="Roboto" panose="02000000000000000000" pitchFamily="2" charset="0"/>
+                <a:ea typeface="Roboto" panose="02000000000000000000" pitchFamily="2" charset="0"/>
+                <a:cs typeface="Roboto" panose="02000000000000000000" pitchFamily="2" charset="0"/>
+              </a:rPr>
+              <a:t>6-Axis IMU (LSM6DS3)</a:t>
+            </a:r>
+          </a:p>
+          <a:p>
+            <a:pPr lvl="2"/>
+            <a:r>
+              <a:rPr lang="en-US" dirty="0">
+                <a:latin typeface="Roboto" panose="02000000000000000000" pitchFamily="2" charset="0"/>
+                <a:ea typeface="Roboto" panose="02000000000000000000" pitchFamily="2" charset="0"/>
+                <a:cs typeface="Roboto" panose="02000000000000000000" pitchFamily="2" charset="0"/>
+              </a:rPr>
+              <a:t>3D accelerometer with range of </a:t>
+            </a:r>
+            <a:r>
+              <a:rPr lang="en-US" sz="1800" b="0" i="0" strike="noStrike" dirty="0">
+                <a:effectLst/>
+                <a:latin typeface="Roboto" panose="02000000000000000000" pitchFamily="2" charset="0"/>
+                <a:ea typeface="Roboto" panose="02000000000000000000" pitchFamily="2" charset="0"/>
+                <a:cs typeface="Roboto" panose="02000000000000000000" pitchFamily="2" charset="0"/>
+              </a:rPr>
+              <a:t>±2/±4/±8/±16 g. The 3D gyroscope angular rate range of ±125/±250/±500/±1000/±2000/±4000 </a:t>
+            </a:r>
+            <a:r>
+              <a:rPr lang="en-US" sz="1800" b="0" i="0" strike="noStrike" dirty="0" err="1">
+                <a:effectLst/>
+                <a:latin typeface="Roboto" panose="02000000000000000000" pitchFamily="2" charset="0"/>
+                <a:ea typeface="Roboto" panose="02000000000000000000" pitchFamily="2" charset="0"/>
+                <a:cs typeface="Roboto" panose="02000000000000000000" pitchFamily="2" charset="0"/>
+              </a:rPr>
+              <a:t>dps</a:t>
+            </a:r>
+            <a:r>
+              <a:rPr lang="en-US" sz="1800" b="0" i="0" strike="noStrike" dirty="0">
+                <a:effectLst/>
+                <a:latin typeface="Roboto" panose="02000000000000000000" pitchFamily="2" charset="0"/>
+                <a:ea typeface="Roboto" panose="02000000000000000000" pitchFamily="2" charset="0"/>
+                <a:cs typeface="Roboto" panose="02000000000000000000" pitchFamily="2" charset="0"/>
+              </a:rPr>
+              <a:t>.</a:t>
+            </a:r>
+            <a:r>
+              <a:rPr lang="en-US" sz="1800" b="0" i="0" dirty="0">
+                <a:effectLst/>
+                <a:latin typeface="Roboto" panose="02000000000000000000" pitchFamily="2" charset="0"/>
+                <a:ea typeface="Roboto" panose="02000000000000000000" pitchFamily="2" charset="0"/>
+                <a:cs typeface="Roboto" panose="02000000000000000000" pitchFamily="2" charset="0"/>
+              </a:rPr>
+              <a:t>​</a:t>
+            </a:r>
+            <a:endParaRPr lang="en-US" dirty="0">
+              <a:latin typeface="Roboto" panose="02000000000000000000" pitchFamily="2" charset="0"/>
+              <a:ea typeface="Roboto" panose="02000000000000000000" pitchFamily="2" charset="0"/>
+              <a:cs typeface="Roboto" panose="02000000000000000000" pitchFamily="2" charset="0"/>
+            </a:endParaRPr>
           </a:p>
           <a:p>
             <a:r>
@@ -31728,6 +31782,14 @@
 </file>
 
 <file path=customXml/item1.xml><?xml version="1.0" encoding="utf-8"?>
+<p:properties xmlns:p="http://schemas.microsoft.com/office/2006/metadata/properties" xmlns:xsi="http://www.w3.org/2001/XMLSchema-instance" xmlns:pc="http://schemas.microsoft.com/office/infopath/2007/PartnerControls">
+  <documentManagement>
+    <_activity xmlns="bb60c6cf-93f4-4840-ad90-835d812e6d73" xsi:nil="true"/>
+  </documentManagement>
+</p:properties>
+</file>
+
+<file path=customXml/item2.xml><?xml version="1.0" encoding="utf-8"?>
 <ct:contentTypeSchema xmlns:ct="http://schemas.microsoft.com/office/2006/metadata/contentType" xmlns:ma="http://schemas.microsoft.com/office/2006/metadata/properties/metaAttributes" ct:_="" ma:_="" ma:contentTypeName="Document" ma:contentTypeID="0x01010078B0306B8129E84FBD26CD9262AC6FCD" ma:contentTypeVersion="11" ma:contentTypeDescription="Create a new document." ma:contentTypeScope="" ma:versionID="06ea2d465bc666608585953e464f4e37">
   <xsd:schema xmlns:xsd="http://www.w3.org/2001/XMLSchema" xmlns:xs="http://www.w3.org/2001/XMLSchema" xmlns:p="http://schemas.microsoft.com/office/2006/metadata/properties" xmlns:ns3="bb60c6cf-93f4-4840-ad90-835d812e6d73" xmlns:ns4="c849d328-2e61-4ad1-bc51-e3f05a1dc809" targetNamespace="http://schemas.microsoft.com/office/2006/metadata/properties" ma:root="true" ma:fieldsID="2a0d57ac93c52f6616c7337bd69aaf19" ns3:_="" ns4:_="">
     <xsd:import namespace="bb60c6cf-93f4-4840-ad90-835d812e6d73"/>
@@ -31936,7 +31998,7 @@
 </ct:contentTypeSchema>
 </file>
 
-<file path=customXml/item2.xml><?xml version="1.0" encoding="utf-8"?>
+<file path=customXml/item3.xml><?xml version="1.0" encoding="utf-8"?>
 <?mso-contentType ?>
 <FormTemplates xmlns="http://schemas.microsoft.com/sharepoint/v3/contenttype/forms">
   <Display>DocumentLibraryForm</Display>
@@ -31945,15 +32007,24 @@
 </FormTemplates>
 </file>
 
-<file path=customXml/item3.xml><?xml version="1.0" encoding="utf-8"?>
-<p:properties xmlns:p="http://schemas.microsoft.com/office/2006/metadata/properties" xmlns:xsi="http://www.w3.org/2001/XMLSchema-instance" xmlns:pc="http://schemas.microsoft.com/office/infopath/2007/PartnerControls">
-  <documentManagement>
-    <_activity xmlns="bb60c6cf-93f4-4840-ad90-835d812e6d73" xsi:nil="true"/>
-  </documentManagement>
-</p:properties>
+<file path=customXml/itemProps1.xml><?xml version="1.0" encoding="utf-8"?>
+<ds:datastoreItem xmlns:ds="http://schemas.openxmlformats.org/officeDocument/2006/customXml" ds:itemID="{985C32B9-A165-49D9-9AD5-7EA865EC75EB}">
+  <ds:schemaRefs>
+    <ds:schemaRef ds:uri="http://purl.org/dc/elements/1.1/"/>
+    <ds:schemaRef ds:uri="http://schemas.microsoft.com/office/infopath/2007/PartnerControls"/>
+    <ds:schemaRef ds:uri="c849d328-2e61-4ad1-bc51-e3f05a1dc809"/>
+    <ds:schemaRef ds:uri="bb60c6cf-93f4-4840-ad90-835d812e6d73"/>
+    <ds:schemaRef ds:uri="http://purl.org/dc/terms/"/>
+    <ds:schemaRef ds:uri="http://www.w3.org/XML/1998/namespace"/>
+    <ds:schemaRef ds:uri="http://schemas.microsoft.com/office/2006/documentManagement/types"/>
+    <ds:schemaRef ds:uri="http://schemas.openxmlformats.org/package/2006/metadata/core-properties"/>
+    <ds:schemaRef ds:uri="http://schemas.microsoft.com/office/2006/metadata/properties"/>
+    <ds:schemaRef ds:uri="http://purl.org/dc/dcmitype/"/>
+  </ds:schemaRefs>
+</ds:datastoreItem>
 </file>
 
-<file path=customXml/itemProps1.xml><?xml version="1.0" encoding="utf-8"?>
+<file path=customXml/itemProps2.xml><?xml version="1.0" encoding="utf-8"?>
 <ds:datastoreItem xmlns:ds="http://schemas.openxmlformats.org/officeDocument/2006/customXml" ds:itemID="{2AA39EEF-6D6C-4784-ABA1-35599DB9559E}">
   <ds:schemaRefs>
     <ds:schemaRef ds:uri="http://schemas.microsoft.com/office/2006/metadata/contentType"/>
@@ -31972,27 +32043,10 @@
 </ds:datastoreItem>
 </file>
 
-<file path=customXml/itemProps2.xml><?xml version="1.0" encoding="utf-8"?>
+<file path=customXml/itemProps3.xml><?xml version="1.0" encoding="utf-8"?>
 <ds:datastoreItem xmlns:ds="http://schemas.openxmlformats.org/officeDocument/2006/customXml" ds:itemID="{024995D9-5132-456F-9CEB-D0E7151FCB4A}">
   <ds:schemaRefs>
     <ds:schemaRef ds:uri="http://schemas.microsoft.com/sharepoint/v3/contenttype/forms"/>
   </ds:schemaRefs>
 </ds:datastoreItem>
-</file>
-
-<file path=customXml/itemProps3.xml><?xml version="1.0" encoding="utf-8"?>
-<ds:datastoreItem xmlns:ds="http://schemas.openxmlformats.org/officeDocument/2006/customXml" ds:itemID="{985C32B9-A165-49D9-9AD5-7EA865EC75EB}">
-  <ds:schemaRefs>
-    <ds:schemaRef ds:uri="http://purl.org/dc/elements/1.1/"/>
-    <ds:schemaRef ds:uri="http://schemas.microsoft.com/office/infopath/2007/PartnerControls"/>
-    <ds:schemaRef ds:uri="c849d328-2e61-4ad1-bc51-e3f05a1dc809"/>
-    <ds:schemaRef ds:uri="bb60c6cf-93f4-4840-ad90-835d812e6d73"/>
-    <ds:schemaRef ds:uri="http://purl.org/dc/terms/"/>
-    <ds:schemaRef ds:uri="http://www.w3.org/XML/1998/namespace"/>
-    <ds:schemaRef ds:uri="http://schemas.microsoft.com/office/2006/documentManagement/types"/>
-    <ds:schemaRef ds:uri="http://schemas.openxmlformats.org/package/2006/metadata/core-properties"/>
-    <ds:schemaRef ds:uri="http://schemas.microsoft.com/office/2006/metadata/properties"/>
-    <ds:schemaRef ds:uri="http://purl.org/dc/dcmitype/"/>
-  </ds:schemaRefs>
-</ds:datastoreItem>
 </file>
</xml_diff>